<commit_message>
Add comment and fix some bugs
</commit_message>
<xml_diff>
--- a/IRSystem.pptx
+++ b/IRSystem.pptx
@@ -216,7 +216,7 @@
                 <a:latin typeface="Microsoft JhengHei UI" panose="020B0604030504040204" pitchFamily="34" charset="-120"/>
                 <a:ea typeface="Microsoft JhengHei UI" panose="020B0604030504040204" pitchFamily="34" charset="-120"/>
               </a:rPr>
-              <a:t>2021/10/11</a:t>
+              <a:t>2021/10/12</a:t>
             </a:fld>
             <a:endParaRPr lang="zh-TW" altLang="en-US" dirty="0">
               <a:latin typeface="Microsoft JhengHei UI" panose="020B0604030504040204" pitchFamily="34" charset="-120"/>
@@ -402,7 +402,7 @@
           <a:p>
             <a:fld id="{A818C5E9-5966-460E-861F-1663B2AAAED6}" type="datetime1">
               <a:rPr lang="zh-TW" altLang="en-US" noProof="0" smtClean="0"/>
-              <a:t>2021/10/11</a:t>
+              <a:t>2021/10/12</a:t>
             </a:fld>
             <a:endParaRPr lang="zh-TW" altLang="en-US" noProof="0" dirty="0"/>
           </a:p>
@@ -10044,7 +10044,7 @@
             <a:pPr rtl="0"/>
             <a:fld id="{1EE05C45-8EB5-41B2-9B41-7B2BD9B7DEEC}" type="datetime1">
               <a:rPr lang="zh-TW" altLang="en-US" noProof="0" smtClean="0"/>
-              <a:t>2021/10/11</a:t>
+              <a:t>2021/10/12</a:t>
             </a:fld>
             <a:endParaRPr lang="zh-TW" altLang="en-US" noProof="0" dirty="0"/>
           </a:p>
@@ -10250,7 +10250,7 @@
             <a:pPr rtl="0"/>
             <a:fld id="{F17D0BD1-4150-488B-822D-FAA2ED87235F}" type="datetime1">
               <a:rPr lang="zh-TW" altLang="en-US" noProof="0" smtClean="0"/>
-              <a:t>2021/10/11</a:t>
+              <a:t>2021/10/12</a:t>
             </a:fld>
             <a:endParaRPr lang="zh-TW" altLang="en-US" noProof="0" dirty="0"/>
           </a:p>
@@ -10429,7 +10429,7 @@
             <a:pPr rtl="0"/>
             <a:fld id="{56917129-5C2D-48BD-8F9D-5DD9AA52C80B}" type="datetime1">
               <a:rPr lang="zh-TW" altLang="en-US" noProof="0" smtClean="0"/>
-              <a:t>2021/10/11</a:t>
+              <a:t>2021/10/12</a:t>
             </a:fld>
             <a:endParaRPr lang="zh-TW" altLang="en-US" noProof="0" dirty="0"/>
           </a:p>
@@ -10633,7 +10633,7 @@
             <a:pPr rtl="0"/>
             <a:fld id="{226959E9-D711-4141-BC84-15DB177AD95C}" type="datetime1">
               <a:rPr lang="zh-TW" altLang="en-US" noProof="0" smtClean="0"/>
-              <a:t>2021/10/11</a:t>
+              <a:t>2021/10/12</a:t>
             </a:fld>
             <a:endParaRPr lang="zh-TW" altLang="en-US" noProof="0" dirty="0"/>
           </a:p>
@@ -19530,7 +19530,7 @@
             <a:pPr rtl="0"/>
             <a:fld id="{07A3C890-8623-4A1C-947B-A864EC59C0DD}" type="datetime1">
               <a:rPr lang="zh-TW" altLang="en-US" noProof="0" smtClean="0"/>
-              <a:t>2021/10/11</a:t>
+              <a:t>2021/10/12</a:t>
             </a:fld>
             <a:endParaRPr lang="zh-TW" altLang="en-US" noProof="0" dirty="0"/>
           </a:p>
@@ -19803,7 +19803,7 @@
             <a:pPr rtl="0"/>
             <a:fld id="{D5BE9075-3447-4FD3-8BC9-6412CF8C5B41}" type="datetime1">
               <a:rPr lang="zh-TW" altLang="en-US" noProof="0" smtClean="0"/>
-              <a:t>2021/10/11</a:t>
+              <a:t>2021/10/12</a:t>
             </a:fld>
             <a:endParaRPr lang="zh-TW" altLang="en-US" noProof="0" dirty="0"/>
           </a:p>
@@ -20276,7 +20276,7 @@
           <a:p>
             <a:fld id="{0F9BBEE5-55F8-45A3-AB6C-9C6112BE0C32}" type="datetime1">
               <a:rPr lang="zh-TW" altLang="en-US" noProof="0" smtClean="0"/>
-              <a:t>2021/10/11</a:t>
+              <a:t>2021/10/12</a:t>
             </a:fld>
             <a:endParaRPr lang="zh-TW" altLang="en-US" noProof="0" dirty="0"/>
           </a:p>
@@ -20406,7 +20406,7 @@
             <a:pPr rtl="0"/>
             <a:fld id="{CDEAE714-2E29-46F3-9C77-12416C9543F5}" type="datetime1">
               <a:rPr lang="zh-TW" altLang="en-US" noProof="0" smtClean="0"/>
-              <a:t>2021/10/11</a:t>
+              <a:t>2021/10/12</a:t>
             </a:fld>
             <a:endParaRPr lang="zh-TW" altLang="en-US" noProof="0" dirty="0"/>
           </a:p>
@@ -20499,7 +20499,7 @@
             <a:pPr rtl="0"/>
             <a:fld id="{8C77B25F-C5C5-4940-9B93-C7969EB742CA}" type="datetime1">
               <a:rPr lang="zh-TW" altLang="en-US" noProof="0" smtClean="0"/>
-              <a:t>2021/10/11</a:t>
+              <a:t>2021/10/12</a:t>
             </a:fld>
             <a:endParaRPr lang="zh-TW" altLang="en-US" noProof="0" dirty="0"/>
           </a:p>
@@ -20788,7 +20788,7 @@
             <a:pPr rtl="0"/>
             <a:fld id="{834BDAB7-BD48-40B7-93E5-DE7F01A31190}" type="datetime1">
               <a:rPr lang="zh-TW" altLang="en-US" noProof="0" smtClean="0"/>
-              <a:t>2021/10/11</a:t>
+              <a:t>2021/10/12</a:t>
             </a:fld>
             <a:endParaRPr lang="zh-TW" altLang="en-US" noProof="0" dirty="0"/>
           </a:p>
@@ -21068,7 +21068,7 @@
             <a:pPr rtl="0"/>
             <a:fld id="{00BDDE7C-E999-47D2-A35D-EE2C20E3497B}" type="datetime1">
               <a:rPr lang="zh-TW" altLang="en-US" noProof="0" smtClean="0"/>
-              <a:t>2021/10/11</a:t>
+              <a:t>2021/10/12</a:t>
             </a:fld>
             <a:endParaRPr lang="zh-TW" altLang="en-US" noProof="0" dirty="0"/>
           </a:p>
@@ -21315,7 +21315,7 @@
           <a:p>
             <a:fld id="{D22E2503-8843-448F-B01E-FCD9BA586A1F}" type="datetime1">
               <a:rPr lang="zh-TW" altLang="en-US" noProof="0" smtClean="0"/>
-              <a:t>2021/10/11</a:t>
+              <a:t>2021/10/12</a:t>
             </a:fld>
             <a:endParaRPr lang="zh-TW" altLang="en-US" noProof="0" dirty="0"/>
           </a:p>
@@ -21832,7 +21832,7 @@
                 <a16:creationId xmlns:a16="http://schemas.microsoft.com/office/drawing/2014/main" id="{2FDF0794-1B86-42B2-B8C7-F60123E638ED}"/>
               </a:ext>
               <a:ext uri="{C183D7F6-B498-43B3-948B-1728B52AA6E4}">
-                <adec:decorative xmlns:adec="http://schemas.microsoft.com/office/drawing/2017/decorative" val="1"/>
+                <adec:decorative xmlns:adec="http://schemas.microsoft.com/office/drawing/2017/decorative" xmlns="" val="1"/>
               </a:ext>
             </a:extLst>
           </p:cNvPr>
@@ -21898,7 +21898,7 @@
                 <a16:creationId xmlns:a16="http://schemas.microsoft.com/office/drawing/2014/main" id="{230BD1B1-AA22-48F1-B3ED-579CD284605D}"/>
               </a:ext>
               <a:ext uri="{C183D7F6-B498-43B3-948B-1728B52AA6E4}">
-                <adec:decorative xmlns:adec="http://schemas.microsoft.com/office/drawing/2017/decorative" val="1"/>
+                <adec:decorative xmlns:adec="http://schemas.microsoft.com/office/drawing/2017/decorative" xmlns="" val="1"/>
               </a:ext>
             </a:extLst>
           </p:cNvPr>
@@ -21930,7 +21930,7 @@
                 <a16:creationId xmlns:a16="http://schemas.microsoft.com/office/drawing/2014/main" id="{EAA48FC5-3C83-4F1B-BC33-DF0B588F8317}"/>
               </a:ext>
               <a:ext uri="{C183D7F6-B498-43B3-948B-1728B52AA6E4}">
-                <adec:decorative xmlns:adec="http://schemas.microsoft.com/office/drawing/2017/decorative" val="1"/>
+                <adec:decorative xmlns:adec="http://schemas.microsoft.com/office/drawing/2017/decorative" xmlns="" val="1"/>
               </a:ext>
             </a:extLst>
           </p:cNvPr>
@@ -22045,7 +22045,7 @@
                 <a16:creationId xmlns:a16="http://schemas.microsoft.com/office/drawing/2014/main" id="{62F01714-1A39-4194-BD47-8A9960C59985}"/>
               </a:ext>
               <a:ext uri="{C183D7F6-B498-43B3-948B-1728B52AA6E4}">
-                <adec:decorative xmlns:adec="http://schemas.microsoft.com/office/drawing/2017/decorative" val="1"/>
+                <adec:decorative xmlns:adec="http://schemas.microsoft.com/office/drawing/2017/decorative" xmlns="" val="1"/>
               </a:ext>
             </a:extLst>
           </p:cNvPr>
@@ -24368,7 +24368,7 @@
           <a:lstStyle/>
           <a:p>
             <a:r>
-              <a:rPr lang="en-US" altLang="zh-TW" sz="1200" dirty="0">
+              <a:rPr lang="en-US" altLang="zh-TW" sz="1200" dirty="0" smtClean="0">
                 <a:solidFill>
                   <a:schemeClr val="dk1"/>
                 </a:solidFill>
@@ -24378,7 +24378,7 @@
               <a:t>Find</a:t>
             </a:r>
             <a:r>
-              <a:rPr lang="zh-TW" altLang="en-US" sz="1200" dirty="0">
+              <a:rPr lang="zh-TW" altLang="en-US" sz="1200" dirty="0" smtClean="0">
                 <a:solidFill>
                   <a:schemeClr val="dk1"/>
                 </a:solidFill>
@@ -25561,7 +25561,7 @@
         </p:nvSpPr>
         <p:spPr>
           <a:xfrm>
-            <a:off x="662628" y="2045006"/>
+            <a:off x="662628" y="1790362"/>
             <a:ext cx="4295984" cy="523220"/>
           </a:xfrm>
           <a:prstGeom prst="rect">
@@ -25586,7 +25586,27 @@
                   </a:schemeClr>
                 </a:solidFill>
               </a:rPr>
-              <a:t>The characters properties :</a:t>
+              <a:t>The </a:t>
+            </a:r>
+            <a:r>
+              <a:rPr lang="en-US" altLang="zh-TW" sz="2800" dirty="0" smtClean="0">
+                <a:solidFill>
+                  <a:schemeClr val="accent3">
+                    <a:lumMod val="50000"/>
+                  </a:schemeClr>
+                </a:solidFill>
+              </a:rPr>
+              <a:t>characters properties </a:t>
+            </a:r>
+            <a:r>
+              <a:rPr lang="en-US" altLang="zh-TW" sz="2800" dirty="0">
+                <a:solidFill>
+                  <a:schemeClr val="accent3">
+                    <a:lumMod val="50000"/>
+                  </a:schemeClr>
+                </a:solidFill>
+              </a:rPr>
+              <a:t>:</a:t>
             </a:r>
           </a:p>
         </p:txBody>
@@ -25605,8 +25625,8 @@
         </p:nvSpPr>
         <p:spPr>
           <a:xfrm>
-            <a:off x="1054443" y="2643075"/>
-            <a:ext cx="6212406" cy="1569660"/>
+            <a:off x="1054443" y="2330556"/>
+            <a:ext cx="6742551" cy="1569660"/>
           </a:xfrm>
           <a:prstGeom prst="rect">
             <a:avLst/>
@@ -25706,8 +25726,37 @@
                   <a:srgbClr val="002060"/>
                 </a:solidFill>
               </a:rPr>
-              <a:t>Unicode calculation is only one character.</a:t>
+              <a:t>Excluding Unicode </a:t>
             </a:r>
+            <a:r>
+              <a:rPr lang="en-US" altLang="zh-TW" sz="2400" b="1" dirty="0" smtClean="0">
+                <a:solidFill>
+                  <a:srgbClr val="002060"/>
+                </a:solidFill>
+              </a:rPr>
+              <a:t>calculation. (such as </a:t>
+            </a:r>
+            <a:r>
+              <a:rPr lang="en-US" altLang="zh-TW" sz="2400" b="1" dirty="0">
+                <a:solidFill>
+                  <a:srgbClr val="002060"/>
+                </a:solidFill>
+              </a:rPr>
+              <a:t>: </a:t>
+            </a:r>
+            <a:r>
+              <a:rPr lang="en-US" altLang="zh-TW" sz="2400" b="1" dirty="0" smtClean="0">
+                <a:solidFill>
+                  <a:srgbClr val="002060"/>
+                </a:solidFill>
+              </a:rPr>
+              <a:t>         ) </a:t>
+            </a:r>
+            <a:endParaRPr lang="en-US" altLang="zh-TW" sz="2400" b="1" dirty="0">
+              <a:solidFill>
+                <a:srgbClr val="002060"/>
+              </a:solidFill>
+            </a:endParaRPr>
           </a:p>
         </p:txBody>
       </p:sp>
@@ -25725,7 +25774,7 @@
         </p:nvSpPr>
         <p:spPr>
           <a:xfrm>
-            <a:off x="662628" y="4463303"/>
+            <a:off x="662628" y="5285107"/>
             <a:ext cx="3278398" cy="523220"/>
           </a:xfrm>
           <a:prstGeom prst="rect">
@@ -25769,7 +25818,7 @@
         </p:nvSpPr>
         <p:spPr>
           <a:xfrm>
-            <a:off x="1054443" y="4986523"/>
+            <a:off x="1054443" y="5808327"/>
             <a:ext cx="9388019" cy="830997"/>
           </a:xfrm>
           <a:prstGeom prst="rect">
@@ -25811,6 +25860,181 @@
           </a:p>
         </p:txBody>
       </p:sp>
+      <p:sp>
+        <p:nvSpPr>
+          <p:cNvPr id="2" name="矩形 1"/>
+          <p:cNvSpPr/>
+          <p:nvPr/>
+        </p:nvSpPr>
+        <p:spPr>
+          <a:xfrm>
+            <a:off x="1054443" y="4412480"/>
+            <a:ext cx="10427643" cy="830997"/>
+          </a:xfrm>
+          <a:prstGeom prst="rect">
+            <a:avLst/>
+          </a:prstGeom>
+        </p:spPr>
+        <p:txBody>
+          <a:bodyPr wrap="square">
+            <a:spAutoFit/>
+          </a:bodyPr>
+          <a:lstStyle/>
+          <a:p>
+            <a:pPr marL="342900" indent="-342900">
+              <a:buFont typeface="Arial" panose="020B0604020202020204" pitchFamily="34" charset="0"/>
+              <a:buChar char="•"/>
+            </a:pPr>
+            <a:r>
+              <a:rPr lang="en-US" altLang="zh-TW" sz="2400" b="1" dirty="0">
+                <a:solidFill>
+                  <a:srgbClr val="002060"/>
+                </a:solidFill>
+              </a:rPr>
+              <a:t>XML  File : Only process title and abstract content.</a:t>
+            </a:r>
+          </a:p>
+          <a:p>
+            <a:pPr marL="342900" indent="-342900">
+              <a:buFont typeface="Arial" panose="020B0604020202020204" pitchFamily="34" charset="0"/>
+              <a:buChar char="•"/>
+            </a:pPr>
+            <a:r>
+              <a:rPr lang="en-US" altLang="zh-TW" sz="2400" b="1" dirty="0">
+                <a:solidFill>
+                  <a:srgbClr val="002060"/>
+                </a:solidFill>
+              </a:rPr>
+              <a:t>JSON File : Only process tweet content which property name is "</a:t>
+            </a:r>
+            <a:r>
+              <a:rPr lang="en-US" altLang="zh-TW" sz="2400" b="1" dirty="0" err="1">
+                <a:solidFill>
+                  <a:srgbClr val="002060"/>
+                </a:solidFill>
+              </a:rPr>
+              <a:t>tweet_text</a:t>
+            </a:r>
+            <a:r>
+              <a:rPr lang="en-US" altLang="zh-TW" sz="2400" b="1" dirty="0">
+                <a:solidFill>
+                  <a:srgbClr val="002060"/>
+                </a:solidFill>
+              </a:rPr>
+              <a:t>"</a:t>
+            </a:r>
+          </a:p>
+        </p:txBody>
+      </p:sp>
+      <p:sp>
+        <p:nvSpPr>
+          <p:cNvPr id="9" name="矩形 8">
+            <a:extLst>
+              <a:ext uri="{FF2B5EF4-FFF2-40B4-BE49-F238E27FC236}">
+                <a16:creationId xmlns:a16="http://schemas.microsoft.com/office/drawing/2014/main" id="{99AEE3B1-ACB8-45A4-B777-E0A89380CB93}"/>
+              </a:ext>
+            </a:extLst>
+          </p:cNvPr>
+          <p:cNvSpPr/>
+          <p:nvPr/>
+        </p:nvSpPr>
+        <p:spPr>
+          <a:xfrm>
+            <a:off x="662628" y="3888951"/>
+            <a:ext cx="3330592" cy="523220"/>
+          </a:xfrm>
+          <a:prstGeom prst="rect">
+            <a:avLst/>
+          </a:prstGeom>
+        </p:spPr>
+        <p:txBody>
+          <a:bodyPr wrap="none">
+            <a:spAutoFit/>
+          </a:bodyPr>
+          <a:lstStyle/>
+          <a:p>
+            <a:pPr marL="285750" indent="-285750">
+              <a:buFont typeface="Arial" panose="020B0604020202020204" pitchFamily="34" charset="0"/>
+              <a:buChar char="•"/>
+            </a:pPr>
+            <a:r>
+              <a:rPr lang="en-US" altLang="zh-TW" sz="2800" dirty="0">
+                <a:solidFill>
+                  <a:schemeClr val="accent3">
+                    <a:lumMod val="50000"/>
+                  </a:schemeClr>
+                </a:solidFill>
+              </a:rPr>
+              <a:t>The </a:t>
+            </a:r>
+            <a:r>
+              <a:rPr lang="en-US" altLang="zh-TW" sz="2800" dirty="0" smtClean="0">
+                <a:solidFill>
+                  <a:schemeClr val="accent3">
+                    <a:lumMod val="50000"/>
+                  </a:schemeClr>
+                </a:solidFill>
+              </a:rPr>
+              <a:t>parser process :</a:t>
+            </a:r>
+            <a:endParaRPr lang="en-US" altLang="zh-TW" sz="2800" dirty="0">
+              <a:solidFill>
+                <a:schemeClr val="accent3">
+                  <a:lumMod val="50000"/>
+                </a:schemeClr>
+              </a:solidFill>
+            </a:endParaRPr>
+          </a:p>
+        </p:txBody>
+      </p:sp>
+      <p:pic>
+        <p:nvPicPr>
+          <p:cNvPr id="3" name="圖片 2"/>
+          <p:cNvPicPr>
+            <a:picLocks noChangeAspect="1"/>
+          </p:cNvPicPr>
+          <p:nvPr/>
+        </p:nvPicPr>
+        <p:blipFill>
+          <a:blip r:embed="rId3"/>
+          <a:stretch>
+            <a:fillRect/>
+          </a:stretch>
+        </p:blipFill>
+        <p:spPr>
+          <a:xfrm>
+            <a:off x="6712955" y="3513416"/>
+            <a:ext cx="386800" cy="386800"/>
+          </a:xfrm>
+          <a:prstGeom prst="rect">
+            <a:avLst/>
+          </a:prstGeom>
+        </p:spPr>
+      </p:pic>
+      <p:pic>
+        <p:nvPicPr>
+          <p:cNvPr id="5" name="圖片 4"/>
+          <p:cNvPicPr>
+            <a:picLocks noChangeAspect="1"/>
+          </p:cNvPicPr>
+          <p:nvPr/>
+        </p:nvPicPr>
+        <p:blipFill>
+          <a:blip r:embed="rId4"/>
+          <a:stretch>
+            <a:fillRect/>
+          </a:stretch>
+        </p:blipFill>
+        <p:spPr>
+          <a:xfrm>
+            <a:off x="7162074" y="3587753"/>
+            <a:ext cx="209550" cy="238125"/>
+          </a:xfrm>
+          <a:prstGeom prst="rect">
+            <a:avLst/>
+          </a:prstGeom>
+        </p:spPr>
+      </p:pic>
     </p:spTree>
     <p:extLst>
       <p:ext uri="{BB962C8B-B14F-4D97-AF65-F5344CB8AC3E}">
@@ -26797,23 +27021,6 @@
 </file>
 
 <file path=customXml/item1.xml><?xml version="1.0" encoding="utf-8"?>
-<p:properties xmlns:p="http://schemas.microsoft.com/office/2006/metadata/properties" xmlns:xsi="http://www.w3.org/2001/XMLSchema-instance" xmlns:pc="http://schemas.microsoft.com/office/infopath/2007/PartnerControls">
-  <documentManagement>
-    <MediaServiceKeyPoints xmlns="71af3243-3dd4-4a8d-8c0d-dd76da1f02a5" xsi:nil="true"/>
-  </documentManagement>
-</p:properties>
-</file>
-
-<file path=customXml/item2.xml><?xml version="1.0" encoding="utf-8"?>
-<?mso-contentType ?>
-<FormTemplates xmlns="http://schemas.microsoft.com/sharepoint/v3/contenttype/forms">
-  <Display>DocumentLibraryForm</Display>
-  <Edit>DocumentLibraryForm</Edit>
-  <New>DocumentLibraryForm</New>
-</FormTemplates>
-</file>
-
-<file path=customXml/item3.xml><?xml version="1.0" encoding="utf-8"?>
 <ct:contentTypeSchema xmlns:ct="http://schemas.microsoft.com/office/2006/metadata/contentType" xmlns:ma="http://schemas.microsoft.com/office/2006/metadata/properties/metaAttributes" ct:_="" ma:_="" ma:contentTypeName="Document" ma:contentTypeID="0x01010079F111ED35F8CC479449609E8A0923A6" ma:contentTypeVersion="11" ma:contentTypeDescription="Create a new document." ma:contentTypeScope="" ma:versionID="9677210f24a1be23c92c90fd886aa0aa">
   <xsd:schema xmlns:xsd="http://www.w3.org/2001/XMLSchema" xmlns:xs="http://www.w3.org/2001/XMLSchema" xmlns:p="http://schemas.microsoft.com/office/2006/metadata/properties" xmlns:ns2="71af3243-3dd4-4a8d-8c0d-dd76da1f02a5" xmlns:ns3="16c05727-aa75-4e4a-9b5f-8a80a1165891" targetNamespace="http://schemas.microsoft.com/office/2006/metadata/properties" ma:root="true" ma:fieldsID="60e05723c5c1908df1a1a4ebf11d344e" ns2:_="" ns3:_="">
     <xsd:import namespace="71af3243-3dd4-4a8d-8c0d-dd76da1f02a5"/>
@@ -27024,32 +27231,24 @@
 </ct:contentTypeSchema>
 </file>
 
-<file path=customXml/itemProps1.xml><?xml version="1.0" encoding="utf-8"?>
-<ds:datastoreItem xmlns:ds="http://schemas.openxmlformats.org/officeDocument/2006/customXml" ds:itemID="{788A2F88-55C5-4ED1-9541-807C65424763}">
-  <ds:schemaRefs>
-    <ds:schemaRef ds:uri="http://schemas.microsoft.com/office/2006/documentManagement/types"/>
-    <ds:schemaRef ds:uri="http://schemas.openxmlformats.org/package/2006/metadata/core-properties"/>
-    <ds:schemaRef ds:uri="16c05727-aa75-4e4a-9b5f-8a80a1165891"/>
-    <ds:schemaRef ds:uri="http://purl.org/dc/elements/1.1/"/>
-    <ds:schemaRef ds:uri="http://schemas.microsoft.com/office/2006/metadata/properties"/>
-    <ds:schemaRef ds:uri="71af3243-3dd4-4a8d-8c0d-dd76da1f02a5"/>
-    <ds:schemaRef ds:uri="http://purl.org/dc/terms/"/>
-    <ds:schemaRef ds:uri="http://schemas.microsoft.com/office/infopath/2007/PartnerControls"/>
-    <ds:schemaRef ds:uri="http://www.w3.org/XML/1998/namespace"/>
-    <ds:schemaRef ds:uri="http://purl.org/dc/dcmitype/"/>
-  </ds:schemaRefs>
-</ds:datastoreItem>
+<file path=customXml/item2.xml><?xml version="1.0" encoding="utf-8"?>
+<?mso-contentType ?>
+<FormTemplates xmlns="http://schemas.microsoft.com/sharepoint/v3/contenttype/forms">
+  <Display>DocumentLibraryForm</Display>
+  <Edit>DocumentLibraryForm</Edit>
+  <New>DocumentLibraryForm</New>
+</FormTemplates>
 </file>
 
-<file path=customXml/itemProps2.xml><?xml version="1.0" encoding="utf-8"?>
-<ds:datastoreItem xmlns:ds="http://schemas.openxmlformats.org/officeDocument/2006/customXml" ds:itemID="{4F44C90D-2A62-4985-9618-3460247437B1}">
-  <ds:schemaRefs>
-    <ds:schemaRef ds:uri="http://schemas.microsoft.com/sharepoint/v3/contenttype/forms"/>
-  </ds:schemaRefs>
-</ds:datastoreItem>
+<file path=customXml/item3.xml><?xml version="1.0" encoding="utf-8"?>
+<p:properties xmlns:p="http://schemas.microsoft.com/office/2006/metadata/properties" xmlns:xsi="http://www.w3.org/2001/XMLSchema-instance" xmlns:pc="http://schemas.microsoft.com/office/infopath/2007/PartnerControls">
+  <documentManagement>
+    <MediaServiceKeyPoints xmlns="71af3243-3dd4-4a8d-8c0d-dd76da1f02a5" xsi:nil="true"/>
+  </documentManagement>
+</p:properties>
 </file>
 
-<file path=customXml/itemProps3.xml><?xml version="1.0" encoding="utf-8"?>
+<file path=customXml/itemProps1.xml><?xml version="1.0" encoding="utf-8"?>
 <ds:datastoreItem xmlns:ds="http://schemas.openxmlformats.org/officeDocument/2006/customXml" ds:itemID="{B61EAB5F-88FC-4FAE-AE3C-037A3C365EB8}">
   <ds:schemaRefs>
     <ds:schemaRef ds:uri="http://schemas.microsoft.com/office/2006/metadata/contentType"/>
@@ -27066,4 +27265,29 @@
     <ds:schemaRef ds:uri="http://schemas.microsoft.com/internal/obd"/>
   </ds:schemaRefs>
 </ds:datastoreItem>
+</file>
+
+<file path=customXml/itemProps2.xml><?xml version="1.0" encoding="utf-8"?>
+<ds:datastoreItem xmlns:ds="http://schemas.openxmlformats.org/officeDocument/2006/customXml" ds:itemID="{4F44C90D-2A62-4985-9618-3460247437B1}">
+  <ds:schemaRefs>
+    <ds:schemaRef ds:uri="http://schemas.microsoft.com/sharepoint/v3/contenttype/forms"/>
+  </ds:schemaRefs>
+</ds:datastoreItem>
+</file>
+
+<file path=customXml/itemProps3.xml><?xml version="1.0" encoding="utf-8"?>
+<ds:datastoreItem xmlns:ds="http://schemas.openxmlformats.org/officeDocument/2006/customXml" ds:itemID="{788A2F88-55C5-4ED1-9541-807C65424763}">
+  <ds:schemaRefs>
+    <ds:schemaRef ds:uri="http://schemas.microsoft.com/office/2006/documentManagement/types"/>
+    <ds:schemaRef ds:uri="http://schemas.openxmlformats.org/package/2006/metadata/core-properties"/>
+    <ds:schemaRef ds:uri="16c05727-aa75-4e4a-9b5f-8a80a1165891"/>
+    <ds:schemaRef ds:uri="http://purl.org/dc/elements/1.1/"/>
+    <ds:schemaRef ds:uri="http://schemas.microsoft.com/office/2006/metadata/properties"/>
+    <ds:schemaRef ds:uri="71af3243-3dd4-4a8d-8c0d-dd76da1f02a5"/>
+    <ds:schemaRef ds:uri="http://purl.org/dc/terms/"/>
+    <ds:schemaRef ds:uri="http://schemas.microsoft.com/office/infopath/2007/PartnerControls"/>
+    <ds:schemaRef ds:uri="http://www.w3.org/XML/1998/namespace"/>
+    <ds:schemaRef ds:uri="http://purl.org/dc/dcmitype/"/>
+  </ds:schemaRefs>
+</ds:datastoreItem>
 </file>
</xml_diff>

<commit_message>
1 by 1 character compare
Add extension function : 1 by 1 character compare
</commit_message>
<xml_diff>
--- a/IRSystem.pptx
+++ b/IRSystem.pptx
@@ -5,18 +5,20 @@
     <p:sldMasterId id="2147483648" r:id="rId4"/>
   </p:sldMasterIdLst>
   <p:notesMasterIdLst>
-    <p:notesMasterId r:id="rId11"/>
+    <p:notesMasterId r:id="rId13"/>
   </p:notesMasterIdLst>
   <p:handoutMasterIdLst>
-    <p:handoutMasterId r:id="rId12"/>
+    <p:handoutMasterId r:id="rId14"/>
   </p:handoutMasterIdLst>
   <p:sldIdLst>
     <p:sldId id="256" r:id="rId5"/>
     <p:sldId id="279" r:id="rId6"/>
     <p:sldId id="277" r:id="rId7"/>
-    <p:sldId id="278" r:id="rId8"/>
-    <p:sldId id="280" r:id="rId9"/>
-    <p:sldId id="282" r:id="rId10"/>
+    <p:sldId id="283" r:id="rId8"/>
+    <p:sldId id="278" r:id="rId9"/>
+    <p:sldId id="280" r:id="rId10"/>
+    <p:sldId id="284" r:id="rId11"/>
+    <p:sldId id="282" r:id="rId12"/>
   </p:sldIdLst>
   <p:sldSz cx="12192000" cy="6858000"/>
   <p:notesSz cx="6858000" cy="9144000"/>
@@ -216,7 +218,7 @@
                 <a:latin typeface="Microsoft JhengHei UI" panose="020B0604030504040204" pitchFamily="34" charset="-120"/>
                 <a:ea typeface="Microsoft JhengHei UI" panose="020B0604030504040204" pitchFamily="34" charset="-120"/>
               </a:rPr>
-              <a:t>2021/10/12</a:t>
+              <a:t>2021/10/17</a:t>
             </a:fld>
             <a:endParaRPr lang="zh-TW" altLang="en-US" dirty="0">
               <a:latin typeface="Microsoft JhengHei UI" panose="020B0604030504040204" pitchFamily="34" charset="-120"/>
@@ -402,7 +404,7 @@
           <a:p>
             <a:fld id="{A818C5E9-5966-460E-861F-1663B2AAAED6}" type="datetime1">
               <a:rPr lang="zh-TW" altLang="en-US" noProof="0" smtClean="0"/>
-              <a:t>2021/10/12</a:t>
+              <a:t>2021/10/17</a:t>
             </a:fld>
             <a:endParaRPr lang="zh-TW" altLang="en-US" noProof="0" dirty="0"/>
           </a:p>
@@ -1048,7 +1050,7 @@
     </p:spTree>
     <p:extLst>
       <p:ext uri="{BB962C8B-B14F-4D97-AF65-F5344CB8AC3E}">
-        <p14:creationId xmlns:p14="http://schemas.microsoft.com/office/powerpoint/2010/main" val="4211138724"/>
+        <p14:creationId xmlns:p14="http://schemas.microsoft.com/office/powerpoint/2010/main" val="3055247991"/>
       </p:ext>
     </p:extLst>
   </p:cSld>
@@ -1143,7 +1145,7 @@
     </p:spTree>
     <p:extLst>
       <p:ext uri="{BB962C8B-B14F-4D97-AF65-F5344CB8AC3E}">
-        <p14:creationId xmlns:p14="http://schemas.microsoft.com/office/powerpoint/2010/main" val="1937938796"/>
+        <p14:creationId xmlns:p14="http://schemas.microsoft.com/office/powerpoint/2010/main" val="4211138724"/>
       </p:ext>
     </p:extLst>
   </p:cSld>
@@ -1227,6 +1229,196 @@
                 <a:ea typeface="Microsoft JhengHei UI" panose="020B0604030504040204" pitchFamily="34" charset="-120"/>
               </a:rPr>
               <a:t>6</a:t>
+            </a:fld>
+            <a:endParaRPr lang="zh-TW" altLang="en-US" dirty="0">
+              <a:latin typeface="Microsoft JhengHei UI" panose="020B0604030504040204" pitchFamily="34" charset="-120"/>
+              <a:ea typeface="Microsoft JhengHei UI" panose="020B0604030504040204" pitchFamily="34" charset="-120"/>
+            </a:endParaRPr>
+          </a:p>
+        </p:txBody>
+      </p:sp>
+    </p:spTree>
+    <p:extLst>
+      <p:ext uri="{BB962C8B-B14F-4D97-AF65-F5344CB8AC3E}">
+        <p14:creationId xmlns:p14="http://schemas.microsoft.com/office/powerpoint/2010/main" val="1937938796"/>
+      </p:ext>
+    </p:extLst>
+  </p:cSld>
+  <p:clrMapOvr>
+    <a:masterClrMapping/>
+  </p:clrMapOvr>
+</p:notes>
+</file>
+
+<file path=ppt/notesSlides/notesSlide7.xml><?xml version="1.0" encoding="utf-8"?>
+<p:notes xmlns:a="http://schemas.openxmlformats.org/drawingml/2006/main" xmlns:r="http://schemas.openxmlformats.org/officeDocument/2006/relationships" xmlns:p="http://schemas.openxmlformats.org/presentationml/2006/main">
+  <p:cSld>
+    <p:spTree>
+      <p:nvGrpSpPr>
+        <p:cNvPr id="1" name=""/>
+        <p:cNvGrpSpPr/>
+        <p:nvPr/>
+      </p:nvGrpSpPr>
+      <p:grpSpPr>
+        <a:xfrm>
+          <a:off x="0" y="0"/>
+          <a:ext cx="0" cy="0"/>
+          <a:chOff x="0" y="0"/>
+          <a:chExt cx="0" cy="0"/>
+        </a:xfrm>
+      </p:grpSpPr>
+      <p:sp>
+        <p:nvSpPr>
+          <p:cNvPr id="2" name="投影片影像預留位置 1"/>
+          <p:cNvSpPr>
+            <a:spLocks noGrp="1" noRot="1" noChangeAspect="1"/>
+          </p:cNvSpPr>
+          <p:nvPr>
+            <p:ph type="sldImg"/>
+          </p:nvPr>
+        </p:nvSpPr>
+        <p:spPr/>
+      </p:sp>
+      <p:sp>
+        <p:nvSpPr>
+          <p:cNvPr id="3" name="備忘稿預留位置 2"/>
+          <p:cNvSpPr>
+            <a:spLocks noGrp="1"/>
+          </p:cNvSpPr>
+          <p:nvPr>
+            <p:ph type="body" idx="1"/>
+          </p:nvPr>
+        </p:nvSpPr>
+        <p:spPr/>
+        <p:txBody>
+          <a:bodyPr rtlCol="0"/>
+          <a:lstStyle/>
+          <a:p>
+            <a:pPr rtl="0"/>
+            <a:endParaRPr lang="zh-TW" altLang="en-US" dirty="0">
+              <a:latin typeface="Microsoft JhengHei UI" panose="020B0604030504040204" pitchFamily="34" charset="-120"/>
+              <a:ea typeface="Microsoft JhengHei UI" panose="020B0604030504040204" pitchFamily="34" charset="-120"/>
+            </a:endParaRPr>
+          </a:p>
+        </p:txBody>
+      </p:sp>
+      <p:sp>
+        <p:nvSpPr>
+          <p:cNvPr id="4" name="投影片編號預留位置 3"/>
+          <p:cNvSpPr>
+            <a:spLocks noGrp="1"/>
+          </p:cNvSpPr>
+          <p:nvPr>
+            <p:ph type="sldNum" sz="quarter" idx="10"/>
+          </p:nvPr>
+        </p:nvSpPr>
+        <p:spPr/>
+        <p:txBody>
+          <a:bodyPr rtlCol="0"/>
+          <a:lstStyle/>
+          <a:p>
+            <a:pPr rtl="0"/>
+            <a:fld id="{4B725628-3A68-42F4-BA86-981817953149}" type="slidenum">
+              <a:rPr lang="en-US" altLang="zh-TW" smtClean="0">
+                <a:latin typeface="Microsoft JhengHei UI" panose="020B0604030504040204" pitchFamily="34" charset="-120"/>
+                <a:ea typeface="Microsoft JhengHei UI" panose="020B0604030504040204" pitchFamily="34" charset="-120"/>
+              </a:rPr>
+              <a:t>7</a:t>
+            </a:fld>
+            <a:endParaRPr lang="zh-TW" altLang="en-US" dirty="0">
+              <a:latin typeface="Microsoft JhengHei UI" panose="020B0604030504040204" pitchFamily="34" charset="-120"/>
+              <a:ea typeface="Microsoft JhengHei UI" panose="020B0604030504040204" pitchFamily="34" charset="-120"/>
+            </a:endParaRPr>
+          </a:p>
+        </p:txBody>
+      </p:sp>
+    </p:spTree>
+    <p:extLst>
+      <p:ext uri="{BB962C8B-B14F-4D97-AF65-F5344CB8AC3E}">
+        <p14:creationId xmlns:p14="http://schemas.microsoft.com/office/powerpoint/2010/main" val="316711049"/>
+      </p:ext>
+    </p:extLst>
+  </p:cSld>
+  <p:clrMapOvr>
+    <a:masterClrMapping/>
+  </p:clrMapOvr>
+</p:notes>
+</file>
+
+<file path=ppt/notesSlides/notesSlide8.xml><?xml version="1.0" encoding="utf-8"?>
+<p:notes xmlns:a="http://schemas.openxmlformats.org/drawingml/2006/main" xmlns:r="http://schemas.openxmlformats.org/officeDocument/2006/relationships" xmlns:p="http://schemas.openxmlformats.org/presentationml/2006/main">
+  <p:cSld>
+    <p:spTree>
+      <p:nvGrpSpPr>
+        <p:cNvPr id="1" name=""/>
+        <p:cNvGrpSpPr/>
+        <p:nvPr/>
+      </p:nvGrpSpPr>
+      <p:grpSpPr>
+        <a:xfrm>
+          <a:off x="0" y="0"/>
+          <a:ext cx="0" cy="0"/>
+          <a:chOff x="0" y="0"/>
+          <a:chExt cx="0" cy="0"/>
+        </a:xfrm>
+      </p:grpSpPr>
+      <p:sp>
+        <p:nvSpPr>
+          <p:cNvPr id="2" name="投影片影像預留位置 1"/>
+          <p:cNvSpPr>
+            <a:spLocks noGrp="1" noRot="1" noChangeAspect="1"/>
+          </p:cNvSpPr>
+          <p:nvPr>
+            <p:ph type="sldImg"/>
+          </p:nvPr>
+        </p:nvSpPr>
+        <p:spPr/>
+      </p:sp>
+      <p:sp>
+        <p:nvSpPr>
+          <p:cNvPr id="3" name="備忘稿預留位置 2"/>
+          <p:cNvSpPr>
+            <a:spLocks noGrp="1"/>
+          </p:cNvSpPr>
+          <p:nvPr>
+            <p:ph type="body" idx="1"/>
+          </p:nvPr>
+        </p:nvSpPr>
+        <p:spPr/>
+        <p:txBody>
+          <a:bodyPr rtlCol="0"/>
+          <a:lstStyle/>
+          <a:p>
+            <a:pPr rtl="0"/>
+            <a:endParaRPr lang="zh-TW" altLang="en-US" dirty="0">
+              <a:latin typeface="Microsoft JhengHei UI" panose="020B0604030504040204" pitchFamily="34" charset="-120"/>
+              <a:ea typeface="Microsoft JhengHei UI" panose="020B0604030504040204" pitchFamily="34" charset="-120"/>
+            </a:endParaRPr>
+          </a:p>
+        </p:txBody>
+      </p:sp>
+      <p:sp>
+        <p:nvSpPr>
+          <p:cNvPr id="4" name="投影片編號預留位置 3"/>
+          <p:cNvSpPr>
+            <a:spLocks noGrp="1"/>
+          </p:cNvSpPr>
+          <p:nvPr>
+            <p:ph type="sldNum" sz="quarter" idx="10"/>
+          </p:nvPr>
+        </p:nvSpPr>
+        <p:spPr/>
+        <p:txBody>
+          <a:bodyPr rtlCol="0"/>
+          <a:lstStyle/>
+          <a:p>
+            <a:pPr rtl="0"/>
+            <a:fld id="{4B725628-3A68-42F4-BA86-981817953149}" type="slidenum">
+              <a:rPr lang="en-US" altLang="zh-TW" smtClean="0">
+                <a:latin typeface="Microsoft JhengHei UI" panose="020B0604030504040204" pitchFamily="34" charset="-120"/>
+                <a:ea typeface="Microsoft JhengHei UI" panose="020B0604030504040204" pitchFamily="34" charset="-120"/>
+              </a:rPr>
+              <a:t>8</a:t>
             </a:fld>
             <a:endParaRPr lang="zh-TW" altLang="en-US" dirty="0">
               <a:latin typeface="Microsoft JhengHei UI" panose="020B0604030504040204" pitchFamily="34" charset="-120"/>
@@ -10044,7 +10236,7 @@
             <a:pPr rtl="0"/>
             <a:fld id="{1EE05C45-8EB5-41B2-9B41-7B2BD9B7DEEC}" type="datetime1">
               <a:rPr lang="zh-TW" altLang="en-US" noProof="0" smtClean="0"/>
-              <a:t>2021/10/12</a:t>
+              <a:t>2021/10/17</a:t>
             </a:fld>
             <a:endParaRPr lang="zh-TW" altLang="en-US" noProof="0" dirty="0"/>
           </a:p>
@@ -10250,7 +10442,7 @@
             <a:pPr rtl="0"/>
             <a:fld id="{F17D0BD1-4150-488B-822D-FAA2ED87235F}" type="datetime1">
               <a:rPr lang="zh-TW" altLang="en-US" noProof="0" smtClean="0"/>
-              <a:t>2021/10/12</a:t>
+              <a:t>2021/10/17</a:t>
             </a:fld>
             <a:endParaRPr lang="zh-TW" altLang="en-US" noProof="0" dirty="0"/>
           </a:p>
@@ -10429,7 +10621,7 @@
             <a:pPr rtl="0"/>
             <a:fld id="{56917129-5C2D-48BD-8F9D-5DD9AA52C80B}" type="datetime1">
               <a:rPr lang="zh-TW" altLang="en-US" noProof="0" smtClean="0"/>
-              <a:t>2021/10/12</a:t>
+              <a:t>2021/10/17</a:t>
             </a:fld>
             <a:endParaRPr lang="zh-TW" altLang="en-US" noProof="0" dirty="0"/>
           </a:p>
@@ -10633,7 +10825,7 @@
             <a:pPr rtl="0"/>
             <a:fld id="{226959E9-D711-4141-BC84-15DB177AD95C}" type="datetime1">
               <a:rPr lang="zh-TW" altLang="en-US" noProof="0" smtClean="0"/>
-              <a:t>2021/10/12</a:t>
+              <a:t>2021/10/17</a:t>
             </a:fld>
             <a:endParaRPr lang="zh-TW" altLang="en-US" noProof="0" dirty="0"/>
           </a:p>
@@ -19530,7 +19722,7 @@
             <a:pPr rtl="0"/>
             <a:fld id="{07A3C890-8623-4A1C-947B-A864EC59C0DD}" type="datetime1">
               <a:rPr lang="zh-TW" altLang="en-US" noProof="0" smtClean="0"/>
-              <a:t>2021/10/12</a:t>
+              <a:t>2021/10/17</a:t>
             </a:fld>
             <a:endParaRPr lang="zh-TW" altLang="en-US" noProof="0" dirty="0"/>
           </a:p>
@@ -19803,7 +19995,7 @@
             <a:pPr rtl="0"/>
             <a:fld id="{D5BE9075-3447-4FD3-8BC9-6412CF8C5B41}" type="datetime1">
               <a:rPr lang="zh-TW" altLang="en-US" noProof="0" smtClean="0"/>
-              <a:t>2021/10/12</a:t>
+              <a:t>2021/10/17</a:t>
             </a:fld>
             <a:endParaRPr lang="zh-TW" altLang="en-US" noProof="0" dirty="0"/>
           </a:p>
@@ -20276,7 +20468,7 @@
           <a:p>
             <a:fld id="{0F9BBEE5-55F8-45A3-AB6C-9C6112BE0C32}" type="datetime1">
               <a:rPr lang="zh-TW" altLang="en-US" noProof="0" smtClean="0"/>
-              <a:t>2021/10/12</a:t>
+              <a:t>2021/10/17</a:t>
             </a:fld>
             <a:endParaRPr lang="zh-TW" altLang="en-US" noProof="0" dirty="0"/>
           </a:p>
@@ -20406,7 +20598,7 @@
             <a:pPr rtl="0"/>
             <a:fld id="{CDEAE714-2E29-46F3-9C77-12416C9543F5}" type="datetime1">
               <a:rPr lang="zh-TW" altLang="en-US" noProof="0" smtClean="0"/>
-              <a:t>2021/10/12</a:t>
+              <a:t>2021/10/17</a:t>
             </a:fld>
             <a:endParaRPr lang="zh-TW" altLang="en-US" noProof="0" dirty="0"/>
           </a:p>
@@ -20499,7 +20691,7 @@
             <a:pPr rtl="0"/>
             <a:fld id="{8C77B25F-C5C5-4940-9B93-C7969EB742CA}" type="datetime1">
               <a:rPr lang="zh-TW" altLang="en-US" noProof="0" smtClean="0"/>
-              <a:t>2021/10/12</a:t>
+              <a:t>2021/10/17</a:t>
             </a:fld>
             <a:endParaRPr lang="zh-TW" altLang="en-US" noProof="0" dirty="0"/>
           </a:p>
@@ -20788,7 +20980,7 @@
             <a:pPr rtl="0"/>
             <a:fld id="{834BDAB7-BD48-40B7-93E5-DE7F01A31190}" type="datetime1">
               <a:rPr lang="zh-TW" altLang="en-US" noProof="0" smtClean="0"/>
-              <a:t>2021/10/12</a:t>
+              <a:t>2021/10/17</a:t>
             </a:fld>
             <a:endParaRPr lang="zh-TW" altLang="en-US" noProof="0" dirty="0"/>
           </a:p>
@@ -21068,7 +21260,7 @@
             <a:pPr rtl="0"/>
             <a:fld id="{00BDDE7C-E999-47D2-A35D-EE2C20E3497B}" type="datetime1">
               <a:rPr lang="zh-TW" altLang="en-US" noProof="0" smtClean="0"/>
-              <a:t>2021/10/12</a:t>
+              <a:t>2021/10/17</a:t>
             </a:fld>
             <a:endParaRPr lang="zh-TW" altLang="en-US" noProof="0" dirty="0"/>
           </a:p>
@@ -21315,7 +21507,7 @@
           <a:p>
             <a:fld id="{D22E2503-8843-448F-B01E-FCD9BA586A1F}" type="datetime1">
               <a:rPr lang="zh-TW" altLang="en-US" noProof="0" smtClean="0"/>
-              <a:t>2021/10/12</a:t>
+              <a:t>2021/10/17</a:t>
             </a:fld>
             <a:endParaRPr lang="zh-TW" altLang="en-US" noProof="0" dirty="0"/>
           </a:p>
@@ -21832,7 +22024,7 @@
                 <a16:creationId xmlns:a16="http://schemas.microsoft.com/office/drawing/2014/main" id="{2FDF0794-1B86-42B2-B8C7-F60123E638ED}"/>
               </a:ext>
               <a:ext uri="{C183D7F6-B498-43B3-948B-1728B52AA6E4}">
-                <adec:decorative xmlns:adec="http://schemas.microsoft.com/office/drawing/2017/decorative" xmlns="" val="1"/>
+                <adec:decorative xmlns:adec="http://schemas.microsoft.com/office/drawing/2017/decorative" val="1"/>
               </a:ext>
             </a:extLst>
           </p:cNvPr>
@@ -21898,7 +22090,7 @@
                 <a16:creationId xmlns:a16="http://schemas.microsoft.com/office/drawing/2014/main" id="{230BD1B1-AA22-48F1-B3ED-579CD284605D}"/>
               </a:ext>
               <a:ext uri="{C183D7F6-B498-43B3-948B-1728B52AA6E4}">
-                <adec:decorative xmlns:adec="http://schemas.microsoft.com/office/drawing/2017/decorative" xmlns="" val="1"/>
+                <adec:decorative xmlns:adec="http://schemas.microsoft.com/office/drawing/2017/decorative" val="1"/>
               </a:ext>
             </a:extLst>
           </p:cNvPr>
@@ -21930,7 +22122,7 @@
                 <a16:creationId xmlns:a16="http://schemas.microsoft.com/office/drawing/2014/main" id="{EAA48FC5-3C83-4F1B-BC33-DF0B588F8317}"/>
               </a:ext>
               <a:ext uri="{C183D7F6-B498-43B3-948B-1728B52AA6E4}">
-                <adec:decorative xmlns:adec="http://schemas.microsoft.com/office/drawing/2017/decorative" xmlns="" val="1"/>
+                <adec:decorative xmlns:adec="http://schemas.microsoft.com/office/drawing/2017/decorative" val="1"/>
               </a:ext>
             </a:extLst>
           </p:cNvPr>
@@ -22045,7 +22237,7 @@
                 <a16:creationId xmlns:a16="http://schemas.microsoft.com/office/drawing/2014/main" id="{62F01714-1A39-4194-BD47-8A9960C59985}"/>
               </a:ext>
               <a:ext uri="{C183D7F6-B498-43B3-948B-1728B52AA6E4}">
-                <adec:decorative xmlns:adec="http://schemas.microsoft.com/office/drawing/2017/decorative" xmlns="" val="1"/>
+                <adec:decorative xmlns:adec="http://schemas.microsoft.com/office/drawing/2017/decorative" val="1"/>
               </a:ext>
             </a:extLst>
           </p:cNvPr>
@@ -22375,6 +22567,39 @@
             </a:r>
           </a:p>
           <a:p>
+            <a:pPr marL="1028700" lvl="1" indent="-571500">
+              <a:buFont typeface="Arial" panose="020B0604020202020204" pitchFamily="34" charset="0"/>
+              <a:buChar char="•"/>
+            </a:pPr>
+            <a:r>
+              <a:rPr lang="en-US" altLang="zh-TW" sz="3600" dirty="0">
+                <a:solidFill>
+                  <a:schemeClr val="accent2"/>
+                </a:solidFill>
+              </a:rPr>
+              <a:t>XML content compare.</a:t>
+            </a:r>
+          </a:p>
+          <a:p>
+            <a:pPr marL="1028700" lvl="1" indent="-571500">
+              <a:buFont typeface="Arial" panose="020B0604020202020204" pitchFamily="34" charset="0"/>
+              <a:buChar char="•"/>
+            </a:pPr>
+            <a:r>
+              <a:rPr lang="en-US" altLang="zh-TW" sz="3600" dirty="0">
+                <a:solidFill>
+                  <a:schemeClr val="tx1"/>
+                </a:solidFill>
+              </a:rPr>
+              <a:t>Parse XML &amp; JSON.</a:t>
+            </a:r>
+            <a:endParaRPr lang="en-US" altLang="zh-TW" sz="3600" dirty="0">
+              <a:solidFill>
+                <a:schemeClr val="accent2"/>
+              </a:solidFill>
+            </a:endParaRPr>
+          </a:p>
+          <a:p>
             <a:r>
               <a:rPr lang="en-US" altLang="zh-TW" sz="3600" dirty="0">
                 <a:solidFill>
@@ -22382,6 +22607,56 @@
                 </a:solidFill>
               </a:rPr>
               <a:t>3. Exception</a:t>
+            </a:r>
+          </a:p>
+          <a:p>
+            <a:r>
+              <a:rPr lang="en-US" altLang="zh-TW" sz="3600" dirty="0">
+                <a:solidFill>
+                  <a:schemeClr val="tx1"/>
+                </a:solidFill>
+              </a:rPr>
+              <a:t>4. </a:t>
+            </a:r>
+            <a:r>
+              <a:rPr lang="en-US" altLang="zh-TW" sz="3600" dirty="0">
+                <a:solidFill>
+                  <a:schemeClr val="accent2"/>
+                </a:solidFill>
+              </a:rPr>
+              <a:t>Methods</a:t>
+            </a:r>
+            <a:r>
+              <a:rPr lang="en-US" altLang="zh-TW" sz="3600" dirty="0">
+                <a:solidFill>
+                  <a:schemeClr val="tx1"/>
+                </a:solidFill>
+              </a:rPr>
+              <a:t> </a:t>
+            </a:r>
+            <a:r>
+              <a:rPr lang="en-US" altLang="zh-TW" sz="3600" dirty="0">
+                <a:solidFill>
+                  <a:schemeClr val="accent2"/>
+                </a:solidFill>
+              </a:rPr>
+              <a:t>&amp;</a:t>
+            </a:r>
+            <a:r>
+              <a:rPr lang="en-US" altLang="zh-TW" sz="3600" dirty="0">
+                <a:solidFill>
+                  <a:schemeClr val="tx1"/>
+                </a:solidFill>
+              </a:rPr>
+              <a:t> </a:t>
+            </a:r>
+            <a:r>
+              <a:rPr lang="en-US" altLang="zh-TW" sz="3600" dirty="0">
+                <a:solidFill>
+                  <a:schemeClr val="accent2"/>
+                </a:solidFill>
+              </a:rPr>
+              <a:t>Result</a:t>
             </a:r>
           </a:p>
           <a:p>
@@ -22906,7 +23181,3263 @@
                 <a:latin typeface="Yu Gothic UI" panose="020B0500000000000000" pitchFamily="34" charset="-128"/>
                 <a:ea typeface="Yu Gothic UI" panose="020B0500000000000000" pitchFamily="34" charset="-128"/>
               </a:rPr>
-              <a:t>Flow Chart</a:t>
+              <a:t>Flow Chart – </a:t>
+            </a:r>
+            <a:r>
+              <a:rPr lang="en-US" altLang="zh-TW" sz="2800" b="1" dirty="0">
+                <a:ln/>
+                <a:pattFill prst="dkUpDiag">
+                  <a:fgClr>
+                    <a:schemeClr val="bg1">
+                      <a:lumMod val="50000"/>
+                    </a:schemeClr>
+                  </a:fgClr>
+                  <a:bgClr>
+                    <a:schemeClr val="tx1">
+                      <a:lumMod val="75000"/>
+                      <a:lumOff val="25000"/>
+                    </a:schemeClr>
+                  </a:bgClr>
+                </a:pattFill>
+                <a:effectLst>
+                  <a:outerShdw blurRad="38100" dist="19050" dir="2700000" algn="tl" rotWithShape="0">
+                    <a:schemeClr val="dk1">
+                      <a:lumMod val="50000"/>
+                      <a:alpha val="40000"/>
+                    </a:schemeClr>
+                  </a:outerShdw>
+                </a:effectLst>
+                <a:latin typeface="Yu Gothic UI" panose="020B0500000000000000" pitchFamily="34" charset="-128"/>
+                <a:ea typeface="Yu Gothic UI" panose="020B0500000000000000" pitchFamily="34" charset="-128"/>
+              </a:rPr>
+              <a:t>XML content compare </a:t>
+            </a:r>
+            <a:endParaRPr lang="zh-TW" altLang="en-US" sz="4800" b="1" dirty="0">
+              <a:ln/>
+              <a:pattFill prst="dkUpDiag">
+                <a:fgClr>
+                  <a:schemeClr val="bg1">
+                    <a:lumMod val="50000"/>
+                  </a:schemeClr>
+                </a:fgClr>
+                <a:bgClr>
+                  <a:schemeClr val="tx1">
+                    <a:lumMod val="75000"/>
+                    <a:lumOff val="25000"/>
+                  </a:schemeClr>
+                </a:bgClr>
+              </a:pattFill>
+              <a:effectLst>
+                <a:outerShdw blurRad="38100" dist="19050" dir="2700000" algn="tl" rotWithShape="0">
+                  <a:schemeClr val="dk1">
+                    <a:lumMod val="50000"/>
+                    <a:alpha val="40000"/>
+                  </a:schemeClr>
+                </a:outerShdw>
+              </a:effectLst>
+              <a:latin typeface="Yu Gothic UI" panose="020B0500000000000000" pitchFamily="34" charset="-128"/>
+              <a:ea typeface="Yu Gothic UI" panose="020B0500000000000000" pitchFamily="34" charset="-128"/>
+            </a:endParaRPr>
+          </a:p>
+        </p:txBody>
+      </p:sp>
+      <p:sp>
+        <p:nvSpPr>
+          <p:cNvPr id="11" name="流程圖: 程序 10">
+            <a:extLst>
+              <a:ext uri="{FF2B5EF4-FFF2-40B4-BE49-F238E27FC236}">
+                <a16:creationId xmlns:a16="http://schemas.microsoft.com/office/drawing/2014/main" id="{430CC54B-EEDD-4E4A-ABE7-EEEC1FAA72D2}"/>
+              </a:ext>
+            </a:extLst>
+          </p:cNvPr>
+          <p:cNvSpPr/>
+          <p:nvPr/>
+        </p:nvSpPr>
+        <p:spPr>
+          <a:xfrm>
+            <a:off x="4383586" y="1974114"/>
+            <a:ext cx="1083275" cy="620262"/>
+          </a:xfrm>
+          <a:prstGeom prst="flowChartProcess">
+            <a:avLst/>
+          </a:prstGeom>
+        </p:spPr>
+        <p:style>
+          <a:lnRef idx="1">
+            <a:schemeClr val="dk1"/>
+          </a:lnRef>
+          <a:fillRef idx="2">
+            <a:schemeClr val="dk1"/>
+          </a:fillRef>
+          <a:effectRef idx="1">
+            <a:schemeClr val="dk1"/>
+          </a:effectRef>
+          <a:fontRef idx="minor">
+            <a:schemeClr val="dk1"/>
+          </a:fontRef>
+        </p:style>
+        <p:txBody>
+          <a:bodyPr rtlCol="0" anchor="ctr"/>
+          <a:lstStyle/>
+          <a:p>
+            <a:pPr algn="ctr"/>
+            <a:r>
+              <a:rPr lang="en-US" altLang="zh-TW" dirty="0"/>
+              <a:t>MD5</a:t>
+            </a:r>
+          </a:p>
+          <a:p>
+            <a:pPr algn="ctr"/>
+            <a:r>
+              <a:rPr lang="en-US" altLang="zh-TW" dirty="0"/>
+              <a:t>Checksum</a:t>
+            </a:r>
+          </a:p>
+        </p:txBody>
+      </p:sp>
+      <p:sp>
+        <p:nvSpPr>
+          <p:cNvPr id="29" name="流程圖: 程序 28">
+            <a:extLst>
+              <a:ext uri="{FF2B5EF4-FFF2-40B4-BE49-F238E27FC236}">
+                <a16:creationId xmlns:a16="http://schemas.microsoft.com/office/drawing/2014/main" id="{F033B335-98A1-4831-BF43-6D5BF557269F}"/>
+              </a:ext>
+            </a:extLst>
+          </p:cNvPr>
+          <p:cNvSpPr/>
+          <p:nvPr/>
+        </p:nvSpPr>
+        <p:spPr>
+          <a:xfrm>
+            <a:off x="5238795" y="4034986"/>
+            <a:ext cx="1083275" cy="542757"/>
+          </a:xfrm>
+          <a:prstGeom prst="flowChartProcess">
+            <a:avLst/>
+          </a:prstGeom>
+        </p:spPr>
+        <p:style>
+          <a:lnRef idx="1">
+            <a:schemeClr val="dk1"/>
+          </a:lnRef>
+          <a:fillRef idx="2">
+            <a:schemeClr val="dk1"/>
+          </a:fillRef>
+          <a:effectRef idx="1">
+            <a:schemeClr val="dk1"/>
+          </a:effectRef>
+          <a:fontRef idx="minor">
+            <a:schemeClr val="dk1"/>
+          </a:fontRef>
+        </p:style>
+        <p:txBody>
+          <a:bodyPr rot="0" spcFirstLastPara="0" vertOverflow="overflow" horzOverflow="overflow" vert="horz" wrap="square" lIns="91440" tIns="45720" rIns="91440" bIns="45720" numCol="1" spcCol="0" rtlCol="0" fromWordArt="0" anchor="ctr" anchorCtr="0" forceAA="0" compatLnSpc="1">
+            <a:prstTxWarp prst="textNoShape">
+              <a:avLst/>
+            </a:prstTxWarp>
+            <a:noAutofit/>
+          </a:bodyPr>
+          <a:lstStyle/>
+          <a:p>
+            <a:pPr algn="ctr"/>
+            <a:r>
+              <a:rPr lang="en-US" altLang="zh-TW" dirty="0"/>
+              <a:t> XML</a:t>
+            </a:r>
+          </a:p>
+          <a:p>
+            <a:pPr algn="ctr"/>
+            <a:r>
+              <a:rPr lang="en-US" altLang="zh-TW" dirty="0"/>
+              <a:t>Parser</a:t>
+            </a:r>
+            <a:endParaRPr lang="zh-TW" altLang="en-US" dirty="0"/>
+          </a:p>
+        </p:txBody>
+      </p:sp>
+      <p:sp>
+        <p:nvSpPr>
+          <p:cNvPr id="13" name="流程圖: 決策 12">
+            <a:extLst>
+              <a:ext uri="{FF2B5EF4-FFF2-40B4-BE49-F238E27FC236}">
+                <a16:creationId xmlns:a16="http://schemas.microsoft.com/office/drawing/2014/main" id="{2A3AC1D0-BD1B-4F4B-90B4-51AE4F66C89E}"/>
+              </a:ext>
+            </a:extLst>
+          </p:cNvPr>
+          <p:cNvSpPr/>
+          <p:nvPr/>
+        </p:nvSpPr>
+        <p:spPr>
+          <a:xfrm>
+            <a:off x="1416493" y="2859081"/>
+            <a:ext cx="1706779" cy="1211481"/>
+          </a:xfrm>
+          <a:prstGeom prst="flowChartDecision">
+            <a:avLst/>
+          </a:prstGeom>
+        </p:spPr>
+        <p:style>
+          <a:lnRef idx="1">
+            <a:schemeClr val="dk1"/>
+          </a:lnRef>
+          <a:fillRef idx="2">
+            <a:schemeClr val="dk1"/>
+          </a:fillRef>
+          <a:effectRef idx="1">
+            <a:schemeClr val="dk1"/>
+          </a:effectRef>
+          <a:fontRef idx="minor">
+            <a:schemeClr val="dk1"/>
+          </a:fontRef>
+        </p:style>
+        <p:txBody>
+          <a:bodyPr rot="0" spcFirstLastPara="0" vertOverflow="overflow" horzOverflow="overflow" vert="horz" wrap="square" lIns="91440" tIns="45720" rIns="91440" bIns="45720" numCol="1" spcCol="0" rtlCol="0" fromWordArt="0" anchor="ctr" anchorCtr="0" forceAA="0" compatLnSpc="1">
+            <a:prstTxWarp prst="textNoShape">
+              <a:avLst/>
+            </a:prstTxWarp>
+            <a:noAutofit/>
+          </a:bodyPr>
+          <a:lstStyle/>
+          <a:p>
+            <a:pPr algn="ctr"/>
+            <a:endParaRPr lang="zh-TW" altLang="en-US" sz="1200" dirty="0">
+              <a:solidFill>
+                <a:schemeClr val="dk1"/>
+              </a:solidFill>
+            </a:endParaRPr>
+          </a:p>
+        </p:txBody>
+      </p:sp>
+      <p:cxnSp>
+        <p:nvCxnSpPr>
+          <p:cNvPr id="34" name="直線單箭頭接點 33">
+            <a:extLst>
+              <a:ext uri="{FF2B5EF4-FFF2-40B4-BE49-F238E27FC236}">
+                <a16:creationId xmlns:a16="http://schemas.microsoft.com/office/drawing/2014/main" id="{53C4EF03-64F2-44DA-8009-6774D29B31D0}"/>
+              </a:ext>
+            </a:extLst>
+          </p:cNvPr>
+          <p:cNvCxnSpPr>
+            <a:cxnSpLocks/>
+          </p:cNvCxnSpPr>
+          <p:nvPr/>
+        </p:nvCxnSpPr>
+        <p:spPr>
+          <a:xfrm>
+            <a:off x="2256343" y="4287056"/>
+            <a:ext cx="901482" cy="0"/>
+          </a:xfrm>
+          <a:prstGeom prst="straightConnector1">
+            <a:avLst/>
+          </a:prstGeom>
+          <a:ln>
+            <a:headEnd type="none" w="med" len="med"/>
+            <a:tailEnd type="triangle" w="med" len="med"/>
+          </a:ln>
+        </p:spPr>
+        <p:style>
+          <a:lnRef idx="3">
+            <a:schemeClr val="accent2"/>
+          </a:lnRef>
+          <a:fillRef idx="0">
+            <a:schemeClr val="accent2"/>
+          </a:fillRef>
+          <a:effectRef idx="2">
+            <a:schemeClr val="accent2"/>
+          </a:effectRef>
+          <a:fontRef idx="minor">
+            <a:schemeClr val="tx1"/>
+          </a:fontRef>
+        </p:style>
+      </p:cxnSp>
+      <p:cxnSp>
+        <p:nvCxnSpPr>
+          <p:cNvPr id="36" name="直線單箭頭接點 35">
+            <a:extLst>
+              <a:ext uri="{FF2B5EF4-FFF2-40B4-BE49-F238E27FC236}">
+                <a16:creationId xmlns:a16="http://schemas.microsoft.com/office/drawing/2014/main" id="{9A4D16F1-1148-4A0C-BB7D-B7F126E3CE4F}"/>
+              </a:ext>
+            </a:extLst>
+          </p:cNvPr>
+          <p:cNvCxnSpPr>
+            <a:cxnSpLocks/>
+            <a:endCxn id="13" idx="1"/>
+          </p:cNvCxnSpPr>
+          <p:nvPr/>
+        </p:nvCxnSpPr>
+        <p:spPr>
+          <a:xfrm>
+            <a:off x="852883" y="3464821"/>
+            <a:ext cx="563610" cy="1"/>
+          </a:xfrm>
+          <a:prstGeom prst="straightConnector1">
+            <a:avLst/>
+          </a:prstGeom>
+          <a:ln>
+            <a:headEnd type="none" w="med" len="med"/>
+            <a:tailEnd type="none" w="med" len="med"/>
+          </a:ln>
+        </p:spPr>
+        <p:style>
+          <a:lnRef idx="3">
+            <a:schemeClr val="accent2"/>
+          </a:lnRef>
+          <a:fillRef idx="0">
+            <a:schemeClr val="accent2"/>
+          </a:fillRef>
+          <a:effectRef idx="2">
+            <a:schemeClr val="accent2"/>
+          </a:effectRef>
+          <a:fontRef idx="minor">
+            <a:schemeClr val="tx1"/>
+          </a:fontRef>
+        </p:style>
+      </p:cxnSp>
+      <p:cxnSp>
+        <p:nvCxnSpPr>
+          <p:cNvPr id="44" name="直線單箭頭接點 43">
+            <a:extLst>
+              <a:ext uri="{FF2B5EF4-FFF2-40B4-BE49-F238E27FC236}">
+                <a16:creationId xmlns:a16="http://schemas.microsoft.com/office/drawing/2014/main" id="{910936DD-7B9C-4E10-A1F0-93E48F047285}"/>
+              </a:ext>
+            </a:extLst>
+          </p:cNvPr>
+          <p:cNvCxnSpPr>
+            <a:cxnSpLocks/>
+          </p:cNvCxnSpPr>
+          <p:nvPr/>
+        </p:nvCxnSpPr>
+        <p:spPr>
+          <a:xfrm>
+            <a:off x="5466860" y="2276337"/>
+            <a:ext cx="358346" cy="4025"/>
+          </a:xfrm>
+          <a:prstGeom prst="straightConnector1">
+            <a:avLst/>
+          </a:prstGeom>
+          <a:ln>
+            <a:headEnd type="none" w="med" len="med"/>
+            <a:tailEnd type="triangle" w="med" len="med"/>
+          </a:ln>
+        </p:spPr>
+        <p:style>
+          <a:lnRef idx="3">
+            <a:schemeClr val="accent2"/>
+          </a:lnRef>
+          <a:fillRef idx="0">
+            <a:schemeClr val="accent2"/>
+          </a:fillRef>
+          <a:effectRef idx="2">
+            <a:schemeClr val="accent2"/>
+          </a:effectRef>
+          <a:fontRef idx="minor">
+            <a:schemeClr val="tx1"/>
+          </a:fontRef>
+        </p:style>
+      </p:cxnSp>
+      <p:sp>
+        <p:nvSpPr>
+          <p:cNvPr id="41" name="流程圖: 程序 40">
+            <a:extLst>
+              <a:ext uri="{FF2B5EF4-FFF2-40B4-BE49-F238E27FC236}">
+                <a16:creationId xmlns:a16="http://schemas.microsoft.com/office/drawing/2014/main" id="{49C3DF60-C38F-4F3B-AA44-5A37A632A69C}"/>
+              </a:ext>
+            </a:extLst>
+          </p:cNvPr>
+          <p:cNvSpPr/>
+          <p:nvPr/>
+        </p:nvSpPr>
+        <p:spPr>
+          <a:xfrm>
+            <a:off x="5230490" y="4781213"/>
+            <a:ext cx="1099886" cy="628841"/>
+          </a:xfrm>
+          <a:prstGeom prst="flowChartProcess">
+            <a:avLst/>
+          </a:prstGeom>
+          <a:effectLst>
+            <a:outerShdw blurRad="50800" dist="38100" dir="2700000" algn="tl" rotWithShape="0">
+              <a:prstClr val="black">
+                <a:alpha val="40000"/>
+              </a:prstClr>
+            </a:outerShdw>
+          </a:effectLst>
+        </p:spPr>
+        <p:style>
+          <a:lnRef idx="1">
+            <a:schemeClr val="accent2"/>
+          </a:lnRef>
+          <a:fillRef idx="2">
+            <a:schemeClr val="accent2"/>
+          </a:fillRef>
+          <a:effectRef idx="1">
+            <a:schemeClr val="accent2"/>
+          </a:effectRef>
+          <a:fontRef idx="minor">
+            <a:schemeClr val="dk1"/>
+          </a:fontRef>
+        </p:style>
+        <p:txBody>
+          <a:bodyPr rtlCol="0" anchor="ctr"/>
+          <a:lstStyle/>
+          <a:p>
+            <a:pPr algn="ctr"/>
+            <a:r>
+              <a:rPr lang="en-US" altLang="zh-TW" sz="1200" dirty="0"/>
+              <a:t>import </a:t>
+            </a:r>
+            <a:r>
+              <a:rPr lang="en-US" altLang="zh-TW" sz="1200" dirty="0" err="1"/>
+              <a:t>xml.etree.ElementTree</a:t>
+            </a:r>
+            <a:endParaRPr lang="en-US" altLang="zh-TW" sz="1200" dirty="0"/>
+          </a:p>
+        </p:txBody>
+      </p:sp>
+      <p:sp>
+        <p:nvSpPr>
+          <p:cNvPr id="42" name="箭號: 向上 41">
+            <a:extLst>
+              <a:ext uri="{FF2B5EF4-FFF2-40B4-BE49-F238E27FC236}">
+                <a16:creationId xmlns:a16="http://schemas.microsoft.com/office/drawing/2014/main" id="{B42F1C95-35D7-4D10-8AC9-B8C04442E005}"/>
+              </a:ext>
+            </a:extLst>
+          </p:cNvPr>
+          <p:cNvSpPr/>
+          <p:nvPr/>
+        </p:nvSpPr>
+        <p:spPr>
+          <a:xfrm>
+            <a:off x="5677393" y="4605859"/>
+            <a:ext cx="189468" cy="155381"/>
+          </a:xfrm>
+          <a:prstGeom prst="upArrow">
+            <a:avLst/>
+          </a:prstGeom>
+        </p:spPr>
+        <p:style>
+          <a:lnRef idx="1">
+            <a:schemeClr val="dk1"/>
+          </a:lnRef>
+          <a:fillRef idx="2">
+            <a:schemeClr val="dk1"/>
+          </a:fillRef>
+          <a:effectRef idx="1">
+            <a:schemeClr val="dk1"/>
+          </a:effectRef>
+          <a:fontRef idx="minor">
+            <a:schemeClr val="dk1"/>
+          </a:fontRef>
+        </p:style>
+        <p:txBody>
+          <a:bodyPr rtlCol="0" anchor="ctr"/>
+          <a:lstStyle/>
+          <a:p>
+            <a:pPr algn="ctr"/>
+            <a:endParaRPr lang="zh-TW" altLang="en-US"/>
+          </a:p>
+        </p:txBody>
+      </p:sp>
+      <p:sp>
+        <p:nvSpPr>
+          <p:cNvPr id="55" name="流程圖: 程序 54">
+            <a:extLst>
+              <a:ext uri="{FF2B5EF4-FFF2-40B4-BE49-F238E27FC236}">
+                <a16:creationId xmlns:a16="http://schemas.microsoft.com/office/drawing/2014/main" id="{6AC99403-B538-43F1-8A6F-B8845B4F8CA5}"/>
+              </a:ext>
+            </a:extLst>
+          </p:cNvPr>
+          <p:cNvSpPr/>
+          <p:nvPr/>
+        </p:nvSpPr>
+        <p:spPr>
+          <a:xfrm>
+            <a:off x="8801846" y="2211039"/>
+            <a:ext cx="1884626" cy="597173"/>
+          </a:xfrm>
+          <a:prstGeom prst="flowChartProcess">
+            <a:avLst/>
+          </a:prstGeom>
+        </p:spPr>
+        <p:style>
+          <a:lnRef idx="1">
+            <a:schemeClr val="dk1"/>
+          </a:lnRef>
+          <a:fillRef idx="2">
+            <a:schemeClr val="dk1"/>
+          </a:fillRef>
+          <a:effectRef idx="1">
+            <a:schemeClr val="dk1"/>
+          </a:effectRef>
+          <a:fontRef idx="minor">
+            <a:schemeClr val="dk1"/>
+          </a:fontRef>
+        </p:style>
+        <p:txBody>
+          <a:bodyPr rtlCol="0" anchor="ctr"/>
+          <a:lstStyle/>
+          <a:p>
+            <a:pPr algn="ctr"/>
+            <a:r>
+              <a:rPr lang="en-US" altLang="zh-TW" sz="1400" dirty="0"/>
+              <a:t>Take one character at a time from the 1</a:t>
+            </a:r>
+            <a:r>
+              <a:rPr lang="en-US" altLang="zh-TW" sz="1400" baseline="30000" dirty="0"/>
+              <a:t>st</a:t>
+            </a:r>
+            <a:r>
+              <a:rPr lang="en-US" altLang="zh-TW" sz="1400" dirty="0"/>
+              <a:t> content and the 2</a:t>
+            </a:r>
+            <a:r>
+              <a:rPr lang="en-US" altLang="zh-TW" sz="1400" baseline="30000" dirty="0"/>
+              <a:t>nd</a:t>
+            </a:r>
+            <a:r>
+              <a:rPr lang="en-US" altLang="zh-TW" sz="1400" dirty="0"/>
+              <a:t> content</a:t>
+            </a:r>
+            <a:endParaRPr lang="zh-TW" altLang="en-US" sz="1400" dirty="0"/>
+          </a:p>
+        </p:txBody>
+      </p:sp>
+      <p:cxnSp>
+        <p:nvCxnSpPr>
+          <p:cNvPr id="60" name="直線單箭頭接點 59">
+            <a:extLst>
+              <a:ext uri="{FF2B5EF4-FFF2-40B4-BE49-F238E27FC236}">
+                <a16:creationId xmlns:a16="http://schemas.microsoft.com/office/drawing/2014/main" id="{E36D8430-3553-40FA-9811-DBA5D00082D0}"/>
+              </a:ext>
+            </a:extLst>
+          </p:cNvPr>
+          <p:cNvCxnSpPr>
+            <a:cxnSpLocks/>
+          </p:cNvCxnSpPr>
+          <p:nvPr/>
+        </p:nvCxnSpPr>
+        <p:spPr>
+          <a:xfrm>
+            <a:off x="6309653" y="4298119"/>
+            <a:ext cx="358346" cy="4025"/>
+          </a:xfrm>
+          <a:prstGeom prst="straightConnector1">
+            <a:avLst/>
+          </a:prstGeom>
+          <a:ln>
+            <a:headEnd type="none" w="med" len="med"/>
+            <a:tailEnd type="triangle" w="med" len="med"/>
+          </a:ln>
+        </p:spPr>
+        <p:style>
+          <a:lnRef idx="3">
+            <a:schemeClr val="accent2"/>
+          </a:lnRef>
+          <a:fillRef idx="0">
+            <a:schemeClr val="accent2"/>
+          </a:fillRef>
+          <a:effectRef idx="2">
+            <a:schemeClr val="accent2"/>
+          </a:effectRef>
+          <a:fontRef idx="minor">
+            <a:schemeClr val="tx1"/>
+          </a:fontRef>
+        </p:style>
+      </p:cxnSp>
+      <p:sp>
+        <p:nvSpPr>
+          <p:cNvPr id="52" name="矩形 51">
+            <a:extLst>
+              <a:ext uri="{FF2B5EF4-FFF2-40B4-BE49-F238E27FC236}">
+                <a16:creationId xmlns:a16="http://schemas.microsoft.com/office/drawing/2014/main" id="{4AC08139-7DBB-45B4-80E6-F15C71B64F4D}"/>
+              </a:ext>
+            </a:extLst>
+          </p:cNvPr>
+          <p:cNvSpPr/>
+          <p:nvPr/>
+        </p:nvSpPr>
+        <p:spPr>
+          <a:xfrm>
+            <a:off x="2266813" y="4014079"/>
+            <a:ext cx="338554" cy="276999"/>
+          </a:xfrm>
+          <a:prstGeom prst="rect">
+            <a:avLst/>
+          </a:prstGeom>
+        </p:spPr>
+        <p:txBody>
+          <a:bodyPr wrap="none">
+            <a:spAutoFit/>
+          </a:bodyPr>
+          <a:lstStyle/>
+          <a:p>
+            <a:r>
+              <a:rPr lang="en-US" altLang="zh-TW" sz="1200" dirty="0">
+                <a:solidFill>
+                  <a:schemeClr val="dk1"/>
+                </a:solidFill>
+                <a:latin typeface="Times New Roman" panose="02020603050405020304" pitchFamily="18" charset="0"/>
+                <a:cs typeface="Times New Roman" panose="02020603050405020304" pitchFamily="18" charset="0"/>
+              </a:rPr>
+              <a:t>②</a:t>
+            </a:r>
+            <a:endParaRPr lang="zh-TW" altLang="en-US" sz="1200" dirty="0"/>
+          </a:p>
+        </p:txBody>
+      </p:sp>
+      <p:cxnSp>
+        <p:nvCxnSpPr>
+          <p:cNvPr id="66" name="直線單箭頭接點 65">
+            <a:extLst>
+              <a:ext uri="{FF2B5EF4-FFF2-40B4-BE49-F238E27FC236}">
+                <a16:creationId xmlns:a16="http://schemas.microsoft.com/office/drawing/2014/main" id="{D3579F4C-1E73-494A-8118-A59E1CA18EE7}"/>
+              </a:ext>
+            </a:extLst>
+          </p:cNvPr>
+          <p:cNvCxnSpPr>
+            <a:cxnSpLocks/>
+          </p:cNvCxnSpPr>
+          <p:nvPr/>
+        </p:nvCxnSpPr>
+        <p:spPr>
+          <a:xfrm>
+            <a:off x="7759942" y="4287056"/>
+            <a:ext cx="288037" cy="0"/>
+          </a:xfrm>
+          <a:prstGeom prst="straightConnector1">
+            <a:avLst/>
+          </a:prstGeom>
+          <a:ln>
+            <a:headEnd type="none" w="med" len="med"/>
+            <a:tailEnd type="none" w="med" len="med"/>
+          </a:ln>
+        </p:spPr>
+        <p:style>
+          <a:lnRef idx="3">
+            <a:schemeClr val="accent2"/>
+          </a:lnRef>
+          <a:fillRef idx="0">
+            <a:schemeClr val="accent2"/>
+          </a:fillRef>
+          <a:effectRef idx="2">
+            <a:schemeClr val="accent2"/>
+          </a:effectRef>
+          <a:fontRef idx="minor">
+            <a:schemeClr val="tx1"/>
+          </a:fontRef>
+        </p:style>
+      </p:cxnSp>
+      <p:cxnSp>
+        <p:nvCxnSpPr>
+          <p:cNvPr id="67" name="直線接點 66">
+            <a:extLst>
+              <a:ext uri="{FF2B5EF4-FFF2-40B4-BE49-F238E27FC236}">
+                <a16:creationId xmlns:a16="http://schemas.microsoft.com/office/drawing/2014/main" id="{D5259FF0-90D5-4DF7-90FC-5E720F625713}"/>
+              </a:ext>
+            </a:extLst>
+          </p:cNvPr>
+          <p:cNvCxnSpPr>
+            <a:cxnSpLocks/>
+          </p:cNvCxnSpPr>
+          <p:nvPr/>
+        </p:nvCxnSpPr>
+        <p:spPr>
+          <a:xfrm>
+            <a:off x="8047979" y="1925904"/>
+            <a:ext cx="0" cy="2375798"/>
+          </a:xfrm>
+          <a:prstGeom prst="line">
+            <a:avLst/>
+          </a:prstGeom>
+        </p:spPr>
+        <p:style>
+          <a:lnRef idx="3">
+            <a:schemeClr val="accent2"/>
+          </a:lnRef>
+          <a:fillRef idx="0">
+            <a:schemeClr val="accent2"/>
+          </a:fillRef>
+          <a:effectRef idx="2">
+            <a:schemeClr val="accent2"/>
+          </a:effectRef>
+          <a:fontRef idx="minor">
+            <a:schemeClr val="tx1"/>
+          </a:fontRef>
+        </p:style>
+      </p:cxnSp>
+      <p:cxnSp>
+        <p:nvCxnSpPr>
+          <p:cNvPr id="68" name="直線單箭頭接點 67">
+            <a:extLst>
+              <a:ext uri="{FF2B5EF4-FFF2-40B4-BE49-F238E27FC236}">
+                <a16:creationId xmlns:a16="http://schemas.microsoft.com/office/drawing/2014/main" id="{A7D6DA1C-9AF1-488D-B56A-508722DE596A}"/>
+              </a:ext>
+            </a:extLst>
+          </p:cNvPr>
+          <p:cNvCxnSpPr>
+            <a:cxnSpLocks/>
+          </p:cNvCxnSpPr>
+          <p:nvPr/>
+        </p:nvCxnSpPr>
+        <p:spPr>
+          <a:xfrm>
+            <a:off x="8047979" y="1938377"/>
+            <a:ext cx="1700359" cy="0"/>
+          </a:xfrm>
+          <a:prstGeom prst="straightConnector1">
+            <a:avLst/>
+          </a:prstGeom>
+          <a:ln>
+            <a:headEnd type="none" w="med" len="med"/>
+            <a:tailEnd type="none" w="med" len="med"/>
+          </a:ln>
+        </p:spPr>
+        <p:style>
+          <a:lnRef idx="3">
+            <a:schemeClr val="accent2"/>
+          </a:lnRef>
+          <a:fillRef idx="0">
+            <a:schemeClr val="accent2"/>
+          </a:fillRef>
+          <a:effectRef idx="2">
+            <a:schemeClr val="accent2"/>
+          </a:effectRef>
+          <a:fontRef idx="minor">
+            <a:schemeClr val="tx1"/>
+          </a:fontRef>
+        </p:style>
+      </p:cxnSp>
+      <p:cxnSp>
+        <p:nvCxnSpPr>
+          <p:cNvPr id="43" name="直線單箭頭接點 42">
+            <a:extLst>
+              <a:ext uri="{FF2B5EF4-FFF2-40B4-BE49-F238E27FC236}">
+                <a16:creationId xmlns:a16="http://schemas.microsoft.com/office/drawing/2014/main" id="{AAA416E9-34F4-499C-98CA-C2865585B581}"/>
+              </a:ext>
+            </a:extLst>
+          </p:cNvPr>
+          <p:cNvCxnSpPr>
+            <a:cxnSpLocks/>
+          </p:cNvCxnSpPr>
+          <p:nvPr/>
+        </p:nvCxnSpPr>
+        <p:spPr>
+          <a:xfrm>
+            <a:off x="2275079" y="2627767"/>
+            <a:ext cx="0" cy="249889"/>
+          </a:xfrm>
+          <a:prstGeom prst="straightConnector1">
+            <a:avLst/>
+          </a:prstGeom>
+          <a:ln>
+            <a:headEnd type="none" w="med" len="med"/>
+            <a:tailEnd type="triangle" w="med" len="med"/>
+          </a:ln>
+        </p:spPr>
+        <p:style>
+          <a:lnRef idx="3">
+            <a:schemeClr val="accent2"/>
+          </a:lnRef>
+          <a:fillRef idx="0">
+            <a:schemeClr val="accent2"/>
+          </a:fillRef>
+          <a:effectRef idx="2">
+            <a:schemeClr val="accent2"/>
+          </a:effectRef>
+          <a:fontRef idx="minor">
+            <a:schemeClr val="tx1"/>
+          </a:fontRef>
+        </p:style>
+      </p:cxnSp>
+      <p:sp>
+        <p:nvSpPr>
+          <p:cNvPr id="72" name="流程圖: 程序 71">
+            <a:extLst>
+              <a:ext uri="{FF2B5EF4-FFF2-40B4-BE49-F238E27FC236}">
+                <a16:creationId xmlns:a16="http://schemas.microsoft.com/office/drawing/2014/main" id="{04D3BE09-8992-4746-B7A3-9D2ECB108B0D}"/>
+              </a:ext>
+            </a:extLst>
+          </p:cNvPr>
+          <p:cNvSpPr/>
+          <p:nvPr/>
+        </p:nvSpPr>
+        <p:spPr>
+          <a:xfrm>
+            <a:off x="11088716" y="4304554"/>
+            <a:ext cx="950726" cy="597173"/>
+          </a:xfrm>
+          <a:prstGeom prst="flowChartProcess">
+            <a:avLst/>
+          </a:prstGeom>
+        </p:spPr>
+        <p:style>
+          <a:lnRef idx="1">
+            <a:schemeClr val="dk1"/>
+          </a:lnRef>
+          <a:fillRef idx="2">
+            <a:schemeClr val="dk1"/>
+          </a:fillRef>
+          <a:effectRef idx="1">
+            <a:schemeClr val="dk1"/>
+          </a:effectRef>
+          <a:fontRef idx="minor">
+            <a:schemeClr val="dk1"/>
+          </a:fontRef>
+        </p:style>
+        <p:txBody>
+          <a:bodyPr rtlCol="0" anchor="ctr"/>
+          <a:lstStyle/>
+          <a:p>
+            <a:pPr algn="ctr"/>
+            <a:r>
+              <a:rPr lang="en-US" altLang="zh-TW" sz="1400" dirty="0"/>
+              <a:t>Display</a:t>
+            </a:r>
+          </a:p>
+          <a:p>
+            <a:pPr algn="ctr"/>
+            <a:r>
+              <a:rPr lang="en-US" altLang="zh-TW" sz="1400" dirty="0"/>
+              <a:t>character</a:t>
+            </a:r>
+          </a:p>
+        </p:txBody>
+      </p:sp>
+      <p:cxnSp>
+        <p:nvCxnSpPr>
+          <p:cNvPr id="73" name="直線單箭頭接點 72">
+            <a:extLst>
+              <a:ext uri="{FF2B5EF4-FFF2-40B4-BE49-F238E27FC236}">
+                <a16:creationId xmlns:a16="http://schemas.microsoft.com/office/drawing/2014/main" id="{B7D70C3C-DF30-4E39-9E63-95EEE13F259E}"/>
+              </a:ext>
+            </a:extLst>
+          </p:cNvPr>
+          <p:cNvCxnSpPr>
+            <a:cxnSpLocks/>
+          </p:cNvCxnSpPr>
+          <p:nvPr/>
+        </p:nvCxnSpPr>
+        <p:spPr>
+          <a:xfrm>
+            <a:off x="9764213" y="5035719"/>
+            <a:ext cx="0" cy="274193"/>
+          </a:xfrm>
+          <a:prstGeom prst="straightConnector1">
+            <a:avLst/>
+          </a:prstGeom>
+          <a:ln>
+            <a:headEnd type="none" w="med" len="med"/>
+            <a:tailEnd type="triangle" w="med" len="med"/>
+          </a:ln>
+        </p:spPr>
+        <p:style>
+          <a:lnRef idx="3">
+            <a:schemeClr val="accent2"/>
+          </a:lnRef>
+          <a:fillRef idx="0">
+            <a:schemeClr val="accent2"/>
+          </a:fillRef>
+          <a:effectRef idx="2">
+            <a:schemeClr val="accent2"/>
+          </a:effectRef>
+          <a:fontRef idx="minor">
+            <a:schemeClr val="tx1"/>
+          </a:fontRef>
+        </p:style>
+      </p:cxnSp>
+      <p:sp>
+        <p:nvSpPr>
+          <p:cNvPr id="22" name="矩形 21">
+            <a:extLst>
+              <a:ext uri="{FF2B5EF4-FFF2-40B4-BE49-F238E27FC236}">
+                <a16:creationId xmlns:a16="http://schemas.microsoft.com/office/drawing/2014/main" id="{7FB94AE4-BB83-4A5A-A086-45693DBD0154}"/>
+              </a:ext>
+            </a:extLst>
+          </p:cNvPr>
+          <p:cNvSpPr/>
+          <p:nvPr/>
+        </p:nvSpPr>
+        <p:spPr>
+          <a:xfrm>
+            <a:off x="1635180" y="3215035"/>
+            <a:ext cx="1358410" cy="461665"/>
+          </a:xfrm>
+          <a:prstGeom prst="rect">
+            <a:avLst/>
+          </a:prstGeom>
+        </p:spPr>
+        <p:txBody>
+          <a:bodyPr wrap="square">
+            <a:spAutoFit/>
+          </a:bodyPr>
+          <a:lstStyle/>
+          <a:p>
+            <a:pPr marL="228600" indent="-228600">
+              <a:buAutoNum type="arabicPeriod"/>
+            </a:pPr>
+            <a:r>
+              <a:rPr lang="en-US" altLang="zh-TW" sz="1200" dirty="0">
+                <a:cs typeface="Arial" panose="020B0604020202020204" pitchFamily="34" charset="0"/>
+              </a:rPr>
+              <a:t>Info. </a:t>
+            </a:r>
+            <a:r>
+              <a:rPr lang="en-US" altLang="zh-TW" sz="1200" dirty="0"/>
+              <a:t>Retrieve</a:t>
+            </a:r>
+          </a:p>
+          <a:p>
+            <a:pPr marL="228600" indent="-228600">
+              <a:buAutoNum type="arabicPeriod"/>
+            </a:pPr>
+            <a:r>
+              <a:rPr lang="en-US" altLang="zh-TW" sz="1200" dirty="0">
+                <a:cs typeface="Arial" panose="020B0604020202020204" pitchFamily="34" charset="0"/>
+              </a:rPr>
+              <a:t>Compare </a:t>
+            </a:r>
+            <a:endParaRPr lang="zh-TW" altLang="en-US" sz="1200" dirty="0">
+              <a:cs typeface="Arial" panose="020B0604020202020204" pitchFamily="34" charset="0"/>
+            </a:endParaRPr>
+          </a:p>
+        </p:txBody>
+      </p:sp>
+      <p:sp>
+        <p:nvSpPr>
+          <p:cNvPr id="71" name="流程圖: 程序 70">
+            <a:extLst>
+              <a:ext uri="{FF2B5EF4-FFF2-40B4-BE49-F238E27FC236}">
+                <a16:creationId xmlns:a16="http://schemas.microsoft.com/office/drawing/2014/main" id="{4034922B-5BDE-439F-B702-30038809637B}"/>
+              </a:ext>
+            </a:extLst>
+          </p:cNvPr>
+          <p:cNvSpPr/>
+          <p:nvPr/>
+        </p:nvSpPr>
+        <p:spPr>
+          <a:xfrm>
+            <a:off x="1362005" y="2088569"/>
+            <a:ext cx="1826147" cy="542964"/>
+          </a:xfrm>
+          <a:prstGeom prst="flowChartProcess">
+            <a:avLst/>
+          </a:prstGeom>
+        </p:spPr>
+        <p:style>
+          <a:lnRef idx="1">
+            <a:schemeClr val="dk1"/>
+          </a:lnRef>
+          <a:fillRef idx="2">
+            <a:schemeClr val="dk1"/>
+          </a:fillRef>
+          <a:effectRef idx="1">
+            <a:schemeClr val="dk1"/>
+          </a:effectRef>
+          <a:fontRef idx="minor">
+            <a:schemeClr val="dk1"/>
+          </a:fontRef>
+        </p:style>
+        <p:txBody>
+          <a:bodyPr rtlCol="0" anchor="ctr"/>
+          <a:lstStyle/>
+          <a:p>
+            <a:pPr algn="ctr"/>
+            <a:r>
+              <a:rPr lang="en-US" altLang="zh-TW" dirty="0"/>
+              <a:t>In which Functions do you want </a:t>
+            </a:r>
+            <a:r>
+              <a:rPr lang="en-US" altLang="zh-TW" dirty="0">
+                <a:latin typeface="Arial" panose="020B0604020202020204" pitchFamily="34" charset="0"/>
+                <a:cs typeface="Arial" panose="020B0604020202020204" pitchFamily="34" charset="0"/>
+              </a:rPr>
+              <a:t>?</a:t>
+            </a:r>
+            <a:endParaRPr lang="zh-TW" altLang="en-US" dirty="0">
+              <a:latin typeface="Arial" panose="020B0604020202020204" pitchFamily="34" charset="0"/>
+              <a:cs typeface="Arial" panose="020B0604020202020204" pitchFamily="34" charset="0"/>
+            </a:endParaRPr>
+          </a:p>
+        </p:txBody>
+      </p:sp>
+      <p:cxnSp>
+        <p:nvCxnSpPr>
+          <p:cNvPr id="78" name="直線單箭頭接點 77">
+            <a:extLst>
+              <a:ext uri="{FF2B5EF4-FFF2-40B4-BE49-F238E27FC236}">
+                <a16:creationId xmlns:a16="http://schemas.microsoft.com/office/drawing/2014/main" id="{45479071-3961-497E-8690-32C72B9E7DA4}"/>
+              </a:ext>
+            </a:extLst>
+          </p:cNvPr>
+          <p:cNvCxnSpPr>
+            <a:cxnSpLocks/>
+          </p:cNvCxnSpPr>
+          <p:nvPr/>
+        </p:nvCxnSpPr>
+        <p:spPr>
+          <a:xfrm>
+            <a:off x="852883" y="3464821"/>
+            <a:ext cx="0" cy="1876269"/>
+          </a:xfrm>
+          <a:prstGeom prst="straightConnector1">
+            <a:avLst/>
+          </a:prstGeom>
+          <a:ln>
+            <a:headEnd type="none" w="med" len="med"/>
+            <a:tailEnd type="triangle" w="med" len="med"/>
+          </a:ln>
+        </p:spPr>
+        <p:style>
+          <a:lnRef idx="3">
+            <a:schemeClr val="accent2"/>
+          </a:lnRef>
+          <a:fillRef idx="0">
+            <a:schemeClr val="accent2"/>
+          </a:fillRef>
+          <a:effectRef idx="2">
+            <a:schemeClr val="accent2"/>
+          </a:effectRef>
+          <a:fontRef idx="minor">
+            <a:schemeClr val="tx1"/>
+          </a:fontRef>
+        </p:style>
+      </p:cxnSp>
+      <p:cxnSp>
+        <p:nvCxnSpPr>
+          <p:cNvPr id="80" name="直線接點 79">
+            <a:extLst>
+              <a:ext uri="{FF2B5EF4-FFF2-40B4-BE49-F238E27FC236}">
+                <a16:creationId xmlns:a16="http://schemas.microsoft.com/office/drawing/2014/main" id="{3EFF814C-2DBD-4FD6-A799-9CCF9B3840E9}"/>
+              </a:ext>
+            </a:extLst>
+          </p:cNvPr>
+          <p:cNvCxnSpPr>
+            <a:cxnSpLocks/>
+          </p:cNvCxnSpPr>
+          <p:nvPr/>
+        </p:nvCxnSpPr>
+        <p:spPr>
+          <a:xfrm>
+            <a:off x="2269882" y="4046365"/>
+            <a:ext cx="0" cy="243002"/>
+          </a:xfrm>
+          <a:prstGeom prst="line">
+            <a:avLst/>
+          </a:prstGeom>
+        </p:spPr>
+        <p:style>
+          <a:lnRef idx="3">
+            <a:schemeClr val="accent2"/>
+          </a:lnRef>
+          <a:fillRef idx="0">
+            <a:schemeClr val="accent2"/>
+          </a:fillRef>
+          <a:effectRef idx="2">
+            <a:schemeClr val="accent2"/>
+          </a:effectRef>
+          <a:fontRef idx="minor">
+            <a:schemeClr val="tx1"/>
+          </a:fontRef>
+        </p:style>
+      </p:cxnSp>
+      <p:sp>
+        <p:nvSpPr>
+          <p:cNvPr id="81" name="流程圖: 決策 80">
+            <a:extLst>
+              <a:ext uri="{FF2B5EF4-FFF2-40B4-BE49-F238E27FC236}">
+                <a16:creationId xmlns:a16="http://schemas.microsoft.com/office/drawing/2014/main" id="{999CA107-C5FD-4A2A-B50D-14A878F851FF}"/>
+              </a:ext>
+            </a:extLst>
+          </p:cNvPr>
+          <p:cNvSpPr/>
+          <p:nvPr/>
+        </p:nvSpPr>
+        <p:spPr>
+          <a:xfrm>
+            <a:off x="3138645" y="3650009"/>
+            <a:ext cx="1773191" cy="1304271"/>
+          </a:xfrm>
+          <a:prstGeom prst="flowChartDecision">
+            <a:avLst/>
+          </a:prstGeom>
+        </p:spPr>
+        <p:style>
+          <a:lnRef idx="1">
+            <a:schemeClr val="dk1"/>
+          </a:lnRef>
+          <a:fillRef idx="2">
+            <a:schemeClr val="dk1"/>
+          </a:fillRef>
+          <a:effectRef idx="1">
+            <a:schemeClr val="dk1"/>
+          </a:effectRef>
+          <a:fontRef idx="minor">
+            <a:schemeClr val="dk1"/>
+          </a:fontRef>
+        </p:style>
+        <p:txBody>
+          <a:bodyPr rot="0" spcFirstLastPara="0" vertOverflow="overflow" horzOverflow="overflow" vert="horz" wrap="square" lIns="91440" tIns="45720" rIns="91440" bIns="45720" numCol="1" spcCol="0" rtlCol="0" fromWordArt="0" anchor="ctr" anchorCtr="0" forceAA="0" compatLnSpc="1">
+            <a:prstTxWarp prst="textNoShape">
+              <a:avLst/>
+            </a:prstTxWarp>
+            <a:noAutofit/>
+          </a:bodyPr>
+          <a:lstStyle/>
+          <a:p>
+            <a:pPr algn="ctr"/>
+            <a:endParaRPr lang="zh-TW" altLang="en-US" sz="1200" dirty="0">
+              <a:solidFill>
+                <a:schemeClr val="dk1"/>
+              </a:solidFill>
+            </a:endParaRPr>
+          </a:p>
+        </p:txBody>
+      </p:sp>
+      <p:sp>
+        <p:nvSpPr>
+          <p:cNvPr id="82" name="矩形 81">
+            <a:extLst>
+              <a:ext uri="{FF2B5EF4-FFF2-40B4-BE49-F238E27FC236}">
+                <a16:creationId xmlns:a16="http://schemas.microsoft.com/office/drawing/2014/main" id="{7DFA3777-8453-4026-A071-72C68B6B717F}"/>
+              </a:ext>
+            </a:extLst>
+          </p:cNvPr>
+          <p:cNvSpPr/>
+          <p:nvPr/>
+        </p:nvSpPr>
+        <p:spPr>
+          <a:xfrm>
+            <a:off x="3393400" y="3969312"/>
+            <a:ext cx="1358410" cy="646331"/>
+          </a:xfrm>
+          <a:prstGeom prst="rect">
+            <a:avLst/>
+          </a:prstGeom>
+        </p:spPr>
+        <p:txBody>
+          <a:bodyPr wrap="square">
+            <a:spAutoFit/>
+          </a:bodyPr>
+          <a:lstStyle/>
+          <a:p>
+            <a:pPr marL="228600" indent="-228600">
+              <a:buAutoNum type="arabicPeriod"/>
+            </a:pPr>
+            <a:r>
+              <a:rPr lang="en-US" altLang="zh-TW" sz="1200" dirty="0">
+                <a:cs typeface="Arial" panose="020B0604020202020204" pitchFamily="34" charset="0"/>
+              </a:rPr>
+              <a:t>MD5 Checksum</a:t>
+            </a:r>
+          </a:p>
+          <a:p>
+            <a:pPr marL="228600" indent="-228600">
+              <a:buAutoNum type="arabicPeriod"/>
+            </a:pPr>
+            <a:r>
+              <a:rPr lang="en-US" altLang="zh-TW" sz="1200" dirty="0">
+                <a:cs typeface="Arial" panose="020B0604020202020204" pitchFamily="34" charset="0"/>
+              </a:rPr>
+              <a:t>CRC32</a:t>
+            </a:r>
+          </a:p>
+          <a:p>
+            <a:pPr marL="228600" indent="-228600">
+              <a:buAutoNum type="arabicPeriod"/>
+            </a:pPr>
+            <a:r>
+              <a:rPr lang="en-US" altLang="zh-TW" sz="1200" dirty="0">
+                <a:cs typeface="Arial" panose="020B0604020202020204" pitchFamily="34" charset="0"/>
+              </a:rPr>
+              <a:t>1:1 Compare </a:t>
+            </a:r>
+            <a:endParaRPr lang="zh-TW" altLang="en-US" sz="1200" dirty="0">
+              <a:cs typeface="Arial" panose="020B0604020202020204" pitchFamily="34" charset="0"/>
+            </a:endParaRPr>
+          </a:p>
+        </p:txBody>
+      </p:sp>
+      <p:sp>
+        <p:nvSpPr>
+          <p:cNvPr id="83" name="矩形 82">
+            <a:extLst>
+              <a:ext uri="{FF2B5EF4-FFF2-40B4-BE49-F238E27FC236}">
+                <a16:creationId xmlns:a16="http://schemas.microsoft.com/office/drawing/2014/main" id="{34AA7929-D0B2-47BA-BB88-A2FFF1737227}"/>
+              </a:ext>
+            </a:extLst>
+          </p:cNvPr>
+          <p:cNvSpPr/>
+          <p:nvPr/>
+        </p:nvSpPr>
+        <p:spPr>
+          <a:xfrm>
+            <a:off x="1058148" y="3149569"/>
+            <a:ext cx="338554" cy="276999"/>
+          </a:xfrm>
+          <a:prstGeom prst="rect">
+            <a:avLst/>
+          </a:prstGeom>
+        </p:spPr>
+        <p:txBody>
+          <a:bodyPr wrap="none">
+            <a:spAutoFit/>
+          </a:bodyPr>
+          <a:lstStyle/>
+          <a:p>
+            <a:r>
+              <a:rPr lang="en-US" altLang="zh-TW" sz="1200" dirty="0">
+                <a:solidFill>
+                  <a:schemeClr val="dk1"/>
+                </a:solidFill>
+                <a:latin typeface="新細明體" panose="02020500000000000000" pitchFamily="18" charset="-120"/>
+                <a:ea typeface="新細明體" panose="02020500000000000000" pitchFamily="18" charset="-120"/>
+                <a:cs typeface="Times New Roman" panose="02020603050405020304" pitchFamily="18" charset="0"/>
+              </a:rPr>
+              <a:t>①</a:t>
+            </a:r>
+            <a:endParaRPr lang="zh-TW" altLang="en-US" sz="1200" dirty="0"/>
+          </a:p>
+        </p:txBody>
+      </p:sp>
+      <p:cxnSp>
+        <p:nvCxnSpPr>
+          <p:cNvPr id="84" name="直線接點 83">
+            <a:extLst>
+              <a:ext uri="{FF2B5EF4-FFF2-40B4-BE49-F238E27FC236}">
+                <a16:creationId xmlns:a16="http://schemas.microsoft.com/office/drawing/2014/main" id="{97AB350F-CC1F-49DF-8A52-8828D676ED6C}"/>
+              </a:ext>
+            </a:extLst>
+          </p:cNvPr>
+          <p:cNvCxnSpPr>
+            <a:cxnSpLocks/>
+          </p:cNvCxnSpPr>
+          <p:nvPr/>
+        </p:nvCxnSpPr>
+        <p:spPr>
+          <a:xfrm>
+            <a:off x="4025240" y="2281844"/>
+            <a:ext cx="0" cy="1376367"/>
+          </a:xfrm>
+          <a:prstGeom prst="line">
+            <a:avLst/>
+          </a:prstGeom>
+        </p:spPr>
+        <p:style>
+          <a:lnRef idx="3">
+            <a:schemeClr val="accent2"/>
+          </a:lnRef>
+          <a:fillRef idx="0">
+            <a:schemeClr val="accent2"/>
+          </a:fillRef>
+          <a:effectRef idx="2">
+            <a:schemeClr val="accent2"/>
+          </a:effectRef>
+          <a:fontRef idx="minor">
+            <a:schemeClr val="tx1"/>
+          </a:fontRef>
+        </p:style>
+      </p:cxnSp>
+      <p:cxnSp>
+        <p:nvCxnSpPr>
+          <p:cNvPr id="85" name="直線單箭頭接點 84">
+            <a:extLst>
+              <a:ext uri="{FF2B5EF4-FFF2-40B4-BE49-F238E27FC236}">
+                <a16:creationId xmlns:a16="http://schemas.microsoft.com/office/drawing/2014/main" id="{D76FEEE7-F48E-4A25-85D9-7F4B1A31B235}"/>
+              </a:ext>
+            </a:extLst>
+          </p:cNvPr>
+          <p:cNvCxnSpPr>
+            <a:cxnSpLocks/>
+          </p:cNvCxnSpPr>
+          <p:nvPr/>
+        </p:nvCxnSpPr>
+        <p:spPr>
+          <a:xfrm>
+            <a:off x="4025240" y="2289930"/>
+            <a:ext cx="358346" cy="4025"/>
+          </a:xfrm>
+          <a:prstGeom prst="straightConnector1">
+            <a:avLst/>
+          </a:prstGeom>
+          <a:ln>
+            <a:headEnd type="none" w="med" len="med"/>
+            <a:tailEnd type="triangle" w="med" len="med"/>
+          </a:ln>
+        </p:spPr>
+        <p:style>
+          <a:lnRef idx="3">
+            <a:schemeClr val="accent2"/>
+          </a:lnRef>
+          <a:fillRef idx="0">
+            <a:schemeClr val="accent2"/>
+          </a:fillRef>
+          <a:effectRef idx="2">
+            <a:schemeClr val="accent2"/>
+          </a:effectRef>
+          <a:fontRef idx="minor">
+            <a:schemeClr val="tx1"/>
+          </a:fontRef>
+        </p:style>
+      </p:cxnSp>
+      <p:cxnSp>
+        <p:nvCxnSpPr>
+          <p:cNvPr id="86" name="直線單箭頭接點 85">
+            <a:extLst>
+              <a:ext uri="{FF2B5EF4-FFF2-40B4-BE49-F238E27FC236}">
+                <a16:creationId xmlns:a16="http://schemas.microsoft.com/office/drawing/2014/main" id="{9DA6EC02-106C-4C67-A46B-02CC9325F66F}"/>
+              </a:ext>
+            </a:extLst>
+          </p:cNvPr>
+          <p:cNvCxnSpPr>
+            <a:cxnSpLocks/>
+          </p:cNvCxnSpPr>
+          <p:nvPr/>
+        </p:nvCxnSpPr>
+        <p:spPr>
+          <a:xfrm>
+            <a:off x="4025240" y="4956702"/>
+            <a:ext cx="0" cy="255378"/>
+          </a:xfrm>
+          <a:prstGeom prst="straightConnector1">
+            <a:avLst/>
+          </a:prstGeom>
+          <a:ln>
+            <a:headEnd type="none" w="med" len="med"/>
+            <a:tailEnd type="triangle" w="med" len="med"/>
+          </a:ln>
+        </p:spPr>
+        <p:style>
+          <a:lnRef idx="3">
+            <a:schemeClr val="accent2"/>
+          </a:lnRef>
+          <a:fillRef idx="0">
+            <a:schemeClr val="accent2"/>
+          </a:fillRef>
+          <a:effectRef idx="2">
+            <a:schemeClr val="accent2"/>
+          </a:effectRef>
+          <a:fontRef idx="minor">
+            <a:schemeClr val="tx1"/>
+          </a:fontRef>
+        </p:style>
+      </p:cxnSp>
+      <p:sp>
+        <p:nvSpPr>
+          <p:cNvPr id="87" name="流程圖: 程序 86">
+            <a:extLst>
+              <a:ext uri="{FF2B5EF4-FFF2-40B4-BE49-F238E27FC236}">
+                <a16:creationId xmlns:a16="http://schemas.microsoft.com/office/drawing/2014/main" id="{6DCEC54D-1260-4117-BCE2-1AB534DFD3BF}"/>
+              </a:ext>
+            </a:extLst>
+          </p:cNvPr>
+          <p:cNvSpPr/>
+          <p:nvPr/>
+        </p:nvSpPr>
+        <p:spPr>
+          <a:xfrm>
+            <a:off x="3468580" y="5212080"/>
+            <a:ext cx="1083275" cy="389597"/>
+          </a:xfrm>
+          <a:prstGeom prst="flowChartProcess">
+            <a:avLst/>
+          </a:prstGeom>
+        </p:spPr>
+        <p:style>
+          <a:lnRef idx="1">
+            <a:schemeClr val="dk1"/>
+          </a:lnRef>
+          <a:fillRef idx="2">
+            <a:schemeClr val="dk1"/>
+          </a:fillRef>
+          <a:effectRef idx="1">
+            <a:schemeClr val="dk1"/>
+          </a:effectRef>
+          <a:fontRef idx="minor">
+            <a:schemeClr val="dk1"/>
+          </a:fontRef>
+        </p:style>
+        <p:txBody>
+          <a:bodyPr rot="0" spcFirstLastPara="0" vertOverflow="overflow" horzOverflow="overflow" vert="horz" wrap="square" lIns="91440" tIns="45720" rIns="91440" bIns="45720" numCol="1" spcCol="0" rtlCol="0" fromWordArt="0" anchor="ctr" anchorCtr="0" forceAA="0" compatLnSpc="1">
+            <a:prstTxWarp prst="textNoShape">
+              <a:avLst/>
+            </a:prstTxWarp>
+            <a:noAutofit/>
+          </a:bodyPr>
+          <a:lstStyle/>
+          <a:p>
+            <a:pPr algn="ctr"/>
+            <a:r>
+              <a:rPr lang="en-US" altLang="zh-TW" dirty="0"/>
+              <a:t> CRC32</a:t>
+            </a:r>
+            <a:endParaRPr lang="zh-TW" altLang="en-US" dirty="0"/>
+          </a:p>
+        </p:txBody>
+      </p:sp>
+      <p:cxnSp>
+        <p:nvCxnSpPr>
+          <p:cNvPr id="88" name="直線單箭頭接點 87">
+            <a:extLst>
+              <a:ext uri="{FF2B5EF4-FFF2-40B4-BE49-F238E27FC236}">
+                <a16:creationId xmlns:a16="http://schemas.microsoft.com/office/drawing/2014/main" id="{567BC7C3-3E7E-4FAB-8C33-BB068D93091E}"/>
+              </a:ext>
+            </a:extLst>
+          </p:cNvPr>
+          <p:cNvCxnSpPr>
+            <a:cxnSpLocks/>
+            <a:stCxn id="81" idx="3"/>
+            <a:endCxn id="29" idx="1"/>
+          </p:cNvCxnSpPr>
+          <p:nvPr/>
+        </p:nvCxnSpPr>
+        <p:spPr>
+          <a:xfrm>
+            <a:off x="4911836" y="4302145"/>
+            <a:ext cx="326959" cy="4220"/>
+          </a:xfrm>
+          <a:prstGeom prst="straightConnector1">
+            <a:avLst/>
+          </a:prstGeom>
+          <a:ln>
+            <a:headEnd type="none" w="med" len="med"/>
+            <a:tailEnd type="triangle" w="med" len="med"/>
+          </a:ln>
+        </p:spPr>
+        <p:style>
+          <a:lnRef idx="3">
+            <a:schemeClr val="accent2"/>
+          </a:lnRef>
+          <a:fillRef idx="0">
+            <a:schemeClr val="accent2"/>
+          </a:fillRef>
+          <a:effectRef idx="2">
+            <a:schemeClr val="accent2"/>
+          </a:effectRef>
+          <a:fontRef idx="minor">
+            <a:schemeClr val="tx1"/>
+          </a:fontRef>
+        </p:style>
+      </p:cxnSp>
+      <p:cxnSp>
+        <p:nvCxnSpPr>
+          <p:cNvPr id="89" name="直線單箭頭接點 88">
+            <a:extLst>
+              <a:ext uri="{FF2B5EF4-FFF2-40B4-BE49-F238E27FC236}">
+                <a16:creationId xmlns:a16="http://schemas.microsoft.com/office/drawing/2014/main" id="{54F33E29-6243-4FAA-BAFB-C7A845C1257F}"/>
+              </a:ext>
+            </a:extLst>
+          </p:cNvPr>
+          <p:cNvCxnSpPr>
+            <a:cxnSpLocks/>
+          </p:cNvCxnSpPr>
+          <p:nvPr/>
+        </p:nvCxnSpPr>
+        <p:spPr>
+          <a:xfrm>
+            <a:off x="4021713" y="5582413"/>
+            <a:ext cx="0" cy="274642"/>
+          </a:xfrm>
+          <a:prstGeom prst="straightConnector1">
+            <a:avLst/>
+          </a:prstGeom>
+          <a:ln>
+            <a:headEnd type="none" w="med" len="med"/>
+            <a:tailEnd type="triangle" w="med" len="med"/>
+          </a:ln>
+        </p:spPr>
+        <p:style>
+          <a:lnRef idx="3">
+            <a:schemeClr val="accent2"/>
+          </a:lnRef>
+          <a:fillRef idx="0">
+            <a:schemeClr val="accent2"/>
+          </a:fillRef>
+          <a:effectRef idx="2">
+            <a:schemeClr val="accent2"/>
+          </a:effectRef>
+          <a:fontRef idx="minor">
+            <a:schemeClr val="tx1"/>
+          </a:fontRef>
+        </p:style>
+      </p:cxnSp>
+      <p:sp>
+        <p:nvSpPr>
+          <p:cNvPr id="90" name="流程圖: 程序 89">
+            <a:extLst>
+              <a:ext uri="{FF2B5EF4-FFF2-40B4-BE49-F238E27FC236}">
+                <a16:creationId xmlns:a16="http://schemas.microsoft.com/office/drawing/2014/main" id="{3C494F00-FE2E-4FDE-88D8-08FC563D011B}"/>
+              </a:ext>
+            </a:extLst>
+          </p:cNvPr>
+          <p:cNvSpPr/>
+          <p:nvPr/>
+        </p:nvSpPr>
+        <p:spPr>
+          <a:xfrm>
+            <a:off x="3444472" y="5857055"/>
+            <a:ext cx="1083276" cy="597173"/>
+          </a:xfrm>
+          <a:prstGeom prst="flowChartProcess">
+            <a:avLst/>
+          </a:prstGeom>
+        </p:spPr>
+        <p:style>
+          <a:lnRef idx="1">
+            <a:schemeClr val="dk1"/>
+          </a:lnRef>
+          <a:fillRef idx="2">
+            <a:schemeClr val="dk1"/>
+          </a:fillRef>
+          <a:effectRef idx="1">
+            <a:schemeClr val="dk1"/>
+          </a:effectRef>
+          <a:fontRef idx="minor">
+            <a:schemeClr val="dk1"/>
+          </a:fontRef>
+        </p:style>
+        <p:txBody>
+          <a:bodyPr rtlCol="0" anchor="ctr"/>
+          <a:lstStyle/>
+          <a:p>
+            <a:pPr algn="ctr"/>
+            <a:r>
+              <a:rPr lang="en-US" altLang="zh-TW" dirty="0"/>
+              <a:t>Display</a:t>
+            </a:r>
+          </a:p>
+          <a:p>
+            <a:pPr algn="ctr"/>
+            <a:r>
+              <a:rPr lang="en-US" altLang="zh-TW" dirty="0"/>
+              <a:t>Result</a:t>
+            </a:r>
+          </a:p>
+        </p:txBody>
+      </p:sp>
+      <p:sp>
+        <p:nvSpPr>
+          <p:cNvPr id="91" name="流程圖: 程序 90">
+            <a:extLst>
+              <a:ext uri="{FF2B5EF4-FFF2-40B4-BE49-F238E27FC236}">
+                <a16:creationId xmlns:a16="http://schemas.microsoft.com/office/drawing/2014/main" id="{26D582C6-383F-4818-A436-FFD3002CCC7C}"/>
+              </a:ext>
+            </a:extLst>
+          </p:cNvPr>
+          <p:cNvSpPr/>
+          <p:nvPr/>
+        </p:nvSpPr>
+        <p:spPr>
+          <a:xfrm>
+            <a:off x="5828956" y="1977561"/>
+            <a:ext cx="1083276" cy="616815"/>
+          </a:xfrm>
+          <a:prstGeom prst="flowChartProcess">
+            <a:avLst/>
+          </a:prstGeom>
+        </p:spPr>
+        <p:style>
+          <a:lnRef idx="1">
+            <a:schemeClr val="dk1"/>
+          </a:lnRef>
+          <a:fillRef idx="2">
+            <a:schemeClr val="dk1"/>
+          </a:fillRef>
+          <a:effectRef idx="1">
+            <a:schemeClr val="dk1"/>
+          </a:effectRef>
+          <a:fontRef idx="minor">
+            <a:schemeClr val="dk1"/>
+          </a:fontRef>
+        </p:style>
+        <p:txBody>
+          <a:bodyPr rtlCol="0" anchor="ctr"/>
+          <a:lstStyle/>
+          <a:p>
+            <a:pPr algn="ctr"/>
+            <a:r>
+              <a:rPr lang="en-US" altLang="zh-TW" dirty="0"/>
+              <a:t>Display</a:t>
+            </a:r>
+          </a:p>
+          <a:p>
+            <a:pPr algn="ctr"/>
+            <a:r>
+              <a:rPr lang="en-US" altLang="zh-TW" dirty="0"/>
+              <a:t>Result</a:t>
+            </a:r>
+          </a:p>
+        </p:txBody>
+      </p:sp>
+      <p:sp>
+        <p:nvSpPr>
+          <p:cNvPr id="92" name="流程圖: 程序 91">
+            <a:extLst>
+              <a:ext uri="{FF2B5EF4-FFF2-40B4-BE49-F238E27FC236}">
+                <a16:creationId xmlns:a16="http://schemas.microsoft.com/office/drawing/2014/main" id="{8DEC8B7B-951A-4C59-A16E-8009E4A4D7A5}"/>
+              </a:ext>
+            </a:extLst>
+          </p:cNvPr>
+          <p:cNvSpPr/>
+          <p:nvPr/>
+        </p:nvSpPr>
+        <p:spPr>
+          <a:xfrm>
+            <a:off x="4372069" y="2779993"/>
+            <a:ext cx="1099886" cy="303486"/>
+          </a:xfrm>
+          <a:prstGeom prst="flowChartProcess">
+            <a:avLst/>
+          </a:prstGeom>
+          <a:effectLst>
+            <a:outerShdw blurRad="50800" dist="38100" dir="2700000" algn="tl" rotWithShape="0">
+              <a:prstClr val="black">
+                <a:alpha val="40000"/>
+              </a:prstClr>
+            </a:outerShdw>
+          </a:effectLst>
+        </p:spPr>
+        <p:style>
+          <a:lnRef idx="1">
+            <a:schemeClr val="accent2"/>
+          </a:lnRef>
+          <a:fillRef idx="2">
+            <a:schemeClr val="accent2"/>
+          </a:fillRef>
+          <a:effectRef idx="1">
+            <a:schemeClr val="accent2"/>
+          </a:effectRef>
+          <a:fontRef idx="minor">
+            <a:schemeClr val="dk1"/>
+          </a:fontRef>
+        </p:style>
+        <p:txBody>
+          <a:bodyPr rtlCol="0" anchor="ctr"/>
+          <a:lstStyle/>
+          <a:p>
+            <a:pPr algn="ctr"/>
+            <a:r>
+              <a:rPr lang="en-US" altLang="zh-TW" sz="1200" dirty="0"/>
+              <a:t>import </a:t>
+            </a:r>
+            <a:r>
+              <a:rPr lang="en-US" altLang="zh-TW" sz="1200" dirty="0" err="1"/>
+              <a:t>hashlib</a:t>
+            </a:r>
+            <a:endParaRPr lang="en-US" altLang="zh-TW" sz="1200" dirty="0"/>
+          </a:p>
+        </p:txBody>
+      </p:sp>
+      <p:sp>
+        <p:nvSpPr>
+          <p:cNvPr id="93" name="箭號: 向上 92">
+            <a:extLst>
+              <a:ext uri="{FF2B5EF4-FFF2-40B4-BE49-F238E27FC236}">
+                <a16:creationId xmlns:a16="http://schemas.microsoft.com/office/drawing/2014/main" id="{6567400C-4454-4A12-9983-5CFEE0DEA1E7}"/>
+              </a:ext>
+            </a:extLst>
+          </p:cNvPr>
+          <p:cNvSpPr/>
+          <p:nvPr/>
+        </p:nvSpPr>
+        <p:spPr>
+          <a:xfrm>
+            <a:off x="4818972" y="2608794"/>
+            <a:ext cx="189468" cy="155381"/>
+          </a:xfrm>
+          <a:prstGeom prst="upArrow">
+            <a:avLst/>
+          </a:prstGeom>
+        </p:spPr>
+        <p:style>
+          <a:lnRef idx="1">
+            <a:schemeClr val="dk1"/>
+          </a:lnRef>
+          <a:fillRef idx="2">
+            <a:schemeClr val="dk1"/>
+          </a:fillRef>
+          <a:effectRef idx="1">
+            <a:schemeClr val="dk1"/>
+          </a:effectRef>
+          <a:fontRef idx="minor">
+            <a:schemeClr val="dk1"/>
+          </a:fontRef>
+        </p:style>
+        <p:txBody>
+          <a:bodyPr rtlCol="0" anchor="ctr"/>
+          <a:lstStyle/>
+          <a:p>
+            <a:pPr algn="ctr"/>
+            <a:endParaRPr lang="zh-TW" altLang="en-US"/>
+          </a:p>
+        </p:txBody>
+      </p:sp>
+      <p:sp>
+        <p:nvSpPr>
+          <p:cNvPr id="94" name="流程圖: 程序 93">
+            <a:extLst>
+              <a:ext uri="{FF2B5EF4-FFF2-40B4-BE49-F238E27FC236}">
+                <a16:creationId xmlns:a16="http://schemas.microsoft.com/office/drawing/2014/main" id="{3CD36DEF-9F14-4F8B-A8AE-461EEB27B57E}"/>
+              </a:ext>
+            </a:extLst>
+          </p:cNvPr>
+          <p:cNvSpPr/>
+          <p:nvPr/>
+        </p:nvSpPr>
+        <p:spPr>
+          <a:xfrm rot="5400000">
+            <a:off x="2531553" y="5953466"/>
+            <a:ext cx="1073176" cy="338554"/>
+          </a:xfrm>
+          <a:prstGeom prst="flowChartProcess">
+            <a:avLst/>
+          </a:prstGeom>
+          <a:effectLst>
+            <a:outerShdw blurRad="50800" dist="38100" dir="2700000" algn="tl" rotWithShape="0">
+              <a:prstClr val="black">
+                <a:alpha val="40000"/>
+              </a:prstClr>
+            </a:outerShdw>
+          </a:effectLst>
+        </p:spPr>
+        <p:style>
+          <a:lnRef idx="1">
+            <a:schemeClr val="accent2"/>
+          </a:lnRef>
+          <a:fillRef idx="2">
+            <a:schemeClr val="accent2"/>
+          </a:fillRef>
+          <a:effectRef idx="1">
+            <a:schemeClr val="accent2"/>
+          </a:effectRef>
+          <a:fontRef idx="minor">
+            <a:schemeClr val="dk1"/>
+          </a:fontRef>
+        </p:style>
+        <p:txBody>
+          <a:bodyPr rtlCol="0" anchor="ctr"/>
+          <a:lstStyle/>
+          <a:p>
+            <a:pPr algn="ctr"/>
+            <a:r>
+              <a:rPr lang="en-US" altLang="zh-TW" sz="1200" dirty="0"/>
+              <a:t>import </a:t>
+            </a:r>
+            <a:r>
+              <a:rPr lang="en-US" altLang="zh-TW" sz="1200" dirty="0" err="1"/>
+              <a:t>binascii</a:t>
+            </a:r>
+            <a:endParaRPr lang="en-US" altLang="zh-TW" sz="1200" dirty="0"/>
+          </a:p>
+        </p:txBody>
+      </p:sp>
+      <p:sp>
+        <p:nvSpPr>
+          <p:cNvPr id="95" name="箭號: 向上 94">
+            <a:extLst>
+              <a:ext uri="{FF2B5EF4-FFF2-40B4-BE49-F238E27FC236}">
+                <a16:creationId xmlns:a16="http://schemas.microsoft.com/office/drawing/2014/main" id="{163E122C-C54E-43E5-81E0-03D46417DFB9}"/>
+              </a:ext>
+            </a:extLst>
+          </p:cNvPr>
+          <p:cNvSpPr/>
+          <p:nvPr/>
+        </p:nvSpPr>
+        <p:spPr>
+          <a:xfrm rot="5400000">
+            <a:off x="3245911" y="6066102"/>
+            <a:ext cx="189468" cy="155381"/>
+          </a:xfrm>
+          <a:prstGeom prst="upArrow">
+            <a:avLst/>
+          </a:prstGeom>
+        </p:spPr>
+        <p:style>
+          <a:lnRef idx="1">
+            <a:schemeClr val="dk1"/>
+          </a:lnRef>
+          <a:fillRef idx="2">
+            <a:schemeClr val="dk1"/>
+          </a:fillRef>
+          <a:effectRef idx="1">
+            <a:schemeClr val="dk1"/>
+          </a:effectRef>
+          <a:fontRef idx="minor">
+            <a:schemeClr val="dk1"/>
+          </a:fontRef>
+        </p:style>
+        <p:txBody>
+          <a:bodyPr rtlCol="0" anchor="ctr"/>
+          <a:lstStyle/>
+          <a:p>
+            <a:pPr algn="ctr"/>
+            <a:endParaRPr lang="zh-TW" altLang="en-US"/>
+          </a:p>
+        </p:txBody>
+      </p:sp>
+      <p:sp>
+        <p:nvSpPr>
+          <p:cNvPr id="96" name="矩形 95">
+            <a:extLst>
+              <a:ext uri="{FF2B5EF4-FFF2-40B4-BE49-F238E27FC236}">
+                <a16:creationId xmlns:a16="http://schemas.microsoft.com/office/drawing/2014/main" id="{2172EBB9-0D89-4EFD-989A-BF7A94C7F917}"/>
+              </a:ext>
+            </a:extLst>
+          </p:cNvPr>
+          <p:cNvSpPr/>
+          <p:nvPr/>
+        </p:nvSpPr>
+        <p:spPr>
+          <a:xfrm>
+            <a:off x="3986110" y="3412973"/>
+            <a:ext cx="338554" cy="276999"/>
+          </a:xfrm>
+          <a:prstGeom prst="rect">
+            <a:avLst/>
+          </a:prstGeom>
+        </p:spPr>
+        <p:txBody>
+          <a:bodyPr wrap="none">
+            <a:spAutoFit/>
+          </a:bodyPr>
+          <a:lstStyle/>
+          <a:p>
+            <a:r>
+              <a:rPr lang="en-US" altLang="zh-TW" sz="1200" dirty="0">
+                <a:solidFill>
+                  <a:schemeClr val="dk1"/>
+                </a:solidFill>
+                <a:latin typeface="新細明體" panose="02020500000000000000" pitchFamily="18" charset="-120"/>
+                <a:ea typeface="新細明體" panose="02020500000000000000" pitchFamily="18" charset="-120"/>
+                <a:cs typeface="Times New Roman" panose="02020603050405020304" pitchFamily="18" charset="0"/>
+              </a:rPr>
+              <a:t>①</a:t>
+            </a:r>
+            <a:endParaRPr lang="zh-TW" altLang="en-US" sz="1200" dirty="0"/>
+          </a:p>
+        </p:txBody>
+      </p:sp>
+      <p:sp>
+        <p:nvSpPr>
+          <p:cNvPr id="97" name="矩形 96">
+            <a:extLst>
+              <a:ext uri="{FF2B5EF4-FFF2-40B4-BE49-F238E27FC236}">
+                <a16:creationId xmlns:a16="http://schemas.microsoft.com/office/drawing/2014/main" id="{CFFF04CF-5304-4F8D-ADD3-972114C14C92}"/>
+              </a:ext>
+            </a:extLst>
+          </p:cNvPr>
+          <p:cNvSpPr/>
+          <p:nvPr/>
+        </p:nvSpPr>
+        <p:spPr>
+          <a:xfrm>
+            <a:off x="3992957" y="4883291"/>
+            <a:ext cx="338554" cy="276999"/>
+          </a:xfrm>
+          <a:prstGeom prst="rect">
+            <a:avLst/>
+          </a:prstGeom>
+        </p:spPr>
+        <p:txBody>
+          <a:bodyPr wrap="none">
+            <a:spAutoFit/>
+          </a:bodyPr>
+          <a:lstStyle/>
+          <a:p>
+            <a:r>
+              <a:rPr lang="en-US" altLang="zh-TW" sz="1200" dirty="0">
+                <a:solidFill>
+                  <a:schemeClr val="dk1"/>
+                </a:solidFill>
+                <a:latin typeface="Times New Roman" panose="02020603050405020304" pitchFamily="18" charset="0"/>
+                <a:cs typeface="Times New Roman" panose="02020603050405020304" pitchFamily="18" charset="0"/>
+              </a:rPr>
+              <a:t>②</a:t>
+            </a:r>
+            <a:endParaRPr lang="zh-TW" altLang="en-US" sz="1200" dirty="0"/>
+          </a:p>
+        </p:txBody>
+      </p:sp>
+      <p:sp>
+        <p:nvSpPr>
+          <p:cNvPr id="98" name="矩形 97">
+            <a:extLst>
+              <a:ext uri="{FF2B5EF4-FFF2-40B4-BE49-F238E27FC236}">
+                <a16:creationId xmlns:a16="http://schemas.microsoft.com/office/drawing/2014/main" id="{7E9771AA-BDFA-49DB-B91F-7F4AE3FF029E}"/>
+              </a:ext>
+            </a:extLst>
+          </p:cNvPr>
+          <p:cNvSpPr/>
+          <p:nvPr/>
+        </p:nvSpPr>
+        <p:spPr>
+          <a:xfrm>
+            <a:off x="4786446" y="4029366"/>
+            <a:ext cx="338554" cy="276999"/>
+          </a:xfrm>
+          <a:prstGeom prst="rect">
+            <a:avLst/>
+          </a:prstGeom>
+        </p:spPr>
+        <p:txBody>
+          <a:bodyPr wrap="none">
+            <a:spAutoFit/>
+          </a:bodyPr>
+          <a:lstStyle/>
+          <a:p>
+            <a:r>
+              <a:rPr lang="en-US" altLang="zh-TW" sz="1200" dirty="0">
+                <a:solidFill>
+                  <a:schemeClr val="dk1"/>
+                </a:solidFill>
+                <a:latin typeface="Times New Roman" panose="02020603050405020304" pitchFamily="18" charset="0"/>
+                <a:cs typeface="Times New Roman" panose="02020603050405020304" pitchFamily="18" charset="0"/>
+              </a:rPr>
+              <a:t>③</a:t>
+            </a:r>
+            <a:endParaRPr lang="zh-TW" altLang="en-US" sz="1200" dirty="0"/>
+          </a:p>
+        </p:txBody>
+      </p:sp>
+      <p:sp>
+        <p:nvSpPr>
+          <p:cNvPr id="99" name="流程圖: 程序 98">
+            <a:extLst>
+              <a:ext uri="{FF2B5EF4-FFF2-40B4-BE49-F238E27FC236}">
+                <a16:creationId xmlns:a16="http://schemas.microsoft.com/office/drawing/2014/main" id="{6EC29438-677F-40C8-A726-A11E8B91F475}"/>
+              </a:ext>
+            </a:extLst>
+          </p:cNvPr>
+          <p:cNvSpPr/>
+          <p:nvPr/>
+        </p:nvSpPr>
+        <p:spPr>
+          <a:xfrm>
+            <a:off x="6676667" y="4034985"/>
+            <a:ext cx="1083275" cy="542757"/>
+          </a:xfrm>
+          <a:prstGeom prst="flowChartProcess">
+            <a:avLst/>
+          </a:prstGeom>
+        </p:spPr>
+        <p:style>
+          <a:lnRef idx="1">
+            <a:schemeClr val="dk1"/>
+          </a:lnRef>
+          <a:fillRef idx="2">
+            <a:schemeClr val="dk1"/>
+          </a:fillRef>
+          <a:effectRef idx="1">
+            <a:schemeClr val="dk1"/>
+          </a:effectRef>
+          <a:fontRef idx="minor">
+            <a:schemeClr val="dk1"/>
+          </a:fontRef>
+        </p:style>
+        <p:txBody>
+          <a:bodyPr rot="0" spcFirstLastPara="0" vertOverflow="overflow" horzOverflow="overflow" vert="horz" wrap="square" lIns="91440" tIns="45720" rIns="91440" bIns="45720" numCol="1" spcCol="0" rtlCol="0" fromWordArt="0" anchor="ctr" anchorCtr="0" forceAA="0" compatLnSpc="1">
+            <a:prstTxWarp prst="textNoShape">
+              <a:avLst/>
+            </a:prstTxWarp>
+            <a:noAutofit/>
+          </a:bodyPr>
+          <a:lstStyle/>
+          <a:p>
+            <a:pPr algn="ctr"/>
+            <a:r>
+              <a:rPr lang="en-US" altLang="zh-TW" dirty="0"/>
+              <a:t> Retrieve</a:t>
+            </a:r>
+          </a:p>
+          <a:p>
+            <a:pPr algn="ctr"/>
+            <a:r>
+              <a:rPr lang="en-US" altLang="zh-TW" dirty="0"/>
+              <a:t>Content</a:t>
+            </a:r>
+            <a:endParaRPr lang="zh-TW" altLang="en-US" dirty="0"/>
+          </a:p>
+        </p:txBody>
+      </p:sp>
+      <p:cxnSp>
+        <p:nvCxnSpPr>
+          <p:cNvPr id="100" name="直線單箭頭接點 99">
+            <a:extLst>
+              <a:ext uri="{FF2B5EF4-FFF2-40B4-BE49-F238E27FC236}">
+                <a16:creationId xmlns:a16="http://schemas.microsoft.com/office/drawing/2014/main" id="{7820860B-0C71-4D71-83D2-63346F395C50}"/>
+              </a:ext>
+            </a:extLst>
+          </p:cNvPr>
+          <p:cNvCxnSpPr>
+            <a:cxnSpLocks/>
+          </p:cNvCxnSpPr>
+          <p:nvPr/>
+        </p:nvCxnSpPr>
+        <p:spPr>
+          <a:xfrm>
+            <a:off x="9741882" y="1938377"/>
+            <a:ext cx="0" cy="266004"/>
+          </a:xfrm>
+          <a:prstGeom prst="straightConnector1">
+            <a:avLst/>
+          </a:prstGeom>
+          <a:ln>
+            <a:headEnd type="none" w="med" len="med"/>
+            <a:tailEnd type="triangle" w="med" len="med"/>
+          </a:ln>
+        </p:spPr>
+        <p:style>
+          <a:lnRef idx="3">
+            <a:schemeClr val="accent2"/>
+          </a:lnRef>
+          <a:fillRef idx="0">
+            <a:schemeClr val="accent2"/>
+          </a:fillRef>
+          <a:effectRef idx="2">
+            <a:schemeClr val="accent2"/>
+          </a:effectRef>
+          <a:fontRef idx="minor">
+            <a:schemeClr val="tx1"/>
+          </a:fontRef>
+        </p:style>
+      </p:cxnSp>
+      <p:sp>
+        <p:nvSpPr>
+          <p:cNvPr id="101" name="流程圖: 決策 100">
+            <a:extLst>
+              <a:ext uri="{FF2B5EF4-FFF2-40B4-BE49-F238E27FC236}">
+                <a16:creationId xmlns:a16="http://schemas.microsoft.com/office/drawing/2014/main" id="{9547F5FE-1533-4147-97A7-0DE44FAECA42}"/>
+              </a:ext>
+            </a:extLst>
+          </p:cNvPr>
+          <p:cNvSpPr/>
+          <p:nvPr/>
+        </p:nvSpPr>
+        <p:spPr>
+          <a:xfrm>
+            <a:off x="9038308" y="4174102"/>
+            <a:ext cx="1451810" cy="861617"/>
+          </a:xfrm>
+          <a:prstGeom prst="flowChartDecision">
+            <a:avLst/>
+          </a:prstGeom>
+        </p:spPr>
+        <p:style>
+          <a:lnRef idx="1">
+            <a:schemeClr val="dk1"/>
+          </a:lnRef>
+          <a:fillRef idx="2">
+            <a:schemeClr val="dk1"/>
+          </a:fillRef>
+          <a:effectRef idx="1">
+            <a:schemeClr val="dk1"/>
+          </a:effectRef>
+          <a:fontRef idx="minor">
+            <a:schemeClr val="dk1"/>
+          </a:fontRef>
+        </p:style>
+        <p:txBody>
+          <a:bodyPr rot="0" spcFirstLastPara="0" vertOverflow="overflow" horzOverflow="overflow" vert="horz" wrap="square" lIns="91440" tIns="45720" rIns="91440" bIns="45720" numCol="1" spcCol="0" rtlCol="0" fromWordArt="0" anchor="ctr" anchorCtr="0" forceAA="0" compatLnSpc="1">
+            <a:prstTxWarp prst="textNoShape">
+              <a:avLst/>
+            </a:prstTxWarp>
+            <a:noAutofit/>
+          </a:bodyPr>
+          <a:lstStyle/>
+          <a:p>
+            <a:pPr algn="ctr"/>
+            <a:r>
+              <a:rPr lang="en-US" altLang="zh-TW" sz="1400" dirty="0">
+                <a:solidFill>
+                  <a:schemeClr val="dk1"/>
+                </a:solidFill>
+              </a:rPr>
+              <a:t>Equal </a:t>
+            </a:r>
+            <a:r>
+              <a:rPr lang="en-US" altLang="zh-TW" sz="1400" dirty="0"/>
+              <a:t>(y/n) </a:t>
+            </a:r>
+            <a:r>
+              <a:rPr lang="en-US" altLang="zh-TW" sz="1400" dirty="0">
+                <a:latin typeface="Arial" panose="020B0604020202020204" pitchFamily="34" charset="0"/>
+                <a:cs typeface="Arial" panose="020B0604020202020204" pitchFamily="34" charset="0"/>
+              </a:rPr>
+              <a:t>?</a:t>
+            </a:r>
+            <a:endParaRPr lang="zh-TW" altLang="en-US" sz="1400" dirty="0">
+              <a:solidFill>
+                <a:schemeClr val="dk1"/>
+              </a:solidFill>
+              <a:latin typeface="Arial" panose="020B0604020202020204" pitchFamily="34" charset="0"/>
+              <a:cs typeface="Arial" panose="020B0604020202020204" pitchFamily="34" charset="0"/>
+            </a:endParaRPr>
+          </a:p>
+        </p:txBody>
+      </p:sp>
+      <p:sp>
+        <p:nvSpPr>
+          <p:cNvPr id="103" name="矩形 102">
+            <a:extLst>
+              <a:ext uri="{FF2B5EF4-FFF2-40B4-BE49-F238E27FC236}">
+                <a16:creationId xmlns:a16="http://schemas.microsoft.com/office/drawing/2014/main" id="{77BB706A-761D-478F-8E66-8709C10E373D}"/>
+              </a:ext>
+            </a:extLst>
+          </p:cNvPr>
+          <p:cNvSpPr/>
+          <p:nvPr/>
+        </p:nvSpPr>
+        <p:spPr>
+          <a:xfrm>
+            <a:off x="9727504" y="4964542"/>
+            <a:ext cx="295274" cy="276999"/>
+          </a:xfrm>
+          <a:prstGeom prst="rect">
+            <a:avLst/>
+          </a:prstGeom>
+        </p:spPr>
+        <p:txBody>
+          <a:bodyPr wrap="none">
+            <a:spAutoFit/>
+          </a:bodyPr>
+          <a:lstStyle/>
+          <a:p>
+            <a:r>
+              <a:rPr lang="en-US" altLang="zh-TW" sz="1200" dirty="0">
+                <a:solidFill>
+                  <a:schemeClr val="dk1"/>
+                </a:solidFill>
+                <a:latin typeface="Times New Roman" panose="02020603050405020304" pitchFamily="18" charset="0"/>
+                <a:cs typeface="Times New Roman" panose="02020603050405020304" pitchFamily="18" charset="0"/>
+              </a:rPr>
+              <a:t>N</a:t>
+            </a:r>
+            <a:endParaRPr lang="zh-TW" altLang="en-US" sz="1200" dirty="0"/>
+          </a:p>
+        </p:txBody>
+      </p:sp>
+      <p:sp>
+        <p:nvSpPr>
+          <p:cNvPr id="104" name="矩形 103">
+            <a:extLst>
+              <a:ext uri="{FF2B5EF4-FFF2-40B4-BE49-F238E27FC236}">
+                <a16:creationId xmlns:a16="http://schemas.microsoft.com/office/drawing/2014/main" id="{4F96FB31-B243-42B4-8586-4200998B246F}"/>
+              </a:ext>
+            </a:extLst>
+          </p:cNvPr>
+          <p:cNvSpPr/>
+          <p:nvPr/>
+        </p:nvSpPr>
+        <p:spPr>
+          <a:xfrm>
+            <a:off x="10381590" y="4333278"/>
+            <a:ext cx="295274" cy="276999"/>
+          </a:xfrm>
+          <a:prstGeom prst="rect">
+            <a:avLst/>
+          </a:prstGeom>
+        </p:spPr>
+        <p:txBody>
+          <a:bodyPr wrap="none">
+            <a:spAutoFit/>
+          </a:bodyPr>
+          <a:lstStyle/>
+          <a:p>
+            <a:r>
+              <a:rPr lang="en-US" altLang="zh-TW" sz="1200" dirty="0">
+                <a:solidFill>
+                  <a:schemeClr val="dk1"/>
+                </a:solidFill>
+                <a:latin typeface="Times New Roman" panose="02020603050405020304" pitchFamily="18" charset="0"/>
+                <a:cs typeface="Times New Roman" panose="02020603050405020304" pitchFamily="18" charset="0"/>
+              </a:rPr>
+              <a:t>Y</a:t>
+            </a:r>
+            <a:endParaRPr lang="zh-TW" altLang="en-US" sz="1200" dirty="0"/>
+          </a:p>
+        </p:txBody>
+      </p:sp>
+      <p:cxnSp>
+        <p:nvCxnSpPr>
+          <p:cNvPr id="105" name="直線單箭頭接點 104">
+            <a:extLst>
+              <a:ext uri="{FF2B5EF4-FFF2-40B4-BE49-F238E27FC236}">
+                <a16:creationId xmlns:a16="http://schemas.microsoft.com/office/drawing/2014/main" id="{03792AD4-829E-4F31-991C-4DDD5F7F7B42}"/>
+              </a:ext>
+            </a:extLst>
+          </p:cNvPr>
+          <p:cNvCxnSpPr>
+            <a:cxnSpLocks/>
+          </p:cNvCxnSpPr>
+          <p:nvPr/>
+        </p:nvCxnSpPr>
+        <p:spPr>
+          <a:xfrm>
+            <a:off x="10464519" y="3476665"/>
+            <a:ext cx="424689" cy="0"/>
+          </a:xfrm>
+          <a:prstGeom prst="straightConnector1">
+            <a:avLst/>
+          </a:prstGeom>
+          <a:ln>
+            <a:headEnd type="none" w="med" len="med"/>
+            <a:tailEnd type="none" w="med" len="med"/>
+          </a:ln>
+        </p:spPr>
+        <p:style>
+          <a:lnRef idx="3">
+            <a:schemeClr val="accent2"/>
+          </a:lnRef>
+          <a:fillRef idx="0">
+            <a:schemeClr val="accent2"/>
+          </a:fillRef>
+          <a:effectRef idx="2">
+            <a:schemeClr val="accent2"/>
+          </a:effectRef>
+          <a:fontRef idx="minor">
+            <a:schemeClr val="tx1"/>
+          </a:fontRef>
+        </p:style>
+      </p:cxnSp>
+      <p:cxnSp>
+        <p:nvCxnSpPr>
+          <p:cNvPr id="111" name="直線單箭頭接點 110">
+            <a:extLst>
+              <a:ext uri="{FF2B5EF4-FFF2-40B4-BE49-F238E27FC236}">
+                <a16:creationId xmlns:a16="http://schemas.microsoft.com/office/drawing/2014/main" id="{24FFACBF-7FA4-4945-99C4-F968BAC48ACC}"/>
+              </a:ext>
+            </a:extLst>
+          </p:cNvPr>
+          <p:cNvCxnSpPr>
+            <a:cxnSpLocks/>
+            <a:endCxn id="72" idx="0"/>
+          </p:cNvCxnSpPr>
+          <p:nvPr/>
+        </p:nvCxnSpPr>
+        <p:spPr>
+          <a:xfrm>
+            <a:off x="11561791" y="2490985"/>
+            <a:ext cx="2288" cy="1813569"/>
+          </a:xfrm>
+          <a:prstGeom prst="straightConnector1">
+            <a:avLst/>
+          </a:prstGeom>
+          <a:ln>
+            <a:headEnd type="none" w="med" len="med"/>
+            <a:tailEnd type="none" w="med" len="med"/>
+          </a:ln>
+        </p:spPr>
+        <p:style>
+          <a:lnRef idx="3">
+            <a:schemeClr val="accent2"/>
+          </a:lnRef>
+          <a:fillRef idx="0">
+            <a:schemeClr val="accent2"/>
+          </a:fillRef>
+          <a:effectRef idx="2">
+            <a:schemeClr val="accent2"/>
+          </a:effectRef>
+          <a:fontRef idx="minor">
+            <a:schemeClr val="tx1"/>
+          </a:fontRef>
+        </p:style>
+      </p:cxnSp>
+      <p:cxnSp>
+        <p:nvCxnSpPr>
+          <p:cNvPr id="113" name="直線單箭頭接點 112">
+            <a:extLst>
+              <a:ext uri="{FF2B5EF4-FFF2-40B4-BE49-F238E27FC236}">
+                <a16:creationId xmlns:a16="http://schemas.microsoft.com/office/drawing/2014/main" id="{E74C44B4-D369-41D5-AB23-1603DCCCACF2}"/>
+              </a:ext>
+            </a:extLst>
+          </p:cNvPr>
+          <p:cNvCxnSpPr>
+            <a:cxnSpLocks/>
+            <a:stCxn id="55" idx="3"/>
+          </p:cNvCxnSpPr>
+          <p:nvPr/>
+        </p:nvCxnSpPr>
+        <p:spPr>
+          <a:xfrm flipV="1">
+            <a:off x="10686472" y="2503459"/>
+            <a:ext cx="875319" cy="6167"/>
+          </a:xfrm>
+          <a:prstGeom prst="straightConnector1">
+            <a:avLst/>
+          </a:prstGeom>
+          <a:ln>
+            <a:headEnd type="triangle" w="med" len="med"/>
+            <a:tailEnd type="none" w="med" len="med"/>
+          </a:ln>
+        </p:spPr>
+        <p:style>
+          <a:lnRef idx="3">
+            <a:schemeClr val="accent2"/>
+          </a:lnRef>
+          <a:fillRef idx="0">
+            <a:schemeClr val="accent2"/>
+          </a:fillRef>
+          <a:effectRef idx="2">
+            <a:schemeClr val="accent2"/>
+          </a:effectRef>
+          <a:fontRef idx="minor">
+            <a:schemeClr val="tx1"/>
+          </a:fontRef>
+        </p:style>
+      </p:cxnSp>
+      <p:sp>
+        <p:nvSpPr>
+          <p:cNvPr id="123" name="矩形 122">
+            <a:extLst>
+              <a:ext uri="{FF2B5EF4-FFF2-40B4-BE49-F238E27FC236}">
+                <a16:creationId xmlns:a16="http://schemas.microsoft.com/office/drawing/2014/main" id="{555E4D85-BAA2-4608-A187-296778F5EA68}"/>
+              </a:ext>
+            </a:extLst>
+          </p:cNvPr>
+          <p:cNvSpPr/>
+          <p:nvPr/>
+        </p:nvSpPr>
+        <p:spPr>
+          <a:xfrm>
+            <a:off x="10789417" y="2232605"/>
+            <a:ext cx="1125215" cy="276999"/>
+          </a:xfrm>
+          <a:prstGeom prst="rect">
+            <a:avLst/>
+          </a:prstGeom>
+        </p:spPr>
+        <p:txBody>
+          <a:bodyPr wrap="square">
+            <a:spAutoFit/>
+          </a:bodyPr>
+          <a:lstStyle/>
+          <a:p>
+            <a:r>
+              <a:rPr lang="en-US" altLang="zh-TW" sz="1200" dirty="0">
+                <a:solidFill>
+                  <a:schemeClr val="dk1"/>
+                </a:solidFill>
+                <a:latin typeface="Times New Roman" panose="02020603050405020304" pitchFamily="18" charset="0"/>
+                <a:cs typeface="Times New Roman" panose="02020603050405020304" pitchFamily="18" charset="0"/>
+              </a:rPr>
+              <a:t>next character</a:t>
+            </a:r>
+            <a:endParaRPr lang="zh-TW" altLang="en-US" sz="1200" dirty="0"/>
+          </a:p>
+        </p:txBody>
+      </p:sp>
+      <p:sp>
+        <p:nvSpPr>
+          <p:cNvPr id="124" name="流程圖: 程序 123">
+            <a:extLst>
+              <a:ext uri="{FF2B5EF4-FFF2-40B4-BE49-F238E27FC236}">
+                <a16:creationId xmlns:a16="http://schemas.microsoft.com/office/drawing/2014/main" id="{729544FB-3E47-45D8-9D7E-1D339C474B7F}"/>
+              </a:ext>
+            </a:extLst>
+          </p:cNvPr>
+          <p:cNvSpPr/>
+          <p:nvPr/>
+        </p:nvSpPr>
+        <p:spPr>
+          <a:xfrm>
+            <a:off x="8955866" y="5307277"/>
+            <a:ext cx="1616693" cy="407877"/>
+          </a:xfrm>
+          <a:prstGeom prst="flowChartProcess">
+            <a:avLst/>
+          </a:prstGeom>
+        </p:spPr>
+        <p:style>
+          <a:lnRef idx="1">
+            <a:schemeClr val="dk1"/>
+          </a:lnRef>
+          <a:fillRef idx="2">
+            <a:schemeClr val="dk1"/>
+          </a:fillRef>
+          <a:effectRef idx="1">
+            <a:schemeClr val="dk1"/>
+          </a:effectRef>
+          <a:fontRef idx="minor">
+            <a:schemeClr val="dk1"/>
+          </a:fontRef>
+        </p:style>
+        <p:txBody>
+          <a:bodyPr rtlCol="0" anchor="ctr"/>
+          <a:lstStyle/>
+          <a:p>
+            <a:pPr algn="ctr"/>
+            <a:r>
+              <a:rPr lang="en-US" altLang="zh-TW" sz="1400" dirty="0"/>
+              <a:t>Record</a:t>
+            </a:r>
+          </a:p>
+          <a:p>
+            <a:pPr algn="ctr"/>
+            <a:r>
+              <a:rPr lang="en-US" altLang="zh-TW" sz="1400" dirty="0"/>
+              <a:t>Character &amp;Position</a:t>
+            </a:r>
+          </a:p>
+        </p:txBody>
+      </p:sp>
+      <p:cxnSp>
+        <p:nvCxnSpPr>
+          <p:cNvPr id="126" name="直線單箭頭接點 125">
+            <a:extLst>
+              <a:ext uri="{FF2B5EF4-FFF2-40B4-BE49-F238E27FC236}">
+                <a16:creationId xmlns:a16="http://schemas.microsoft.com/office/drawing/2014/main" id="{2E3EE441-16C8-4294-936A-29CD0FDE01D8}"/>
+              </a:ext>
+            </a:extLst>
+          </p:cNvPr>
+          <p:cNvCxnSpPr>
+            <a:cxnSpLocks/>
+          </p:cNvCxnSpPr>
+          <p:nvPr/>
+        </p:nvCxnSpPr>
+        <p:spPr>
+          <a:xfrm>
+            <a:off x="9764213" y="5728705"/>
+            <a:ext cx="0" cy="256699"/>
+          </a:xfrm>
+          <a:prstGeom prst="straightConnector1">
+            <a:avLst/>
+          </a:prstGeom>
+          <a:ln>
+            <a:headEnd type="none" w="med" len="med"/>
+            <a:tailEnd type="triangle" w="med" len="med"/>
+          </a:ln>
+        </p:spPr>
+        <p:style>
+          <a:lnRef idx="3">
+            <a:schemeClr val="accent2"/>
+          </a:lnRef>
+          <a:fillRef idx="0">
+            <a:schemeClr val="accent2"/>
+          </a:fillRef>
+          <a:effectRef idx="2">
+            <a:schemeClr val="accent2"/>
+          </a:effectRef>
+          <a:fontRef idx="minor">
+            <a:schemeClr val="tx1"/>
+          </a:fontRef>
+        </p:style>
+      </p:cxnSp>
+      <p:sp>
+        <p:nvSpPr>
+          <p:cNvPr id="128" name="流程圖: 程序 127">
+            <a:extLst>
+              <a:ext uri="{FF2B5EF4-FFF2-40B4-BE49-F238E27FC236}">
+                <a16:creationId xmlns:a16="http://schemas.microsoft.com/office/drawing/2014/main" id="{DB954250-9F2C-4CEE-9D27-2E4A5D39DAEE}"/>
+              </a:ext>
+            </a:extLst>
+          </p:cNvPr>
+          <p:cNvSpPr/>
+          <p:nvPr/>
+        </p:nvSpPr>
+        <p:spPr>
+          <a:xfrm>
+            <a:off x="8955866" y="5985404"/>
+            <a:ext cx="1616690" cy="626765"/>
+          </a:xfrm>
+          <a:prstGeom prst="flowChartProcess">
+            <a:avLst/>
+          </a:prstGeom>
+        </p:spPr>
+        <p:style>
+          <a:lnRef idx="1">
+            <a:schemeClr val="dk1"/>
+          </a:lnRef>
+          <a:fillRef idx="2">
+            <a:schemeClr val="dk1"/>
+          </a:fillRef>
+          <a:effectRef idx="1">
+            <a:schemeClr val="dk1"/>
+          </a:effectRef>
+          <a:fontRef idx="minor">
+            <a:schemeClr val="dk1"/>
+          </a:fontRef>
+        </p:style>
+        <p:txBody>
+          <a:bodyPr rtlCol="0" anchor="ctr"/>
+          <a:lstStyle/>
+          <a:p>
+            <a:pPr algn="ctr"/>
+            <a:r>
+              <a:rPr lang="en-US" altLang="zh-TW" sz="1400" dirty="0"/>
+              <a:t>display red color where the character is not the same</a:t>
+            </a:r>
+          </a:p>
+        </p:txBody>
+      </p:sp>
+      <p:cxnSp>
+        <p:nvCxnSpPr>
+          <p:cNvPr id="130" name="直線單箭頭接點 129">
+            <a:extLst>
+              <a:ext uri="{FF2B5EF4-FFF2-40B4-BE49-F238E27FC236}">
+                <a16:creationId xmlns:a16="http://schemas.microsoft.com/office/drawing/2014/main" id="{FC03CE7F-DD87-49C6-8A23-BD084DBDA6C1}"/>
+              </a:ext>
+            </a:extLst>
+          </p:cNvPr>
+          <p:cNvCxnSpPr>
+            <a:cxnSpLocks/>
+            <a:endCxn id="128" idx="1"/>
+          </p:cNvCxnSpPr>
+          <p:nvPr/>
+        </p:nvCxnSpPr>
+        <p:spPr>
+          <a:xfrm>
+            <a:off x="8418512" y="6298786"/>
+            <a:ext cx="537354" cy="1"/>
+          </a:xfrm>
+          <a:prstGeom prst="straightConnector1">
+            <a:avLst/>
+          </a:prstGeom>
+          <a:ln>
+            <a:headEnd type="none" w="med" len="med"/>
+            <a:tailEnd type="none" w="med" len="med"/>
+          </a:ln>
+        </p:spPr>
+        <p:style>
+          <a:lnRef idx="3">
+            <a:schemeClr val="accent2"/>
+          </a:lnRef>
+          <a:fillRef idx="0">
+            <a:schemeClr val="accent2"/>
+          </a:fillRef>
+          <a:effectRef idx="2">
+            <a:schemeClr val="accent2"/>
+          </a:effectRef>
+          <a:fontRef idx="minor">
+            <a:schemeClr val="tx1"/>
+          </a:fontRef>
+        </p:style>
+      </p:cxnSp>
+      <p:cxnSp>
+        <p:nvCxnSpPr>
+          <p:cNvPr id="133" name="直線接點 132">
+            <a:extLst>
+              <a:ext uri="{FF2B5EF4-FFF2-40B4-BE49-F238E27FC236}">
+                <a16:creationId xmlns:a16="http://schemas.microsoft.com/office/drawing/2014/main" id="{7A03AFB3-C84F-469B-8113-8633D293A0C6}"/>
+              </a:ext>
+            </a:extLst>
+          </p:cNvPr>
+          <p:cNvCxnSpPr>
+            <a:cxnSpLocks/>
+          </p:cNvCxnSpPr>
+          <p:nvPr/>
+        </p:nvCxnSpPr>
+        <p:spPr>
+          <a:xfrm>
+            <a:off x="8425648" y="2490985"/>
+            <a:ext cx="0" cy="3807801"/>
+          </a:xfrm>
+          <a:prstGeom prst="line">
+            <a:avLst/>
+          </a:prstGeom>
+        </p:spPr>
+        <p:style>
+          <a:lnRef idx="3">
+            <a:schemeClr val="accent2"/>
+          </a:lnRef>
+          <a:fillRef idx="0">
+            <a:schemeClr val="accent2"/>
+          </a:fillRef>
+          <a:effectRef idx="2">
+            <a:schemeClr val="accent2"/>
+          </a:effectRef>
+          <a:fontRef idx="minor">
+            <a:schemeClr val="tx1"/>
+          </a:fontRef>
+        </p:style>
+      </p:cxnSp>
+      <p:cxnSp>
+        <p:nvCxnSpPr>
+          <p:cNvPr id="136" name="直線單箭頭接點 135">
+            <a:extLst>
+              <a:ext uri="{FF2B5EF4-FFF2-40B4-BE49-F238E27FC236}">
+                <a16:creationId xmlns:a16="http://schemas.microsoft.com/office/drawing/2014/main" id="{E444174D-68C3-4269-BC43-FDBBE29B9B47}"/>
+              </a:ext>
+            </a:extLst>
+          </p:cNvPr>
+          <p:cNvCxnSpPr>
+            <a:cxnSpLocks/>
+          </p:cNvCxnSpPr>
+          <p:nvPr/>
+        </p:nvCxnSpPr>
+        <p:spPr>
+          <a:xfrm>
+            <a:off x="8418512" y="2503459"/>
+            <a:ext cx="398979" cy="0"/>
+          </a:xfrm>
+          <a:prstGeom prst="straightConnector1">
+            <a:avLst/>
+          </a:prstGeom>
+          <a:ln>
+            <a:headEnd type="none" w="med" len="med"/>
+            <a:tailEnd type="triangle" w="med" len="med"/>
+          </a:ln>
+        </p:spPr>
+        <p:style>
+          <a:lnRef idx="3">
+            <a:schemeClr val="accent2"/>
+          </a:lnRef>
+          <a:fillRef idx="0">
+            <a:schemeClr val="accent2"/>
+          </a:fillRef>
+          <a:effectRef idx="2">
+            <a:schemeClr val="accent2"/>
+          </a:effectRef>
+          <a:fontRef idx="minor">
+            <a:schemeClr val="tx1"/>
+          </a:fontRef>
+        </p:style>
+      </p:cxnSp>
+      <p:sp>
+        <p:nvSpPr>
+          <p:cNvPr id="140" name="矩形 139">
+            <a:extLst>
+              <a:ext uri="{FF2B5EF4-FFF2-40B4-BE49-F238E27FC236}">
+                <a16:creationId xmlns:a16="http://schemas.microsoft.com/office/drawing/2014/main" id="{CE0B5DED-8C99-4D24-89BB-AF9DCF09D712}"/>
+              </a:ext>
+            </a:extLst>
+          </p:cNvPr>
+          <p:cNvSpPr/>
+          <p:nvPr/>
+        </p:nvSpPr>
+        <p:spPr>
+          <a:xfrm rot="5400000">
+            <a:off x="7994404" y="5188370"/>
+            <a:ext cx="1125215" cy="276999"/>
+          </a:xfrm>
+          <a:prstGeom prst="rect">
+            <a:avLst/>
+          </a:prstGeom>
+        </p:spPr>
+        <p:txBody>
+          <a:bodyPr wrap="square">
+            <a:spAutoFit/>
+          </a:bodyPr>
+          <a:lstStyle/>
+          <a:p>
+            <a:r>
+              <a:rPr lang="en-US" altLang="zh-TW" sz="1200" dirty="0">
+                <a:solidFill>
+                  <a:schemeClr val="dk1"/>
+                </a:solidFill>
+                <a:latin typeface="Times New Roman" panose="02020603050405020304" pitchFamily="18" charset="0"/>
+                <a:cs typeface="Times New Roman" panose="02020603050405020304" pitchFamily="18" charset="0"/>
+              </a:rPr>
+              <a:t>next character</a:t>
+            </a:r>
+            <a:endParaRPr lang="zh-TW" altLang="en-US" sz="1200" dirty="0"/>
+          </a:p>
+        </p:txBody>
+      </p:sp>
+      <p:sp>
+        <p:nvSpPr>
+          <p:cNvPr id="141" name="流程圖: 決策 140">
+            <a:extLst>
+              <a:ext uri="{FF2B5EF4-FFF2-40B4-BE49-F238E27FC236}">
+                <a16:creationId xmlns:a16="http://schemas.microsoft.com/office/drawing/2014/main" id="{7D177DF3-91B6-4822-8CF5-CAE347235888}"/>
+              </a:ext>
+            </a:extLst>
+          </p:cNvPr>
+          <p:cNvSpPr/>
+          <p:nvPr/>
+        </p:nvSpPr>
+        <p:spPr>
+          <a:xfrm>
+            <a:off x="9026562" y="3045857"/>
+            <a:ext cx="1451810" cy="861617"/>
+          </a:xfrm>
+          <a:prstGeom prst="flowChartDecision">
+            <a:avLst/>
+          </a:prstGeom>
+        </p:spPr>
+        <p:style>
+          <a:lnRef idx="1">
+            <a:schemeClr val="dk1"/>
+          </a:lnRef>
+          <a:fillRef idx="2">
+            <a:schemeClr val="dk1"/>
+          </a:fillRef>
+          <a:effectRef idx="1">
+            <a:schemeClr val="dk1"/>
+          </a:effectRef>
+          <a:fontRef idx="minor">
+            <a:schemeClr val="dk1"/>
+          </a:fontRef>
+        </p:style>
+        <p:txBody>
+          <a:bodyPr rot="0" spcFirstLastPara="0" vertOverflow="overflow" horzOverflow="overflow" vert="horz" wrap="square" lIns="91440" tIns="45720" rIns="91440" bIns="45720" numCol="1" spcCol="0" rtlCol="0" fromWordArt="0" anchor="ctr" anchorCtr="0" forceAA="0" compatLnSpc="1">
+            <a:prstTxWarp prst="textNoShape">
+              <a:avLst/>
+            </a:prstTxWarp>
+            <a:noAutofit/>
+          </a:bodyPr>
+          <a:lstStyle/>
+          <a:p>
+            <a:pPr algn="ctr"/>
+            <a:r>
+              <a:rPr lang="en-US" altLang="zh-TW" sz="1400" dirty="0">
+                <a:solidFill>
+                  <a:schemeClr val="dk1"/>
+                </a:solidFill>
+              </a:rPr>
+              <a:t>End of content </a:t>
+            </a:r>
+            <a:r>
+              <a:rPr lang="en-US" altLang="zh-TW" sz="1400" dirty="0"/>
+              <a:t>(y/n) </a:t>
+            </a:r>
+            <a:r>
+              <a:rPr lang="en-US" altLang="zh-TW" sz="1400" dirty="0">
+                <a:latin typeface="Arial" panose="020B0604020202020204" pitchFamily="34" charset="0"/>
+                <a:cs typeface="Arial" panose="020B0604020202020204" pitchFamily="34" charset="0"/>
+              </a:rPr>
+              <a:t>?</a:t>
+            </a:r>
+            <a:endParaRPr lang="zh-TW" altLang="en-US" sz="1400" dirty="0">
+              <a:solidFill>
+                <a:schemeClr val="dk1"/>
+              </a:solidFill>
+              <a:latin typeface="Arial" panose="020B0604020202020204" pitchFamily="34" charset="0"/>
+              <a:cs typeface="Arial" panose="020B0604020202020204" pitchFamily="34" charset="0"/>
+            </a:endParaRPr>
+          </a:p>
+        </p:txBody>
+      </p:sp>
+      <p:cxnSp>
+        <p:nvCxnSpPr>
+          <p:cNvPr id="145" name="直線單箭頭接點 144">
+            <a:extLst>
+              <a:ext uri="{FF2B5EF4-FFF2-40B4-BE49-F238E27FC236}">
+                <a16:creationId xmlns:a16="http://schemas.microsoft.com/office/drawing/2014/main" id="{B8B229FD-FDF3-4667-B6AE-34CB75ACC751}"/>
+              </a:ext>
+            </a:extLst>
+          </p:cNvPr>
+          <p:cNvCxnSpPr>
+            <a:cxnSpLocks/>
+          </p:cNvCxnSpPr>
+          <p:nvPr/>
+        </p:nvCxnSpPr>
+        <p:spPr>
+          <a:xfrm>
+            <a:off x="9748338" y="2808212"/>
+            <a:ext cx="0" cy="246729"/>
+          </a:xfrm>
+          <a:prstGeom prst="straightConnector1">
+            <a:avLst/>
+          </a:prstGeom>
+          <a:ln>
+            <a:headEnd type="none" w="med" len="med"/>
+            <a:tailEnd type="triangle" w="med" len="med"/>
+          </a:ln>
+        </p:spPr>
+        <p:style>
+          <a:lnRef idx="3">
+            <a:schemeClr val="accent2"/>
+          </a:lnRef>
+          <a:fillRef idx="0">
+            <a:schemeClr val="accent2"/>
+          </a:fillRef>
+          <a:effectRef idx="2">
+            <a:schemeClr val="accent2"/>
+          </a:effectRef>
+          <a:fontRef idx="minor">
+            <a:schemeClr val="tx1"/>
+          </a:fontRef>
+        </p:style>
+      </p:cxnSp>
+      <p:cxnSp>
+        <p:nvCxnSpPr>
+          <p:cNvPr id="148" name="直線單箭頭接點 147">
+            <a:extLst>
+              <a:ext uri="{FF2B5EF4-FFF2-40B4-BE49-F238E27FC236}">
+                <a16:creationId xmlns:a16="http://schemas.microsoft.com/office/drawing/2014/main" id="{CE59DDCF-A299-4F1E-BB1F-52C42D92F655}"/>
+              </a:ext>
+            </a:extLst>
+          </p:cNvPr>
+          <p:cNvCxnSpPr>
+            <a:cxnSpLocks/>
+          </p:cNvCxnSpPr>
+          <p:nvPr/>
+        </p:nvCxnSpPr>
+        <p:spPr>
+          <a:xfrm>
+            <a:off x="9756931" y="3909268"/>
+            <a:ext cx="0" cy="274193"/>
+          </a:xfrm>
+          <a:prstGeom prst="straightConnector1">
+            <a:avLst/>
+          </a:prstGeom>
+          <a:ln>
+            <a:headEnd type="none" w="med" len="med"/>
+            <a:tailEnd type="triangle" w="med" len="med"/>
+          </a:ln>
+        </p:spPr>
+        <p:style>
+          <a:lnRef idx="3">
+            <a:schemeClr val="accent2"/>
+          </a:lnRef>
+          <a:fillRef idx="0">
+            <a:schemeClr val="accent2"/>
+          </a:fillRef>
+          <a:effectRef idx="2">
+            <a:schemeClr val="accent2"/>
+          </a:effectRef>
+          <a:fontRef idx="minor">
+            <a:schemeClr val="tx1"/>
+          </a:fontRef>
+        </p:style>
+      </p:cxnSp>
+      <p:sp>
+        <p:nvSpPr>
+          <p:cNvPr id="167" name="矩形 166">
+            <a:extLst>
+              <a:ext uri="{FF2B5EF4-FFF2-40B4-BE49-F238E27FC236}">
+                <a16:creationId xmlns:a16="http://schemas.microsoft.com/office/drawing/2014/main" id="{F503CBEF-AA47-450C-AD93-9C3EDD389EF2}"/>
+              </a:ext>
+            </a:extLst>
+          </p:cNvPr>
+          <p:cNvSpPr/>
+          <p:nvPr/>
+        </p:nvSpPr>
+        <p:spPr>
+          <a:xfrm>
+            <a:off x="9727504" y="3882516"/>
+            <a:ext cx="295274" cy="276999"/>
+          </a:xfrm>
+          <a:prstGeom prst="rect">
+            <a:avLst/>
+          </a:prstGeom>
+        </p:spPr>
+        <p:txBody>
+          <a:bodyPr wrap="none">
+            <a:spAutoFit/>
+          </a:bodyPr>
+          <a:lstStyle/>
+          <a:p>
+            <a:r>
+              <a:rPr lang="en-US" altLang="zh-TW" sz="1200" dirty="0">
+                <a:solidFill>
+                  <a:schemeClr val="dk1"/>
+                </a:solidFill>
+                <a:latin typeface="Times New Roman" panose="02020603050405020304" pitchFamily="18" charset="0"/>
+                <a:cs typeface="Times New Roman" panose="02020603050405020304" pitchFamily="18" charset="0"/>
+              </a:rPr>
+              <a:t>N</a:t>
+            </a:r>
+            <a:endParaRPr lang="zh-TW" altLang="en-US" sz="1200" dirty="0"/>
+          </a:p>
+        </p:txBody>
+      </p:sp>
+      <p:sp>
+        <p:nvSpPr>
+          <p:cNvPr id="168" name="矩形 167">
+            <a:extLst>
+              <a:ext uri="{FF2B5EF4-FFF2-40B4-BE49-F238E27FC236}">
+                <a16:creationId xmlns:a16="http://schemas.microsoft.com/office/drawing/2014/main" id="{B3A22E1A-15BA-4984-8C57-EF1D9532AEEE}"/>
+              </a:ext>
+            </a:extLst>
+          </p:cNvPr>
+          <p:cNvSpPr/>
+          <p:nvPr/>
+        </p:nvSpPr>
+        <p:spPr>
+          <a:xfrm>
+            <a:off x="10389672" y="3225890"/>
+            <a:ext cx="265393" cy="276999"/>
+          </a:xfrm>
+          <a:prstGeom prst="rect">
+            <a:avLst/>
+          </a:prstGeom>
+        </p:spPr>
+        <p:txBody>
+          <a:bodyPr wrap="square">
+            <a:spAutoFit/>
+          </a:bodyPr>
+          <a:lstStyle/>
+          <a:p>
+            <a:r>
+              <a:rPr lang="en-US" altLang="zh-TW" sz="1200" dirty="0">
+                <a:solidFill>
+                  <a:schemeClr val="dk1"/>
+                </a:solidFill>
+                <a:latin typeface="Times New Roman" panose="02020603050405020304" pitchFamily="18" charset="0"/>
+                <a:cs typeface="Times New Roman" panose="02020603050405020304" pitchFamily="18" charset="0"/>
+              </a:rPr>
+              <a:t>Y</a:t>
+            </a:r>
+            <a:endParaRPr lang="zh-TW" altLang="en-US" sz="1200" dirty="0"/>
+          </a:p>
+        </p:txBody>
+      </p:sp>
+      <p:cxnSp>
+        <p:nvCxnSpPr>
+          <p:cNvPr id="169" name="直線單箭頭接點 168">
+            <a:extLst>
+              <a:ext uri="{FF2B5EF4-FFF2-40B4-BE49-F238E27FC236}">
+                <a16:creationId xmlns:a16="http://schemas.microsoft.com/office/drawing/2014/main" id="{7EEDD143-7AB1-482A-B671-5F3863B41C5B}"/>
+              </a:ext>
+            </a:extLst>
+          </p:cNvPr>
+          <p:cNvCxnSpPr>
+            <a:cxnSpLocks/>
+          </p:cNvCxnSpPr>
+          <p:nvPr/>
+        </p:nvCxnSpPr>
+        <p:spPr>
+          <a:xfrm flipV="1">
+            <a:off x="10490118" y="4601370"/>
+            <a:ext cx="598598" cy="1770"/>
+          </a:xfrm>
+          <a:prstGeom prst="straightConnector1">
+            <a:avLst/>
+          </a:prstGeom>
+          <a:ln>
+            <a:headEnd type="none" w="med" len="med"/>
+            <a:tailEnd type="triangle" w="med" len="med"/>
+          </a:ln>
+        </p:spPr>
+        <p:style>
+          <a:lnRef idx="3">
+            <a:schemeClr val="accent2"/>
+          </a:lnRef>
+          <a:fillRef idx="0">
+            <a:schemeClr val="accent2"/>
+          </a:fillRef>
+          <a:effectRef idx="2">
+            <a:schemeClr val="accent2"/>
+          </a:effectRef>
+          <a:fontRef idx="minor">
+            <a:schemeClr val="tx1"/>
+          </a:fontRef>
+        </p:style>
+      </p:cxnSp>
+      <p:cxnSp>
+        <p:nvCxnSpPr>
+          <p:cNvPr id="171" name="直線單箭頭接點 170">
+            <a:extLst>
+              <a:ext uri="{FF2B5EF4-FFF2-40B4-BE49-F238E27FC236}">
+                <a16:creationId xmlns:a16="http://schemas.microsoft.com/office/drawing/2014/main" id="{C622320E-FEC4-41D1-8F8C-417641419E78}"/>
+              </a:ext>
+            </a:extLst>
+          </p:cNvPr>
+          <p:cNvCxnSpPr>
+            <a:cxnSpLocks/>
+          </p:cNvCxnSpPr>
+          <p:nvPr/>
+        </p:nvCxnSpPr>
+        <p:spPr>
+          <a:xfrm>
+            <a:off x="10885045" y="3476665"/>
+            <a:ext cx="0" cy="256699"/>
+          </a:xfrm>
+          <a:prstGeom prst="straightConnector1">
+            <a:avLst/>
+          </a:prstGeom>
+          <a:ln>
+            <a:headEnd type="none" w="med" len="med"/>
+            <a:tailEnd type="triangle" w="med" len="med"/>
+          </a:ln>
+        </p:spPr>
+        <p:style>
+          <a:lnRef idx="3">
+            <a:schemeClr val="accent2"/>
+          </a:lnRef>
+          <a:fillRef idx="0">
+            <a:schemeClr val="accent2"/>
+          </a:fillRef>
+          <a:effectRef idx="2">
+            <a:schemeClr val="accent2"/>
+          </a:effectRef>
+          <a:fontRef idx="minor">
+            <a:schemeClr val="tx1"/>
+          </a:fontRef>
+        </p:style>
+      </p:cxnSp>
+      <p:sp>
+        <p:nvSpPr>
+          <p:cNvPr id="172" name="流程圖: 結束點 171">
+            <a:extLst>
+              <a:ext uri="{FF2B5EF4-FFF2-40B4-BE49-F238E27FC236}">
+                <a16:creationId xmlns:a16="http://schemas.microsoft.com/office/drawing/2014/main" id="{6FB143EF-452E-455D-BCEC-6BEBF75DDC16}"/>
+              </a:ext>
+            </a:extLst>
+          </p:cNvPr>
+          <p:cNvSpPr/>
+          <p:nvPr/>
+        </p:nvSpPr>
+        <p:spPr>
+          <a:xfrm>
+            <a:off x="10572559" y="3735045"/>
+            <a:ext cx="649813" cy="327841"/>
+          </a:xfrm>
+          <a:prstGeom prst="flowChartTerminator">
+            <a:avLst/>
+          </a:prstGeom>
+        </p:spPr>
+        <p:style>
+          <a:lnRef idx="1">
+            <a:schemeClr val="dk1"/>
+          </a:lnRef>
+          <a:fillRef idx="2">
+            <a:schemeClr val="dk1"/>
+          </a:fillRef>
+          <a:effectRef idx="1">
+            <a:schemeClr val="dk1"/>
+          </a:effectRef>
+          <a:fontRef idx="minor">
+            <a:schemeClr val="dk1"/>
+          </a:fontRef>
+        </p:style>
+        <p:txBody>
+          <a:bodyPr rtlCol="0" anchor="ctr"/>
+          <a:lstStyle/>
+          <a:p>
+            <a:pPr algn="ctr"/>
+            <a:r>
+              <a:rPr lang="en-US" altLang="zh-TW" sz="1400" dirty="0">
+                <a:solidFill>
+                  <a:schemeClr val="dk1"/>
+                </a:solidFill>
+              </a:rPr>
+              <a:t> End</a:t>
+            </a:r>
+            <a:endParaRPr lang="zh-TW" altLang="en-US" sz="1400" dirty="0">
+              <a:solidFill>
+                <a:schemeClr val="dk1"/>
+              </a:solidFill>
+            </a:endParaRPr>
+          </a:p>
+        </p:txBody>
+      </p:sp>
+      <p:sp>
+        <p:nvSpPr>
+          <p:cNvPr id="174" name="流程圖: 接點 173">
+            <a:extLst>
+              <a:ext uri="{FF2B5EF4-FFF2-40B4-BE49-F238E27FC236}">
+                <a16:creationId xmlns:a16="http://schemas.microsoft.com/office/drawing/2014/main" id="{69640FD0-6ECF-478C-96C6-9FE61282F504}"/>
+              </a:ext>
+            </a:extLst>
+          </p:cNvPr>
+          <p:cNvSpPr/>
+          <p:nvPr/>
+        </p:nvSpPr>
+        <p:spPr>
+          <a:xfrm>
+            <a:off x="310905" y="5341090"/>
+            <a:ext cx="1040702" cy="970196"/>
+          </a:xfrm>
+          <a:prstGeom prst="flowChartConnector">
+            <a:avLst/>
+          </a:prstGeom>
+        </p:spPr>
+        <p:style>
+          <a:lnRef idx="1">
+            <a:schemeClr val="dk1"/>
+          </a:lnRef>
+          <a:fillRef idx="2">
+            <a:schemeClr val="dk1"/>
+          </a:fillRef>
+          <a:effectRef idx="1">
+            <a:schemeClr val="dk1"/>
+          </a:effectRef>
+          <a:fontRef idx="minor">
+            <a:schemeClr val="dk1"/>
+          </a:fontRef>
+        </p:style>
+        <p:txBody>
+          <a:bodyPr rtlCol="0" anchor="ctr"/>
+          <a:lstStyle/>
+          <a:p>
+            <a:pPr algn="ctr"/>
+            <a:endParaRPr lang="zh-TW" altLang="en-US">
+              <a:solidFill>
+                <a:schemeClr val="dk1"/>
+              </a:solidFill>
+            </a:endParaRPr>
+          </a:p>
+        </p:txBody>
+      </p:sp>
+      <p:sp>
+        <p:nvSpPr>
+          <p:cNvPr id="175" name="矩形 174">
+            <a:extLst>
+              <a:ext uri="{FF2B5EF4-FFF2-40B4-BE49-F238E27FC236}">
+                <a16:creationId xmlns:a16="http://schemas.microsoft.com/office/drawing/2014/main" id="{75A89A1D-3654-4936-907A-75FFE0A9B134}"/>
+              </a:ext>
+            </a:extLst>
+          </p:cNvPr>
+          <p:cNvSpPr/>
+          <p:nvPr/>
+        </p:nvSpPr>
+        <p:spPr>
+          <a:xfrm>
+            <a:off x="265722" y="5594995"/>
+            <a:ext cx="1138653" cy="523220"/>
+          </a:xfrm>
+          <a:prstGeom prst="rect">
+            <a:avLst/>
+          </a:prstGeom>
+        </p:spPr>
+        <p:txBody>
+          <a:bodyPr wrap="square">
+            <a:spAutoFit/>
+          </a:bodyPr>
+          <a:lstStyle/>
+          <a:p>
+            <a:pPr algn="ctr"/>
+            <a:r>
+              <a:rPr lang="en-US" altLang="zh-TW" sz="1400" dirty="0"/>
+              <a:t>Parse XML &amp; </a:t>
+            </a:r>
+          </a:p>
+          <a:p>
+            <a:pPr algn="ctr"/>
+            <a:r>
+              <a:rPr lang="en-US" altLang="zh-TW" sz="1400" dirty="0"/>
+              <a:t>JSON</a:t>
+            </a:r>
+            <a:endParaRPr lang="zh-TW" altLang="en-US" sz="1400" dirty="0"/>
+          </a:p>
+        </p:txBody>
+      </p:sp>
+    </p:spTree>
+    <p:extLst>
+      <p:ext uri="{BB962C8B-B14F-4D97-AF65-F5344CB8AC3E}">
+        <p14:creationId xmlns:p14="http://schemas.microsoft.com/office/powerpoint/2010/main" val="2525301511"/>
+      </p:ext>
+    </p:extLst>
+  </p:cSld>
+  <p:clrMapOvr>
+    <a:masterClrMapping/>
+  </p:clrMapOvr>
+</p:sld>
+</file>
+
+<file path=ppt/slides/slide5.xml><?xml version="1.0" encoding="utf-8"?>
+<p:sld xmlns:a="http://schemas.openxmlformats.org/drawingml/2006/main" xmlns:r="http://schemas.openxmlformats.org/officeDocument/2006/relationships" xmlns:p="http://schemas.openxmlformats.org/presentationml/2006/main">
+  <p:cSld>
+    <p:spTree>
+      <p:nvGrpSpPr>
+        <p:cNvPr id="1" name=""/>
+        <p:cNvGrpSpPr/>
+        <p:nvPr/>
+      </p:nvGrpSpPr>
+      <p:grpSpPr>
+        <a:xfrm>
+          <a:off x="0" y="0"/>
+          <a:ext cx="0" cy="0"/>
+          <a:chOff x="0" y="0"/>
+          <a:chExt cx="0" cy="0"/>
+        </a:xfrm>
+      </p:grpSpPr>
+      <p:sp>
+        <p:nvSpPr>
+          <p:cNvPr id="6" name="矩形 5">
+            <a:extLst>
+              <a:ext uri="{FF2B5EF4-FFF2-40B4-BE49-F238E27FC236}">
+                <a16:creationId xmlns:a16="http://schemas.microsoft.com/office/drawing/2014/main" id="{38BC9CD9-E478-4907-837C-F2707C28AF8F}"/>
+              </a:ext>
+            </a:extLst>
+          </p:cNvPr>
+          <p:cNvSpPr/>
+          <p:nvPr/>
+        </p:nvSpPr>
+        <p:spPr>
+          <a:xfrm>
+            <a:off x="1209759" y="724237"/>
+            <a:ext cx="8791997" cy="1201667"/>
+          </a:xfrm>
+          <a:prstGeom prst="rect">
+            <a:avLst/>
+          </a:prstGeom>
+          <a:noFill/>
+          <a:ln>
+            <a:noFill/>
+          </a:ln>
+        </p:spPr>
+        <p:style>
+          <a:lnRef idx="2">
+            <a:schemeClr val="dk1"/>
+          </a:lnRef>
+          <a:fillRef idx="1">
+            <a:schemeClr val="lt1"/>
+          </a:fillRef>
+          <a:effectRef idx="0">
+            <a:schemeClr val="dk1"/>
+          </a:effectRef>
+          <a:fontRef idx="minor">
+            <a:schemeClr val="dk1"/>
+          </a:fontRef>
+        </p:style>
+        <p:txBody>
+          <a:bodyPr rot="0" spcFirstLastPara="0" vertOverflow="overflow" horzOverflow="overflow" vert="horz" wrap="square" lIns="91440" tIns="45720" rIns="91440" bIns="45720" numCol="1" spcCol="0" rtlCol="0" fromWordArt="0" anchor="ctr" anchorCtr="0" forceAA="0" compatLnSpc="1">
+            <a:prstTxWarp prst="textNoShape">
+              <a:avLst/>
+            </a:prstTxWarp>
+            <a:noAutofit/>
+          </a:bodyPr>
+          <a:lstStyle/>
+          <a:p>
+            <a:r>
+              <a:rPr lang="en-US" altLang="zh-TW" sz="4800" b="1" dirty="0">
+                <a:ln/>
+                <a:pattFill prst="dkUpDiag">
+                  <a:fgClr>
+                    <a:schemeClr val="bg1">
+                      <a:lumMod val="50000"/>
+                    </a:schemeClr>
+                  </a:fgClr>
+                  <a:bgClr>
+                    <a:schemeClr val="tx1">
+                      <a:lumMod val="75000"/>
+                      <a:lumOff val="25000"/>
+                    </a:schemeClr>
+                  </a:bgClr>
+                </a:pattFill>
+                <a:effectLst>
+                  <a:outerShdw blurRad="38100" dist="19050" dir="2700000" algn="tl" rotWithShape="0">
+                    <a:schemeClr val="dk1">
+                      <a:lumMod val="50000"/>
+                      <a:alpha val="40000"/>
+                    </a:schemeClr>
+                  </a:outerShdw>
+                </a:effectLst>
+                <a:latin typeface="Yu Gothic UI" panose="020B0500000000000000" pitchFamily="34" charset="-128"/>
+                <a:ea typeface="Yu Gothic UI" panose="020B0500000000000000" pitchFamily="34" charset="-128"/>
+              </a:rPr>
+              <a:t>Flow Chart – </a:t>
+            </a:r>
+            <a:r>
+              <a:rPr lang="en-US" altLang="zh-TW" sz="2800" b="1" dirty="0">
+                <a:ln/>
+                <a:pattFill prst="dkUpDiag">
+                  <a:fgClr>
+                    <a:schemeClr val="bg1">
+                      <a:lumMod val="50000"/>
+                    </a:schemeClr>
+                  </a:fgClr>
+                  <a:bgClr>
+                    <a:schemeClr val="tx1">
+                      <a:lumMod val="75000"/>
+                      <a:lumOff val="25000"/>
+                    </a:schemeClr>
+                  </a:bgClr>
+                </a:pattFill>
+                <a:effectLst>
+                  <a:outerShdw blurRad="38100" dist="19050" dir="2700000" algn="tl" rotWithShape="0">
+                    <a:schemeClr val="dk1">
+                      <a:lumMod val="50000"/>
+                      <a:alpha val="40000"/>
+                    </a:schemeClr>
+                  </a:outerShdw>
+                </a:effectLst>
+                <a:latin typeface="Yu Gothic UI" panose="020B0500000000000000" pitchFamily="34" charset="-128"/>
+                <a:ea typeface="Yu Gothic UI" panose="020B0500000000000000" pitchFamily="34" charset="-128"/>
+              </a:rPr>
+              <a:t>Parse XML &amp; JSON </a:t>
             </a:r>
             <a:endParaRPr lang="zh-TW" altLang="en-US" sz="2800" b="1" dirty="0">
               <a:ln/>
@@ -22951,7 +26482,7 @@
         </p:nvSpPr>
         <p:spPr>
           <a:xfrm>
-            <a:off x="284202" y="3052119"/>
+            <a:off x="284202" y="3114465"/>
             <a:ext cx="885568" cy="687860"/>
           </a:xfrm>
           <a:prstGeom prst="flowChartMultidocument">
@@ -22999,7 +26530,7 @@
         </p:nvSpPr>
         <p:spPr>
           <a:xfrm>
-            <a:off x="3657593" y="2506060"/>
+            <a:off x="3657593" y="2568406"/>
             <a:ext cx="1083275" cy="768485"/>
           </a:xfrm>
           <a:prstGeom prst="flowChartProcess">
@@ -23054,7 +26585,7 @@
         </p:nvSpPr>
         <p:spPr>
           <a:xfrm>
-            <a:off x="3657593" y="3614354"/>
+            <a:off x="3657593" y="3676700"/>
             <a:ext cx="1083275" cy="768486"/>
           </a:xfrm>
           <a:prstGeom prst="flowChartProcess">
@@ -23114,7 +26645,7 @@
         </p:nvSpPr>
         <p:spPr>
           <a:xfrm>
-            <a:off x="1676826" y="2873980"/>
+            <a:off x="1676826" y="2936326"/>
             <a:ext cx="1320121" cy="1110039"/>
           </a:xfrm>
           <a:prstGeom prst="flowChartDecision">
@@ -23169,7 +26700,7 @@
         </p:nvCxnSpPr>
         <p:spPr>
           <a:xfrm>
-            <a:off x="1188433" y="3429000"/>
+            <a:off x="1188433" y="3491346"/>
             <a:ext cx="475466" cy="0"/>
           </a:xfrm>
           <a:prstGeom prst="straightConnector1">
@@ -23210,7 +26741,7 @@
         </p:nvCxnSpPr>
         <p:spPr>
           <a:xfrm>
-            <a:off x="2356477" y="3984019"/>
+            <a:off x="2356477" y="4046365"/>
             <a:ext cx="1298001" cy="14578"/>
           </a:xfrm>
           <a:prstGeom prst="straightConnector1">
@@ -23252,7 +26783,7 @@
         </p:nvCxnSpPr>
         <p:spPr>
           <a:xfrm>
-            <a:off x="2360595" y="2884621"/>
+            <a:off x="2360595" y="2946967"/>
             <a:ext cx="1298001" cy="14578"/>
           </a:xfrm>
           <a:prstGeom prst="straightConnector1">
@@ -23292,7 +26823,7 @@
         </p:nvSpPr>
         <p:spPr>
           <a:xfrm>
-            <a:off x="2564752" y="2605372"/>
+            <a:off x="2564752" y="2667718"/>
             <a:ext cx="972065" cy="337751"/>
           </a:xfrm>
           <a:prstGeom prst="rect">
@@ -23358,7 +26889,7 @@
         </p:nvSpPr>
         <p:spPr>
           <a:xfrm>
-            <a:off x="2564752" y="3689040"/>
+            <a:off x="2564752" y="3751386"/>
             <a:ext cx="1083275" cy="337751"/>
           </a:xfrm>
           <a:prstGeom prst="rect">
@@ -23446,7 +26977,7 @@
         </p:nvCxnSpPr>
         <p:spPr>
           <a:xfrm>
-            <a:off x="4749401" y="2887271"/>
+            <a:off x="4749401" y="2949617"/>
             <a:ext cx="288037" cy="0"/>
           </a:xfrm>
           <a:prstGeom prst="straightConnector1">
@@ -23486,7 +27017,7 @@
         </p:nvCxnSpPr>
         <p:spPr>
           <a:xfrm>
-            <a:off x="5037438" y="2346863"/>
+            <a:off x="5037438" y="2409209"/>
             <a:ext cx="0" cy="546987"/>
           </a:xfrm>
           <a:prstGeom prst="line">
@@ -23524,7 +27055,7 @@
         </p:nvCxnSpPr>
         <p:spPr>
           <a:xfrm>
-            <a:off x="5037438" y="2345744"/>
+            <a:off x="5037438" y="2408090"/>
             <a:ext cx="358346" cy="4025"/>
           </a:xfrm>
           <a:prstGeom prst="straightConnector1">
@@ -23566,7 +27097,7 @@
         </p:nvCxnSpPr>
         <p:spPr>
           <a:xfrm>
-            <a:off x="4749401" y="3986669"/>
+            <a:off x="4749401" y="4049015"/>
             <a:ext cx="288037" cy="0"/>
           </a:xfrm>
           <a:prstGeom prst="straightConnector1">
@@ -23606,7 +27137,7 @@
         </p:nvCxnSpPr>
         <p:spPr>
           <a:xfrm>
-            <a:off x="5037438" y="3994468"/>
+            <a:off x="5037438" y="4056814"/>
             <a:ext cx="0" cy="546987"/>
           </a:xfrm>
           <a:prstGeom prst="line">
@@ -23644,7 +27175,7 @@
         </p:nvCxnSpPr>
         <p:spPr>
           <a:xfrm>
-            <a:off x="5037438" y="4549891"/>
+            <a:off x="5037438" y="4612237"/>
             <a:ext cx="358346" cy="4025"/>
           </a:xfrm>
           <a:prstGeom prst="straightConnector1">
@@ -23684,7 +27215,7 @@
         </p:nvSpPr>
         <p:spPr>
           <a:xfrm>
-            <a:off x="5395784" y="1955265"/>
+            <a:off x="5395784" y="2017611"/>
             <a:ext cx="1083275" cy="768485"/>
           </a:xfrm>
           <a:prstGeom prst="flowChartProcess">
@@ -23739,7 +27270,7 @@
         </p:nvSpPr>
         <p:spPr>
           <a:xfrm>
-            <a:off x="5395784" y="4165648"/>
+            <a:off x="5395784" y="4227994"/>
             <a:ext cx="1083275" cy="768485"/>
           </a:xfrm>
           <a:prstGeom prst="flowChartProcess">
@@ -23794,7 +27325,7 @@
         </p:nvSpPr>
         <p:spPr>
           <a:xfrm>
-            <a:off x="5395784" y="2936897"/>
+            <a:off x="5395784" y="2999243"/>
             <a:ext cx="1099886" cy="628841"/>
           </a:xfrm>
           <a:prstGeom prst="flowChartProcess">
@@ -23853,7 +27384,7 @@
         </p:nvSpPr>
         <p:spPr>
           <a:xfrm>
-            <a:off x="5842687" y="2761543"/>
+            <a:off x="5842687" y="2823889"/>
             <a:ext cx="189468" cy="155381"/>
           </a:xfrm>
           <a:prstGeom prst="upArrow">
@@ -23897,7 +27428,7 @@
         </p:nvSpPr>
         <p:spPr>
           <a:xfrm>
-            <a:off x="5424625" y="5117824"/>
+            <a:off x="5424625" y="5180170"/>
             <a:ext cx="1083267" cy="321840"/>
           </a:xfrm>
           <a:prstGeom prst="flowChartProcess">
@@ -23956,7 +27487,7 @@
         </p:nvSpPr>
         <p:spPr>
           <a:xfrm>
-            <a:off x="5871520" y="4956832"/>
+            <a:off x="5871520" y="5019178"/>
             <a:ext cx="189468" cy="155381"/>
           </a:xfrm>
           <a:prstGeom prst="upArrow">
@@ -24000,7 +27531,7 @@
         </p:nvSpPr>
         <p:spPr>
           <a:xfrm>
-            <a:off x="7133983" y="3142806"/>
+            <a:off x="7133983" y="3205152"/>
             <a:ext cx="1256267" cy="597173"/>
           </a:xfrm>
           <a:prstGeom prst="flowChartProcess">
@@ -24057,7 +27588,7 @@
         </p:nvCxnSpPr>
         <p:spPr>
           <a:xfrm>
-            <a:off x="6479059" y="2330296"/>
+            <a:off x="6479059" y="2392642"/>
             <a:ext cx="288037" cy="0"/>
           </a:xfrm>
           <a:prstGeom prst="straightConnector1">
@@ -24099,7 +27630,7 @@
         </p:nvCxnSpPr>
         <p:spPr>
           <a:xfrm>
-            <a:off x="6767096" y="2326993"/>
+            <a:off x="6767096" y="2389339"/>
             <a:ext cx="0" cy="2214462"/>
           </a:xfrm>
           <a:prstGeom prst="line">
@@ -24137,7 +27668,7 @@
         </p:nvCxnSpPr>
         <p:spPr>
           <a:xfrm>
-            <a:off x="6479059" y="4541455"/>
+            <a:off x="6479059" y="4603801"/>
             <a:ext cx="288037" cy="0"/>
           </a:xfrm>
           <a:prstGeom prst="straightConnector1">
@@ -24179,7 +27710,7 @@
         </p:nvCxnSpPr>
         <p:spPr>
           <a:xfrm>
-            <a:off x="6767096" y="3433863"/>
+            <a:off x="6767096" y="3496209"/>
             <a:ext cx="358346" cy="4025"/>
           </a:xfrm>
           <a:prstGeom prst="straightConnector1">
@@ -24219,7 +27750,7 @@
         </p:nvSpPr>
         <p:spPr>
           <a:xfrm>
-            <a:off x="7108841" y="2352282"/>
+            <a:off x="7108841" y="2414628"/>
             <a:ext cx="2625655" cy="276999"/>
           </a:xfrm>
           <a:prstGeom prst="rect">
@@ -24256,7 +27787,7 @@
         </p:nvSpPr>
         <p:spPr>
           <a:xfrm>
-            <a:off x="7038524" y="2143679"/>
+            <a:off x="7038524" y="2206025"/>
             <a:ext cx="883575" cy="276999"/>
           </a:xfrm>
           <a:prstGeom prst="rect">
@@ -24317,7 +27848,7 @@
         </p:nvSpPr>
         <p:spPr>
           <a:xfrm>
-            <a:off x="7092163" y="2788844"/>
+            <a:off x="7092163" y="2851190"/>
             <a:ext cx="1989455" cy="276999"/>
           </a:xfrm>
           <a:prstGeom prst="rect">
@@ -24354,7 +27885,7 @@
         </p:nvSpPr>
         <p:spPr>
           <a:xfrm>
-            <a:off x="7021846" y="2580241"/>
+            <a:off x="7021846" y="2642587"/>
             <a:ext cx="548548" cy="276999"/>
           </a:xfrm>
           <a:prstGeom prst="rect">
@@ -24368,7 +27899,7 @@
           <a:lstStyle/>
           <a:p>
             <a:r>
-              <a:rPr lang="en-US" altLang="zh-TW" sz="1200" dirty="0" smtClean="0">
+              <a:rPr lang="en-US" altLang="zh-TW" sz="1200" dirty="0">
                 <a:solidFill>
                   <a:schemeClr val="dk1"/>
                 </a:solidFill>
@@ -24378,7 +27909,7 @@
               <a:t>Find</a:t>
             </a:r>
             <a:r>
-              <a:rPr lang="zh-TW" altLang="en-US" sz="1200" dirty="0" smtClean="0">
+              <a:rPr lang="zh-TW" altLang="en-US" sz="1200" dirty="0">
                 <a:solidFill>
                   <a:schemeClr val="dk1"/>
                 </a:solidFill>
@@ -24417,7 +27948,7 @@
         </p:nvCxnSpPr>
         <p:spPr>
           <a:xfrm>
-            <a:off x="8390250" y="3437888"/>
+            <a:off x="8390250" y="3500234"/>
             <a:ext cx="288037" cy="0"/>
           </a:xfrm>
           <a:prstGeom prst="straightConnector1">
@@ -24459,7 +27990,7 @@
         </p:nvCxnSpPr>
         <p:spPr>
           <a:xfrm>
-            <a:off x="8678287" y="2190308"/>
+            <a:off x="8678287" y="2252654"/>
             <a:ext cx="0" cy="1250005"/>
           </a:xfrm>
           <a:prstGeom prst="line">
@@ -24498,7 +28029,7 @@
         </p:nvCxnSpPr>
         <p:spPr>
           <a:xfrm flipV="1">
-            <a:off x="8675688" y="2190048"/>
+            <a:off x="8675688" y="2252394"/>
             <a:ext cx="1226485" cy="4936"/>
           </a:xfrm>
           <a:prstGeom prst="straightConnector1">
@@ -24538,7 +28069,7 @@
         </p:nvSpPr>
         <p:spPr>
           <a:xfrm>
-            <a:off x="9902173" y="1891461"/>
+            <a:off x="9902173" y="1953807"/>
             <a:ext cx="1256267" cy="597173"/>
           </a:xfrm>
           <a:prstGeom prst="flowChartProcess">
@@ -24595,7 +28126,7 @@
         </p:nvCxnSpPr>
         <p:spPr>
           <a:xfrm>
-            <a:off x="10530306" y="2490712"/>
+            <a:off x="10530306" y="2553058"/>
             <a:ext cx="0" cy="249889"/>
           </a:xfrm>
           <a:prstGeom prst="straightConnector1">
@@ -24635,7 +28166,7 @@
         </p:nvSpPr>
         <p:spPr>
           <a:xfrm>
-            <a:off x="9902173" y="2740601"/>
+            <a:off x="9902173" y="2802947"/>
             <a:ext cx="1256267" cy="597173"/>
           </a:xfrm>
           <a:prstGeom prst="flowChartProcess">
@@ -24692,7 +28223,7 @@
         </p:nvCxnSpPr>
         <p:spPr>
           <a:xfrm>
-            <a:off x="10538847" y="3337774"/>
+            <a:off x="10538847" y="3400120"/>
             <a:ext cx="0" cy="249889"/>
           </a:xfrm>
           <a:prstGeom prst="straightConnector1">
@@ -24732,7 +28263,7 @@
         </p:nvSpPr>
         <p:spPr>
           <a:xfrm>
-            <a:off x="9910714" y="3587663"/>
+            <a:off x="9910714" y="3650009"/>
             <a:ext cx="1256267" cy="597173"/>
           </a:xfrm>
           <a:prstGeom prst="flowChartProcess">
@@ -24788,7 +28319,7 @@
         </p:nvCxnSpPr>
         <p:spPr>
           <a:xfrm>
-            <a:off x="10538846" y="4184836"/>
+            <a:off x="10538846" y="4247182"/>
             <a:ext cx="0" cy="249889"/>
           </a:xfrm>
           <a:prstGeom prst="straightConnector1">
@@ -24828,7 +28359,7 @@
         </p:nvSpPr>
         <p:spPr>
           <a:xfrm>
-            <a:off x="9910713" y="4434725"/>
+            <a:off x="9910713" y="4497071"/>
             <a:ext cx="1256267" cy="597173"/>
           </a:xfrm>
           <a:prstGeom prst="flowChartProcess">
@@ -24884,7 +28415,7 @@
         </p:nvCxnSpPr>
         <p:spPr>
           <a:xfrm>
-            <a:off x="7754154" y="3744579"/>
+            <a:off x="7754154" y="3806925"/>
             <a:ext cx="0" cy="246729"/>
           </a:xfrm>
           <a:prstGeom prst="straightConnector1">
@@ -24924,7 +28455,7 @@
         </p:nvSpPr>
         <p:spPr>
           <a:xfrm>
-            <a:off x="7133983" y="3998597"/>
+            <a:off x="7133983" y="4060943"/>
             <a:ext cx="1256267" cy="597173"/>
           </a:xfrm>
           <a:prstGeom prst="flowChartProcess">
@@ -24978,7 +28509,7 @@
         </p:nvCxnSpPr>
         <p:spPr>
           <a:xfrm>
-            <a:off x="7772702" y="4595770"/>
+            <a:off x="7772702" y="4658116"/>
             <a:ext cx="0" cy="246729"/>
           </a:xfrm>
           <a:prstGeom prst="straightConnector1">
@@ -25018,7 +28549,7 @@
         </p:nvSpPr>
         <p:spPr>
           <a:xfrm>
-            <a:off x="7144568" y="4842499"/>
+            <a:off x="7144568" y="4904845"/>
             <a:ext cx="1256267" cy="597173"/>
           </a:xfrm>
           <a:prstGeom prst="flowChartProcess">
@@ -25067,7 +28598,7 @@
         </p:nvCxnSpPr>
         <p:spPr>
           <a:xfrm>
-            <a:off x="7772701" y="5439672"/>
+            <a:off x="7772701" y="5502018"/>
             <a:ext cx="0" cy="246729"/>
           </a:xfrm>
           <a:prstGeom prst="straightConnector1">
@@ -25107,7 +28638,7 @@
         </p:nvSpPr>
         <p:spPr>
           <a:xfrm>
-            <a:off x="7158483" y="5686401"/>
+            <a:off x="7158483" y="5748747"/>
             <a:ext cx="1256267" cy="597173"/>
           </a:xfrm>
           <a:prstGeom prst="flowChartProcess">
@@ -25165,7 +28696,7 @@
         </p:nvCxnSpPr>
         <p:spPr>
           <a:xfrm flipV="1">
-            <a:off x="8414750" y="5980671"/>
+            <a:off x="8414750" y="6043017"/>
             <a:ext cx="1742504" cy="4317"/>
           </a:xfrm>
           <a:prstGeom prst="straightConnector1">
@@ -25205,7 +28736,7 @@
         </p:nvSpPr>
         <p:spPr>
           <a:xfrm>
-            <a:off x="10157254" y="5743598"/>
+            <a:off x="10157254" y="5805944"/>
             <a:ext cx="770238" cy="474146"/>
           </a:xfrm>
           <a:prstGeom prst="flowChartTerminator">
@@ -25256,7 +28787,7 @@
         </p:nvCxnSpPr>
         <p:spPr>
           <a:xfrm>
-            <a:off x="10538846" y="5031898"/>
+            <a:off x="10538846" y="5094244"/>
             <a:ext cx="3527" cy="711700"/>
           </a:xfrm>
           <a:prstGeom prst="straightConnector1">
@@ -25296,7 +28827,7 @@
         </p:nvSpPr>
         <p:spPr>
           <a:xfrm>
-            <a:off x="1876874" y="3035041"/>
+            <a:off x="1876874" y="3097387"/>
             <a:ext cx="982212" cy="646331"/>
           </a:xfrm>
           <a:prstGeom prst="rect">
@@ -25373,7 +28904,7 @@
         </p:nvSpPr>
         <p:spPr>
           <a:xfrm>
-            <a:off x="171690" y="3204459"/>
+            <a:off x="171690" y="3266805"/>
             <a:ext cx="982212" cy="369332"/>
           </a:xfrm>
           <a:prstGeom prst="rect">
@@ -25424,7 +28955,7 @@
 </p:sld>
 </file>
 
-<file path=ppt/slides/slide5.xml><?xml version="1.0" encoding="utf-8"?>
+<file path=ppt/slides/slide6.xml><?xml version="1.0" encoding="utf-8"?>
 <p:sld xmlns:a="http://schemas.openxmlformats.org/drawingml/2006/main" xmlns:r="http://schemas.openxmlformats.org/officeDocument/2006/relationships" xmlns:p="http://schemas.openxmlformats.org/presentationml/2006/main">
   <p:cSld>
     <p:spTree>
@@ -25586,27 +29117,7 @@
                   </a:schemeClr>
                 </a:solidFill>
               </a:rPr>
-              <a:t>The </a:t>
-            </a:r>
-            <a:r>
-              <a:rPr lang="en-US" altLang="zh-TW" sz="2800" dirty="0" smtClean="0">
-                <a:solidFill>
-                  <a:schemeClr val="accent3">
-                    <a:lumMod val="50000"/>
-                  </a:schemeClr>
-                </a:solidFill>
-              </a:rPr>
-              <a:t>characters properties </a:t>
-            </a:r>
-            <a:r>
-              <a:rPr lang="en-US" altLang="zh-TW" sz="2800" dirty="0">
-                <a:solidFill>
-                  <a:schemeClr val="accent3">
-                    <a:lumMod val="50000"/>
-                  </a:schemeClr>
-                </a:solidFill>
-              </a:rPr>
-              <a:t>:</a:t>
+              <a:t>The characters properties :</a:t>
             </a:r>
           </a:p>
         </p:txBody>
@@ -25726,37 +29237,8 @@
                   <a:srgbClr val="002060"/>
                 </a:solidFill>
               </a:rPr>
-              <a:t>Excluding Unicode </a:t>
+              <a:t>Excluding Unicode calculation. (such as :          ) </a:t>
             </a:r>
-            <a:r>
-              <a:rPr lang="en-US" altLang="zh-TW" sz="2400" b="1" dirty="0" smtClean="0">
-                <a:solidFill>
-                  <a:srgbClr val="002060"/>
-                </a:solidFill>
-              </a:rPr>
-              <a:t>calculation. (such as </a:t>
-            </a:r>
-            <a:r>
-              <a:rPr lang="en-US" altLang="zh-TW" sz="2400" b="1" dirty="0">
-                <a:solidFill>
-                  <a:srgbClr val="002060"/>
-                </a:solidFill>
-              </a:rPr>
-              <a:t>: </a:t>
-            </a:r>
-            <a:r>
-              <a:rPr lang="en-US" altLang="zh-TW" sz="2400" b="1" dirty="0" smtClean="0">
-                <a:solidFill>
-                  <a:srgbClr val="002060"/>
-                </a:solidFill>
-              </a:rPr>
-              <a:t>         ) </a:t>
-            </a:r>
-            <a:endParaRPr lang="en-US" altLang="zh-TW" sz="2400" b="1" dirty="0">
-              <a:solidFill>
-                <a:srgbClr val="002060"/>
-              </a:solidFill>
-            </a:endParaRPr>
           </a:p>
         </p:txBody>
       </p:sp>
@@ -25965,25 +29447,8 @@
                   </a:schemeClr>
                 </a:solidFill>
               </a:rPr>
-              <a:t>The </a:t>
+              <a:t>The parser process :</a:t>
             </a:r>
-            <a:r>
-              <a:rPr lang="en-US" altLang="zh-TW" sz="2800" dirty="0" smtClean="0">
-                <a:solidFill>
-                  <a:schemeClr val="accent3">
-                    <a:lumMod val="50000"/>
-                  </a:schemeClr>
-                </a:solidFill>
-              </a:rPr>
-              <a:t>parser process :</a:t>
-            </a:r>
-            <a:endParaRPr lang="en-US" altLang="zh-TW" sz="2800" dirty="0">
-              <a:solidFill>
-                <a:schemeClr val="accent3">
-                  <a:lumMod val="50000"/>
-                </a:schemeClr>
-              </a:solidFill>
-            </a:endParaRPr>
           </a:p>
         </p:txBody>
       </p:sp>
@@ -26048,7 +29513,407 @@
 </p:sld>
 </file>
 
-<file path=ppt/slides/slide6.xml><?xml version="1.0" encoding="utf-8"?>
+<file path=ppt/slides/slide7.xml><?xml version="1.0" encoding="utf-8"?>
+<p:sld xmlns:a="http://schemas.openxmlformats.org/drawingml/2006/main" xmlns:r="http://schemas.openxmlformats.org/officeDocument/2006/relationships" xmlns:p="http://schemas.openxmlformats.org/presentationml/2006/main">
+  <p:cSld>
+    <p:spTree>
+      <p:nvGrpSpPr>
+        <p:cNvPr id="1" name=""/>
+        <p:cNvGrpSpPr/>
+        <p:nvPr/>
+      </p:nvGrpSpPr>
+      <p:grpSpPr>
+        <a:xfrm>
+          <a:off x="0" y="0"/>
+          <a:ext cx="0" cy="0"/>
+          <a:chOff x="0" y="0"/>
+          <a:chExt cx="0" cy="0"/>
+        </a:xfrm>
+      </p:grpSpPr>
+      <p:sp>
+        <p:nvSpPr>
+          <p:cNvPr id="6" name="矩形 5">
+            <a:extLst>
+              <a:ext uri="{FF2B5EF4-FFF2-40B4-BE49-F238E27FC236}">
+                <a16:creationId xmlns:a16="http://schemas.microsoft.com/office/drawing/2014/main" id="{38BC9CD9-E478-4907-837C-F2707C28AF8F}"/>
+              </a:ext>
+            </a:extLst>
+          </p:cNvPr>
+          <p:cNvSpPr/>
+          <p:nvPr/>
+        </p:nvSpPr>
+        <p:spPr>
+          <a:xfrm>
+            <a:off x="1209759" y="724237"/>
+            <a:ext cx="8791997" cy="1201667"/>
+          </a:xfrm>
+          <a:prstGeom prst="rect">
+            <a:avLst/>
+          </a:prstGeom>
+          <a:noFill/>
+          <a:ln>
+            <a:noFill/>
+          </a:ln>
+        </p:spPr>
+        <p:style>
+          <a:lnRef idx="2">
+            <a:schemeClr val="dk1"/>
+          </a:lnRef>
+          <a:fillRef idx="1">
+            <a:schemeClr val="lt1"/>
+          </a:fillRef>
+          <a:effectRef idx="0">
+            <a:schemeClr val="dk1"/>
+          </a:effectRef>
+          <a:fontRef idx="minor">
+            <a:schemeClr val="dk1"/>
+          </a:fontRef>
+        </p:style>
+        <p:txBody>
+          <a:bodyPr rot="0" spcFirstLastPara="0" vertOverflow="overflow" horzOverflow="overflow" vert="horz" wrap="square" lIns="91440" tIns="45720" rIns="91440" bIns="45720" numCol="1" spcCol="0" rtlCol="0" fromWordArt="0" anchor="ctr" anchorCtr="0" forceAA="0" compatLnSpc="1">
+            <a:prstTxWarp prst="textNoShape">
+              <a:avLst/>
+            </a:prstTxWarp>
+            <a:noAutofit/>
+          </a:bodyPr>
+          <a:lstStyle/>
+          <a:p>
+            <a:r>
+              <a:rPr lang="en-US" altLang="zh-TW" sz="4800" b="1" dirty="0">
+                <a:ln/>
+                <a:pattFill prst="dkUpDiag">
+                  <a:fgClr>
+                    <a:schemeClr val="bg1">
+                      <a:lumMod val="50000"/>
+                    </a:schemeClr>
+                  </a:fgClr>
+                  <a:bgClr>
+                    <a:schemeClr val="tx1">
+                      <a:lumMod val="75000"/>
+                      <a:lumOff val="25000"/>
+                    </a:schemeClr>
+                  </a:bgClr>
+                </a:pattFill>
+                <a:effectLst>
+                  <a:outerShdw blurRad="38100" dist="19050" dir="2700000" algn="tl" rotWithShape="0">
+                    <a:schemeClr val="dk1">
+                      <a:lumMod val="50000"/>
+                      <a:alpha val="40000"/>
+                    </a:schemeClr>
+                  </a:outerShdw>
+                </a:effectLst>
+                <a:latin typeface="Yu Gothic UI" panose="020B0500000000000000" pitchFamily="34" charset="-128"/>
+                <a:ea typeface="Yu Gothic UI" panose="020B0500000000000000" pitchFamily="34" charset="-128"/>
+              </a:rPr>
+              <a:t>Methods &amp; Result</a:t>
+            </a:r>
+            <a:endParaRPr lang="zh-TW" altLang="en-US" sz="2800" b="1" dirty="0">
+              <a:ln/>
+              <a:pattFill prst="dkUpDiag">
+                <a:fgClr>
+                  <a:schemeClr val="bg1">
+                    <a:lumMod val="50000"/>
+                  </a:schemeClr>
+                </a:fgClr>
+                <a:bgClr>
+                  <a:schemeClr val="tx1">
+                    <a:lumMod val="75000"/>
+                    <a:lumOff val="25000"/>
+                  </a:schemeClr>
+                </a:bgClr>
+              </a:pattFill>
+              <a:effectLst>
+                <a:outerShdw blurRad="38100" dist="19050" dir="2700000" algn="tl" rotWithShape="0">
+                  <a:schemeClr val="dk1">
+                    <a:lumMod val="50000"/>
+                    <a:alpha val="40000"/>
+                  </a:schemeClr>
+                </a:outerShdw>
+              </a:effectLst>
+              <a:latin typeface="Yu Gothic UI" panose="020B0500000000000000" pitchFamily="34" charset="-128"/>
+              <a:ea typeface="Yu Gothic UI" panose="020B0500000000000000" pitchFamily="34" charset="-128"/>
+            </a:endParaRPr>
+          </a:p>
+        </p:txBody>
+      </p:sp>
+      <p:sp>
+        <p:nvSpPr>
+          <p:cNvPr id="4" name="矩形 3">
+            <a:extLst>
+              <a:ext uri="{FF2B5EF4-FFF2-40B4-BE49-F238E27FC236}">
+                <a16:creationId xmlns:a16="http://schemas.microsoft.com/office/drawing/2014/main" id="{99AEE3B1-ACB8-45A4-B777-E0A89380CB93}"/>
+              </a:ext>
+            </a:extLst>
+          </p:cNvPr>
+          <p:cNvSpPr/>
+          <p:nvPr/>
+        </p:nvSpPr>
+        <p:spPr>
+          <a:xfrm>
+            <a:off x="662628" y="1790362"/>
+            <a:ext cx="5946693" cy="523220"/>
+          </a:xfrm>
+          <a:prstGeom prst="rect">
+            <a:avLst/>
+          </a:prstGeom>
+        </p:spPr>
+        <p:txBody>
+          <a:bodyPr wrap="none">
+            <a:spAutoFit/>
+          </a:bodyPr>
+          <a:lstStyle/>
+          <a:p>
+            <a:pPr marL="285750" indent="-285750">
+              <a:buFont typeface="Arial" panose="020B0604020202020204" pitchFamily="34" charset="0"/>
+              <a:buChar char="•"/>
+            </a:pPr>
+            <a:r>
+              <a:rPr lang="en-US" altLang="zh-TW" sz="2800" dirty="0">
+                <a:solidFill>
+                  <a:schemeClr val="accent3">
+                    <a:lumMod val="50000"/>
+                  </a:schemeClr>
+                </a:solidFill>
+              </a:rPr>
+              <a:t>There are 3 methods could be solved :</a:t>
+            </a:r>
+          </a:p>
+        </p:txBody>
+      </p:sp>
+      <p:sp>
+        <p:nvSpPr>
+          <p:cNvPr id="8" name="矩形 7">
+            <a:extLst>
+              <a:ext uri="{FF2B5EF4-FFF2-40B4-BE49-F238E27FC236}">
+                <a16:creationId xmlns:a16="http://schemas.microsoft.com/office/drawing/2014/main" id="{AB2060C0-4720-4EF3-8846-538F9A31C515}"/>
+              </a:ext>
+            </a:extLst>
+          </p:cNvPr>
+          <p:cNvSpPr/>
+          <p:nvPr/>
+        </p:nvSpPr>
+        <p:spPr>
+          <a:xfrm>
+            <a:off x="1054443" y="2330556"/>
+            <a:ext cx="5670398" cy="1200329"/>
+          </a:xfrm>
+          <a:prstGeom prst="rect">
+            <a:avLst/>
+          </a:prstGeom>
+        </p:spPr>
+        <p:txBody>
+          <a:bodyPr wrap="none">
+            <a:spAutoFit/>
+          </a:bodyPr>
+          <a:lstStyle/>
+          <a:p>
+            <a:pPr marL="457200" indent="-457200">
+              <a:buFont typeface="+mj-lt"/>
+              <a:buAutoNum type="arabicPeriod"/>
+            </a:pPr>
+            <a:r>
+              <a:rPr lang="en-US" altLang="zh-TW" sz="2400" b="1" dirty="0">
+                <a:solidFill>
+                  <a:srgbClr val="002060"/>
+                </a:solidFill>
+              </a:rPr>
+              <a:t>MD5 Checksum.</a:t>
+            </a:r>
+          </a:p>
+          <a:p>
+            <a:pPr marL="457200" indent="-457200">
+              <a:buFont typeface="+mj-lt"/>
+              <a:buAutoNum type="arabicPeriod"/>
+            </a:pPr>
+            <a:r>
+              <a:rPr lang="en-US" altLang="zh-TW" sz="2400" b="1" dirty="0">
+                <a:solidFill>
+                  <a:srgbClr val="002060"/>
+                </a:solidFill>
+              </a:rPr>
+              <a:t>CRC32.</a:t>
+            </a:r>
+          </a:p>
+          <a:p>
+            <a:pPr marL="457200" indent="-457200">
+              <a:buFont typeface="+mj-lt"/>
+              <a:buAutoNum type="arabicPeriod"/>
+            </a:pPr>
+            <a:r>
+              <a:rPr lang="en-US" altLang="zh-TW" sz="2400" b="1" dirty="0">
+                <a:solidFill>
+                  <a:srgbClr val="002060"/>
+                </a:solidFill>
+              </a:rPr>
+              <a:t>Perform compare character one by one.</a:t>
+            </a:r>
+          </a:p>
+        </p:txBody>
+      </p:sp>
+      <p:sp>
+        <p:nvSpPr>
+          <p:cNvPr id="2" name="矩形 1"/>
+          <p:cNvSpPr/>
+          <p:nvPr/>
+        </p:nvSpPr>
+        <p:spPr>
+          <a:xfrm>
+            <a:off x="1054443" y="4188043"/>
+            <a:ext cx="10427643" cy="461665"/>
+          </a:xfrm>
+          <a:prstGeom prst="rect">
+            <a:avLst/>
+          </a:prstGeom>
+        </p:spPr>
+        <p:txBody>
+          <a:bodyPr wrap="square">
+            <a:spAutoFit/>
+          </a:bodyPr>
+          <a:lstStyle/>
+          <a:p>
+            <a:pPr marL="342900" indent="-342900">
+              <a:buFont typeface="Arial" panose="020B0604020202020204" pitchFamily="34" charset="0"/>
+              <a:buChar char="•"/>
+            </a:pPr>
+            <a:r>
+              <a:rPr lang="en-US" altLang="zh-TW" sz="2400" b="1" dirty="0">
+                <a:solidFill>
+                  <a:srgbClr val="002060"/>
+                </a:solidFill>
+              </a:rPr>
+              <a:t>The terminal window will be color-coded where the text is not the same.</a:t>
+            </a:r>
+          </a:p>
+        </p:txBody>
+      </p:sp>
+      <p:sp>
+        <p:nvSpPr>
+          <p:cNvPr id="9" name="矩形 8">
+            <a:extLst>
+              <a:ext uri="{FF2B5EF4-FFF2-40B4-BE49-F238E27FC236}">
+                <a16:creationId xmlns:a16="http://schemas.microsoft.com/office/drawing/2014/main" id="{99AEE3B1-ACB8-45A4-B777-E0A89380CB93}"/>
+              </a:ext>
+            </a:extLst>
+          </p:cNvPr>
+          <p:cNvSpPr/>
+          <p:nvPr/>
+        </p:nvSpPr>
+        <p:spPr>
+          <a:xfrm>
+            <a:off x="662628" y="3664514"/>
+            <a:ext cx="7668125" cy="523220"/>
+          </a:xfrm>
+          <a:prstGeom prst="rect">
+            <a:avLst/>
+          </a:prstGeom>
+        </p:spPr>
+        <p:txBody>
+          <a:bodyPr wrap="none">
+            <a:spAutoFit/>
+          </a:bodyPr>
+          <a:lstStyle/>
+          <a:p>
+            <a:pPr marL="285750" indent="-285750">
+              <a:buFont typeface="Arial" panose="020B0604020202020204" pitchFamily="34" charset="0"/>
+              <a:buChar char="•"/>
+            </a:pPr>
+            <a:r>
+              <a:rPr lang="en-US" altLang="zh-TW" sz="2800" dirty="0">
+                <a:solidFill>
+                  <a:schemeClr val="accent3">
+                    <a:lumMod val="50000"/>
+                  </a:schemeClr>
+                </a:solidFill>
+              </a:rPr>
+              <a:t>The display effect in Terminal window</a:t>
+            </a:r>
+            <a:r>
+              <a:rPr lang="zh-TW" altLang="en-US" sz="2800" dirty="0">
+                <a:solidFill>
+                  <a:schemeClr val="accent3">
+                    <a:lumMod val="50000"/>
+                  </a:schemeClr>
+                </a:solidFill>
+              </a:rPr>
+              <a:t> </a:t>
+            </a:r>
+            <a:r>
+              <a:rPr lang="en-US" altLang="zh-TW" sz="2800" dirty="0">
+                <a:solidFill>
+                  <a:schemeClr val="accent3">
+                    <a:lumMod val="50000"/>
+                  </a:schemeClr>
+                </a:solidFill>
+              </a:rPr>
+              <a:t>:</a:t>
+            </a:r>
+            <a:r>
+              <a:rPr lang="zh-TW" altLang="en-US" sz="2800" dirty="0">
+                <a:solidFill>
+                  <a:schemeClr val="accent3">
+                    <a:lumMod val="50000"/>
+                  </a:schemeClr>
+                </a:solidFill>
+              </a:rPr>
+              <a:t> </a:t>
+            </a:r>
+            <a:r>
+              <a:rPr lang="en-US" altLang="zh-TW" sz="2800" dirty="0">
+                <a:solidFill>
+                  <a:schemeClr val="accent3">
+                    <a:lumMod val="50000"/>
+                  </a:schemeClr>
+                </a:solidFill>
+              </a:rPr>
+              <a:t>(solution 3)</a:t>
+            </a:r>
+          </a:p>
+        </p:txBody>
+      </p:sp>
+      <p:pic>
+        <p:nvPicPr>
+          <p:cNvPr id="13" name="圖片 12">
+            <a:extLst>
+              <a:ext uri="{FF2B5EF4-FFF2-40B4-BE49-F238E27FC236}">
+                <a16:creationId xmlns:a16="http://schemas.microsoft.com/office/drawing/2014/main" id="{0E630E66-C248-4DC6-887A-F5BCF84053B7}"/>
+              </a:ext>
+            </a:extLst>
+          </p:cNvPr>
+          <p:cNvPicPr>
+            <a:picLocks noChangeAspect="1"/>
+          </p:cNvPicPr>
+          <p:nvPr/>
+        </p:nvPicPr>
+        <p:blipFill>
+          <a:blip r:embed="rId3"/>
+          <a:stretch>
+            <a:fillRect/>
+          </a:stretch>
+        </p:blipFill>
+        <p:spPr>
+          <a:xfrm>
+            <a:off x="1470888" y="4698340"/>
+            <a:ext cx="10599045" cy="1917108"/>
+          </a:xfrm>
+          <a:prstGeom prst="rect">
+            <a:avLst/>
+          </a:prstGeom>
+        </p:spPr>
+      </p:pic>
+    </p:spTree>
+    <p:extLst>
+      <p:ext uri="{BB962C8B-B14F-4D97-AF65-F5344CB8AC3E}">
+        <p14:creationId xmlns:p14="http://schemas.microsoft.com/office/powerpoint/2010/main" val="1245459113"/>
+      </p:ext>
+    </p:extLst>
+  </p:cSld>
+  <p:clrMapOvr>
+    <a:masterClrMapping/>
+  </p:clrMapOvr>
+</p:sld>
+</file>
+
+<file path=ppt/slides/slide8.xml><?xml version="1.0" encoding="utf-8"?>
 <p:sld xmlns:a="http://schemas.openxmlformats.org/drawingml/2006/main" xmlns:r="http://schemas.openxmlformats.org/officeDocument/2006/relationships" xmlns:p="http://schemas.openxmlformats.org/presentationml/2006/main">
   <p:cSld>
     <p:spTree>
@@ -27021,6 +30886,23 @@
 </file>
 
 <file path=customXml/item1.xml><?xml version="1.0" encoding="utf-8"?>
+<p:properties xmlns:p="http://schemas.microsoft.com/office/2006/metadata/properties" xmlns:xsi="http://www.w3.org/2001/XMLSchema-instance" xmlns:pc="http://schemas.microsoft.com/office/infopath/2007/PartnerControls">
+  <documentManagement>
+    <MediaServiceKeyPoints xmlns="71af3243-3dd4-4a8d-8c0d-dd76da1f02a5" xsi:nil="true"/>
+  </documentManagement>
+</p:properties>
+</file>
+
+<file path=customXml/item2.xml><?xml version="1.0" encoding="utf-8"?>
+<?mso-contentType ?>
+<FormTemplates xmlns="http://schemas.microsoft.com/sharepoint/v3/contenttype/forms">
+  <Display>DocumentLibraryForm</Display>
+  <Edit>DocumentLibraryForm</Edit>
+  <New>DocumentLibraryForm</New>
+</FormTemplates>
+</file>
+
+<file path=customXml/item3.xml><?xml version="1.0" encoding="utf-8"?>
 <ct:contentTypeSchema xmlns:ct="http://schemas.microsoft.com/office/2006/metadata/contentType" xmlns:ma="http://schemas.microsoft.com/office/2006/metadata/properties/metaAttributes" ct:_="" ma:_="" ma:contentTypeName="Document" ma:contentTypeID="0x01010079F111ED35F8CC479449609E8A0923A6" ma:contentTypeVersion="11" ma:contentTypeDescription="Create a new document." ma:contentTypeScope="" ma:versionID="9677210f24a1be23c92c90fd886aa0aa">
   <xsd:schema xmlns:xsd="http://www.w3.org/2001/XMLSchema" xmlns:xs="http://www.w3.org/2001/XMLSchema" xmlns:p="http://schemas.microsoft.com/office/2006/metadata/properties" xmlns:ns2="71af3243-3dd4-4a8d-8c0d-dd76da1f02a5" xmlns:ns3="16c05727-aa75-4e4a-9b5f-8a80a1165891" targetNamespace="http://schemas.microsoft.com/office/2006/metadata/properties" ma:root="true" ma:fieldsID="60e05723c5c1908df1a1a4ebf11d344e" ns2:_="" ns3:_="">
     <xsd:import namespace="71af3243-3dd4-4a8d-8c0d-dd76da1f02a5"/>
@@ -27231,24 +31113,32 @@
 </ct:contentTypeSchema>
 </file>
 
-<file path=customXml/item2.xml><?xml version="1.0" encoding="utf-8"?>
-<?mso-contentType ?>
-<FormTemplates xmlns="http://schemas.microsoft.com/sharepoint/v3/contenttype/forms">
-  <Display>DocumentLibraryForm</Display>
-  <Edit>DocumentLibraryForm</Edit>
-  <New>DocumentLibraryForm</New>
-</FormTemplates>
+<file path=customXml/itemProps1.xml><?xml version="1.0" encoding="utf-8"?>
+<ds:datastoreItem xmlns:ds="http://schemas.openxmlformats.org/officeDocument/2006/customXml" ds:itemID="{788A2F88-55C5-4ED1-9541-807C65424763}">
+  <ds:schemaRefs>
+    <ds:schemaRef ds:uri="http://schemas.microsoft.com/office/2006/documentManagement/types"/>
+    <ds:schemaRef ds:uri="http://schemas.openxmlformats.org/package/2006/metadata/core-properties"/>
+    <ds:schemaRef ds:uri="16c05727-aa75-4e4a-9b5f-8a80a1165891"/>
+    <ds:schemaRef ds:uri="http://purl.org/dc/elements/1.1/"/>
+    <ds:schemaRef ds:uri="http://schemas.microsoft.com/office/2006/metadata/properties"/>
+    <ds:schemaRef ds:uri="71af3243-3dd4-4a8d-8c0d-dd76da1f02a5"/>
+    <ds:schemaRef ds:uri="http://purl.org/dc/terms/"/>
+    <ds:schemaRef ds:uri="http://schemas.microsoft.com/office/infopath/2007/PartnerControls"/>
+    <ds:schemaRef ds:uri="http://www.w3.org/XML/1998/namespace"/>
+    <ds:schemaRef ds:uri="http://purl.org/dc/dcmitype/"/>
+  </ds:schemaRefs>
+</ds:datastoreItem>
 </file>
 
-<file path=customXml/item3.xml><?xml version="1.0" encoding="utf-8"?>
-<p:properties xmlns:p="http://schemas.microsoft.com/office/2006/metadata/properties" xmlns:xsi="http://www.w3.org/2001/XMLSchema-instance" xmlns:pc="http://schemas.microsoft.com/office/infopath/2007/PartnerControls">
-  <documentManagement>
-    <MediaServiceKeyPoints xmlns="71af3243-3dd4-4a8d-8c0d-dd76da1f02a5" xsi:nil="true"/>
-  </documentManagement>
-</p:properties>
+<file path=customXml/itemProps2.xml><?xml version="1.0" encoding="utf-8"?>
+<ds:datastoreItem xmlns:ds="http://schemas.openxmlformats.org/officeDocument/2006/customXml" ds:itemID="{4F44C90D-2A62-4985-9618-3460247437B1}">
+  <ds:schemaRefs>
+    <ds:schemaRef ds:uri="http://schemas.microsoft.com/sharepoint/v3/contenttype/forms"/>
+  </ds:schemaRefs>
+</ds:datastoreItem>
 </file>
 
-<file path=customXml/itemProps1.xml><?xml version="1.0" encoding="utf-8"?>
+<file path=customXml/itemProps3.xml><?xml version="1.0" encoding="utf-8"?>
 <ds:datastoreItem xmlns:ds="http://schemas.openxmlformats.org/officeDocument/2006/customXml" ds:itemID="{B61EAB5F-88FC-4FAE-AE3C-037A3C365EB8}">
   <ds:schemaRefs>
     <ds:schemaRef ds:uri="http://schemas.microsoft.com/office/2006/metadata/contentType"/>
@@ -27265,29 +31155,4 @@
     <ds:schemaRef ds:uri="http://schemas.microsoft.com/internal/obd"/>
   </ds:schemaRefs>
 </ds:datastoreItem>
-</file>
-
-<file path=customXml/itemProps2.xml><?xml version="1.0" encoding="utf-8"?>
-<ds:datastoreItem xmlns:ds="http://schemas.openxmlformats.org/officeDocument/2006/customXml" ds:itemID="{4F44C90D-2A62-4985-9618-3460247437B1}">
-  <ds:schemaRefs>
-    <ds:schemaRef ds:uri="http://schemas.microsoft.com/sharepoint/v3/contenttype/forms"/>
-  </ds:schemaRefs>
-</ds:datastoreItem>
-</file>
-
-<file path=customXml/itemProps3.xml><?xml version="1.0" encoding="utf-8"?>
-<ds:datastoreItem xmlns:ds="http://schemas.openxmlformats.org/officeDocument/2006/customXml" ds:itemID="{788A2F88-55C5-4ED1-9541-807C65424763}">
-  <ds:schemaRefs>
-    <ds:schemaRef ds:uri="http://schemas.microsoft.com/office/2006/documentManagement/types"/>
-    <ds:schemaRef ds:uri="http://schemas.openxmlformats.org/package/2006/metadata/core-properties"/>
-    <ds:schemaRef ds:uri="16c05727-aa75-4e4a-9b5f-8a80a1165891"/>
-    <ds:schemaRef ds:uri="http://purl.org/dc/elements/1.1/"/>
-    <ds:schemaRef ds:uri="http://schemas.microsoft.com/office/2006/metadata/properties"/>
-    <ds:schemaRef ds:uri="71af3243-3dd4-4a8d-8c0d-dd76da1f02a5"/>
-    <ds:schemaRef ds:uri="http://purl.org/dc/terms/"/>
-    <ds:schemaRef ds:uri="http://schemas.microsoft.com/office/infopath/2007/PartnerControls"/>
-    <ds:schemaRef ds:uri="http://www.w3.org/XML/1998/namespace"/>
-    <ds:schemaRef ds:uri="http://purl.org/dc/dcmitype/"/>
-  </ds:schemaRefs>
-</ds:datastoreItem>
 </file>
</xml_diff>